<commit_message>
7. time dependent sampling
</commit_message>
<xml_diff>
--- a/doc/workshop/forwardSampling/ForwardSampling.pptx
+++ b/doc/workshop/forwardSampling/ForwardSampling.pptx
@@ -5,10 +5,10 @@
     <p:sldMasterId id="2147483648" r:id="rId1"/>
   </p:sldMasterIdLst>
   <p:notesMasterIdLst>
-    <p:notesMasterId r:id="rId24"/>
+    <p:notesMasterId r:id="rId25"/>
   </p:notesMasterIdLst>
   <p:handoutMasterIdLst>
-    <p:handoutMasterId r:id="rId25"/>
+    <p:handoutMasterId r:id="rId26"/>
   </p:handoutMasterIdLst>
   <p:sldIdLst>
     <p:sldId id="272" r:id="rId2"/>
@@ -21,18 +21,19 @@
     <p:sldId id="344" r:id="rId9"/>
     <p:sldId id="338" r:id="rId10"/>
     <p:sldId id="339" r:id="rId11"/>
-    <p:sldId id="345" r:id="rId12"/>
-    <p:sldId id="341" r:id="rId13"/>
-    <p:sldId id="342" r:id="rId14"/>
-    <p:sldId id="346" r:id="rId15"/>
-    <p:sldId id="343" r:id="rId16"/>
-    <p:sldId id="347" r:id="rId17"/>
-    <p:sldId id="349" r:id="rId18"/>
-    <p:sldId id="348" r:id="rId19"/>
-    <p:sldId id="350" r:id="rId20"/>
-    <p:sldId id="351" r:id="rId21"/>
-    <p:sldId id="352" r:id="rId22"/>
-    <p:sldId id="340" r:id="rId23"/>
+    <p:sldId id="353" r:id="rId12"/>
+    <p:sldId id="345" r:id="rId13"/>
+    <p:sldId id="341" r:id="rId14"/>
+    <p:sldId id="342" r:id="rId15"/>
+    <p:sldId id="346" r:id="rId16"/>
+    <p:sldId id="343" r:id="rId17"/>
+    <p:sldId id="347" r:id="rId18"/>
+    <p:sldId id="349" r:id="rId19"/>
+    <p:sldId id="348" r:id="rId20"/>
+    <p:sldId id="350" r:id="rId21"/>
+    <p:sldId id="351" r:id="rId22"/>
+    <p:sldId id="352" r:id="rId23"/>
+    <p:sldId id="340" r:id="rId24"/>
   </p:sldIdLst>
   <p:sldSz cx="9144000" cy="6858000" type="screen4x3"/>
   <p:notesSz cx="7010400" cy="9296400"/>
@@ -34039,6 +34040,178 @@
       </p:grpSpPr>
       <p:sp>
         <p:nvSpPr>
+          <p:cNvPr id="2" name="Title 1">
+            <a:extLst>
+              <a:ext uri="{FF2B5EF4-FFF2-40B4-BE49-F238E27FC236}">
+                <a16:creationId xmlns:a16="http://schemas.microsoft.com/office/drawing/2014/main" id="{51006A22-F413-AE4D-ACAD-347EA1964CAB}"/>
+              </a:ext>
+            </a:extLst>
+          </p:cNvPr>
+          <p:cNvSpPr>
+            <a:spLocks noGrp="1"/>
+          </p:cNvSpPr>
+          <p:nvPr>
+            <p:ph type="title"/>
+          </p:nvPr>
+        </p:nvSpPr>
+        <p:spPr/>
+        <p:txBody>
+          <a:bodyPr/>
+          <a:lstStyle/>
+          <a:p>
+            <a:r>
+              <a:rPr lang="en-US" dirty="0"/>
+              <a:t>1) Discussion</a:t>
+            </a:r>
+          </a:p>
+        </p:txBody>
+      </p:sp>
+      <p:sp>
+        <p:nvSpPr>
+          <p:cNvPr id="3" name="Content Placeholder 2">
+            <a:extLst>
+              <a:ext uri="{FF2B5EF4-FFF2-40B4-BE49-F238E27FC236}">
+                <a16:creationId xmlns:a16="http://schemas.microsoft.com/office/drawing/2014/main" id="{FA1C246F-8E46-EC4C-B6EC-788BEC814256}"/>
+              </a:ext>
+            </a:extLst>
+          </p:cNvPr>
+          <p:cNvSpPr>
+            <a:spLocks noGrp="1"/>
+          </p:cNvSpPr>
+          <p:nvPr>
+            <p:ph idx="1"/>
+          </p:nvPr>
+        </p:nvSpPr>
+        <p:spPr/>
+        <p:txBody>
+          <a:bodyPr/>
+          <a:lstStyle/>
+          <a:p>
+            <a:r>
+              <a:rPr lang="en-US" dirty="0" err="1"/>
+              <a:t>DataObjects</a:t>
+            </a:r>
+            <a:r>
+              <a:rPr lang="en-US" dirty="0"/>
+              <a:t>: </a:t>
+            </a:r>
+            <a:r>
+              <a:rPr lang="en-US" dirty="0" err="1"/>
+              <a:t>PointSets</a:t>
+            </a:r>
+            <a:endParaRPr lang="en-US" dirty="0"/>
+          </a:p>
+          <a:p>
+            <a:pPr lvl="1"/>
+            <a:r>
+              <a:rPr lang="en-US" dirty="0"/>
+              <a:t>Stores one row per sample</a:t>
+            </a:r>
+          </a:p>
+          <a:p>
+            <a:pPr lvl="1"/>
+            <a:r>
+              <a:rPr lang="en-US" dirty="0"/>
+              <a:t>Metadata: </a:t>
+            </a:r>
+            <a:r>
+              <a:rPr lang="en-US" dirty="0" err="1"/>
+              <a:t>ProbabilityWeight</a:t>
+            </a:r>
+            <a:r>
+              <a:rPr lang="en-US" dirty="0"/>
+              <a:t>, Prefix, </a:t>
+            </a:r>
+            <a:r>
+              <a:rPr lang="en-US" dirty="0" err="1"/>
+              <a:t>PointProbability</a:t>
+            </a:r>
+            <a:endParaRPr lang="en-US" dirty="0"/>
+          </a:p>
+          <a:p>
+            <a:pPr lvl="1"/>
+            <a:endParaRPr lang="en-US" dirty="0"/>
+          </a:p>
+          <a:p>
+            <a:r>
+              <a:rPr lang="en-US" dirty="0" err="1"/>
+              <a:t>OutStreams</a:t>
+            </a:r>
+            <a:endParaRPr lang="en-US" dirty="0"/>
+          </a:p>
+          <a:p>
+            <a:pPr lvl="1"/>
+            <a:r>
+              <a:rPr lang="en-US" dirty="0"/>
+              <a:t>Nothing is written to file without an </a:t>
+            </a:r>
+            <a:r>
+              <a:rPr lang="en-US" dirty="0" err="1"/>
+              <a:t>OutStream</a:t>
+            </a:r>
+            <a:r>
+              <a:rPr lang="en-US" dirty="0"/>
+              <a:t> Print or Plot!</a:t>
+            </a:r>
+          </a:p>
+          <a:p>
+            <a:pPr lvl="1"/>
+            <a:endParaRPr lang="en-US" dirty="0"/>
+          </a:p>
+          <a:p>
+            <a:r>
+              <a:rPr lang="en-US" dirty="0"/>
+              <a:t>Steps and Sequence</a:t>
+            </a:r>
+          </a:p>
+          <a:p>
+            <a:pPr lvl="1"/>
+            <a:r>
+              <a:rPr lang="en-US" dirty="0"/>
+              <a:t>Steps define possible actions to take</a:t>
+            </a:r>
+          </a:p>
+          <a:p>
+            <a:pPr lvl="1"/>
+            <a:r>
+              <a:rPr lang="en-US" dirty="0"/>
+              <a:t>Sequence defines order of actions</a:t>
+            </a:r>
+          </a:p>
+        </p:txBody>
+      </p:sp>
+    </p:spTree>
+    <p:extLst>
+      <p:ext uri="{BB962C8B-B14F-4D97-AF65-F5344CB8AC3E}">
+        <p14:creationId xmlns:p14="http://schemas.microsoft.com/office/powerpoint/2010/main" val="2515134238"/>
+      </p:ext>
+    </p:extLst>
+  </p:cSld>
+  <p:clrMapOvr>
+    <a:masterClrMapping/>
+  </p:clrMapOvr>
+</p:sld>
+</file>
+
+<file path=ppt/slides/slide12.xml><?xml version="1.0" encoding="utf-8"?>
+<p:sld xmlns:a="http://schemas.openxmlformats.org/drawingml/2006/main" xmlns:r="http://schemas.openxmlformats.org/officeDocument/2006/relationships" xmlns:p="http://schemas.openxmlformats.org/presentationml/2006/main">
+  <p:cSld>
+    <p:spTree>
+      <p:nvGrpSpPr>
+        <p:cNvPr id="1" name=""/>
+        <p:cNvGrpSpPr/>
+        <p:nvPr/>
+      </p:nvGrpSpPr>
+      <p:grpSpPr>
+        <a:xfrm>
+          <a:off x="0" y="0"/>
+          <a:ext cx="0" cy="0"/>
+          <a:chOff x="0" y="0"/>
+          <a:chExt cx="0" cy="0"/>
+        </a:xfrm>
+      </p:grpSpPr>
+      <p:sp>
+        <p:nvSpPr>
           <p:cNvPr id="68612" name="Rectangle 4"/>
           <p:cNvSpPr>
             <a:spLocks noGrp="1" noChangeArrowheads="1"/>
@@ -34138,7 +34311,7 @@
 </p:sld>
 </file>
 
-<file path=ppt/slides/slide12.xml><?xml version="1.0" encoding="utf-8"?>
+<file path=ppt/slides/slide13.xml><?xml version="1.0" encoding="utf-8"?>
 <p:sld xmlns:a="http://schemas.openxmlformats.org/drawingml/2006/main" xmlns:r="http://schemas.openxmlformats.org/officeDocument/2006/relationships" xmlns:p="http://schemas.openxmlformats.org/presentationml/2006/main">
   <p:cSld>
     <p:spTree>
@@ -34495,7 +34668,7 @@
 </p:sld>
 </file>
 
-<file path=ppt/slides/slide13.xml><?xml version="1.0" encoding="utf-8"?>
+<file path=ppt/slides/slide14.xml><?xml version="1.0" encoding="utf-8"?>
 <p:sld xmlns:a="http://schemas.openxmlformats.org/drawingml/2006/main" xmlns:r="http://schemas.openxmlformats.org/officeDocument/2006/relationships" xmlns:p="http://schemas.openxmlformats.org/presentationml/2006/main">
   <p:cSld>
     <p:spTree>
@@ -34762,7 +34935,7 @@
 </p:sld>
 </file>
 
-<file path=ppt/slides/slide14.xml><?xml version="1.0" encoding="utf-8"?>
+<file path=ppt/slides/slide15.xml><?xml version="1.0" encoding="utf-8"?>
 <p:sld xmlns:a="http://schemas.openxmlformats.org/drawingml/2006/main" xmlns:r="http://schemas.openxmlformats.org/officeDocument/2006/relationships" xmlns:p="http://schemas.openxmlformats.org/presentationml/2006/main">
   <p:cSld>
     <p:spTree>
@@ -34880,7 +35053,7 @@
 </p:sld>
 </file>
 
-<file path=ppt/slides/slide15.xml><?xml version="1.0" encoding="utf-8"?>
+<file path=ppt/slides/slide16.xml><?xml version="1.0" encoding="utf-8"?>
 <p:sld xmlns:a="http://schemas.openxmlformats.org/drawingml/2006/main" xmlns:r="http://schemas.openxmlformats.org/officeDocument/2006/relationships" xmlns:p="http://schemas.openxmlformats.org/presentationml/2006/main">
   <p:cSld>
     <p:spTree>
@@ -35245,7 +35418,7 @@
 </p:sld>
 </file>
 
-<file path=ppt/slides/slide16.xml><?xml version="1.0" encoding="utf-8"?>
+<file path=ppt/slides/slide17.xml><?xml version="1.0" encoding="utf-8"?>
 <p:sld xmlns:a="http://schemas.openxmlformats.org/drawingml/2006/main" xmlns:r="http://schemas.openxmlformats.org/officeDocument/2006/relationships" xmlns:p="http://schemas.openxmlformats.org/presentationml/2006/main">
   <p:cSld>
     <p:spTree>
@@ -35363,7 +35536,7 @@
 </p:sld>
 </file>
 
-<file path=ppt/slides/slide17.xml><?xml version="1.0" encoding="utf-8"?>
+<file path=ppt/slides/slide18.xml><?xml version="1.0" encoding="utf-8"?>
 <p:sld xmlns:a="http://schemas.openxmlformats.org/drawingml/2006/main" xmlns:r="http://schemas.openxmlformats.org/officeDocument/2006/relationships" xmlns:p="http://schemas.openxmlformats.org/presentationml/2006/main">
   <p:cSld>
     <p:spTree>
@@ -35571,7 +35744,7 @@
 </p:sld>
 </file>
 
-<file path=ppt/slides/slide18.xml><?xml version="1.0" encoding="utf-8"?>
+<file path=ppt/slides/slide19.xml><?xml version="1.0" encoding="utf-8"?>
 <p:sld xmlns:a="http://schemas.openxmlformats.org/drawingml/2006/main" xmlns:r="http://schemas.openxmlformats.org/officeDocument/2006/relationships" xmlns:p="http://schemas.openxmlformats.org/presentationml/2006/main">
   <p:cSld>
     <p:spTree>
@@ -35689,173 +35862,6 @@
 </p:sld>
 </file>
 
-<file path=ppt/slides/slide19.xml><?xml version="1.0" encoding="utf-8"?>
-<p:sld xmlns:a="http://schemas.openxmlformats.org/drawingml/2006/main" xmlns:r="http://schemas.openxmlformats.org/officeDocument/2006/relationships" xmlns:p="http://schemas.openxmlformats.org/presentationml/2006/main">
-  <p:cSld>
-    <p:spTree>
-      <p:nvGrpSpPr>
-        <p:cNvPr id="1" name=""/>
-        <p:cNvGrpSpPr/>
-        <p:nvPr/>
-      </p:nvGrpSpPr>
-      <p:grpSpPr>
-        <a:xfrm>
-          <a:off x="0" y="0"/>
-          <a:ext cx="0" cy="0"/>
-          <a:chOff x="0" y="0"/>
-          <a:chExt cx="0" cy="0"/>
-        </a:xfrm>
-      </p:grpSpPr>
-      <p:sp>
-        <p:nvSpPr>
-          <p:cNvPr id="2" name="Title 1">
-            <a:extLst>
-              <a:ext uri="{FF2B5EF4-FFF2-40B4-BE49-F238E27FC236}">
-                <a16:creationId xmlns:a16="http://schemas.microsoft.com/office/drawing/2014/main" id="{31790845-F67D-AF4F-8F84-73CBC58AA2A9}"/>
-              </a:ext>
-            </a:extLst>
-          </p:cNvPr>
-          <p:cNvSpPr>
-            <a:spLocks noGrp="1"/>
-          </p:cNvSpPr>
-          <p:nvPr>
-            <p:ph type="title"/>
-          </p:nvPr>
-        </p:nvSpPr>
-        <p:spPr/>
-        <p:txBody>
-          <a:bodyPr/>
-          <a:lstStyle/>
-          <a:p>
-            <a:r>
-              <a:rPr lang="en-US" dirty="0"/>
-              <a:t>Statistical Analysis</a:t>
-            </a:r>
-          </a:p>
-        </p:txBody>
-      </p:sp>
-      <p:sp>
-        <p:nvSpPr>
-          <p:cNvPr id="3" name="Content Placeholder 2">
-            <a:extLst>
-              <a:ext uri="{FF2B5EF4-FFF2-40B4-BE49-F238E27FC236}">
-                <a16:creationId xmlns:a16="http://schemas.microsoft.com/office/drawing/2014/main" id="{542141AB-B886-B943-839A-96F6DFDE012E}"/>
-              </a:ext>
-            </a:extLst>
-          </p:cNvPr>
-          <p:cNvSpPr>
-            <a:spLocks noGrp="1"/>
-          </p:cNvSpPr>
-          <p:nvPr>
-            <p:ph idx="1"/>
-          </p:nvPr>
-        </p:nvSpPr>
-        <p:spPr/>
-        <p:txBody>
-          <a:bodyPr/>
-          <a:lstStyle/>
-          <a:p>
-            <a:r>
-              <a:rPr lang="en-US" dirty="0"/>
-              <a:t>Looking at plots is great</a:t>
-            </a:r>
-          </a:p>
-          <a:p>
-            <a:r>
-              <a:rPr lang="en-US" dirty="0"/>
-              <a:t>Let’s quantify data instead</a:t>
-            </a:r>
-          </a:p>
-          <a:p>
-            <a:endParaRPr lang="en-US" dirty="0"/>
-          </a:p>
-          <a:p>
-            <a:r>
-              <a:rPr lang="en-US" dirty="0"/>
-              <a:t>New model: </a:t>
-            </a:r>
-            <a:r>
-              <a:rPr lang="en-US" dirty="0" err="1"/>
-              <a:t>BasicStatistics</a:t>
-            </a:r>
-            <a:r>
-              <a:rPr lang="en-US" dirty="0"/>
-              <a:t> </a:t>
-            </a:r>
-            <a:r>
-              <a:rPr lang="en-US" dirty="0" err="1"/>
-              <a:t>PostProcessor</a:t>
-            </a:r>
-            <a:endParaRPr lang="en-US" dirty="0"/>
-          </a:p>
-          <a:p>
-            <a:pPr lvl="1"/>
-            <a:r>
-              <a:rPr lang="en-US" dirty="0"/>
-              <a:t>Calculates statistics</a:t>
-            </a:r>
-          </a:p>
-          <a:p>
-            <a:pPr lvl="2"/>
-            <a:r>
-              <a:rPr lang="en-US" dirty="0"/>
-              <a:t>Mean, standard deviation, variance, skewness, kurtosis</a:t>
-            </a:r>
-          </a:p>
-          <a:p>
-            <a:pPr lvl="2"/>
-            <a:r>
-              <a:rPr lang="en-US" dirty="0"/>
-              <a:t>Percentiles, minimum, maximum</a:t>
-            </a:r>
-          </a:p>
-          <a:p>
-            <a:pPr lvl="1"/>
-            <a:r>
-              <a:rPr lang="en-US" dirty="0"/>
-              <a:t>Calculation sensitivities and relationships</a:t>
-            </a:r>
-          </a:p>
-          <a:p>
-            <a:pPr lvl="2"/>
-            <a:r>
-              <a:rPr lang="en-US" dirty="0"/>
-              <a:t>Sensitivity</a:t>
-            </a:r>
-          </a:p>
-          <a:p>
-            <a:pPr lvl="2"/>
-            <a:r>
-              <a:rPr lang="en-US" dirty="0"/>
-              <a:t>Covariance</a:t>
-            </a:r>
-          </a:p>
-          <a:p>
-            <a:pPr lvl="2"/>
-            <a:r>
-              <a:rPr lang="en-US" dirty="0"/>
-              <a:t>Pearson correlation</a:t>
-            </a:r>
-          </a:p>
-          <a:p>
-            <a:pPr lvl="2"/>
-            <a:endParaRPr lang="en-US" dirty="0"/>
-          </a:p>
-        </p:txBody>
-      </p:sp>
-    </p:spTree>
-    <p:extLst>
-      <p:ext uri="{BB962C8B-B14F-4D97-AF65-F5344CB8AC3E}">
-        <p14:creationId xmlns:p14="http://schemas.microsoft.com/office/powerpoint/2010/main" val="3167714483"/>
-      </p:ext>
-    </p:extLst>
-  </p:cSld>
-  <p:clrMapOvr>
-    <a:masterClrMapping/>
-  </p:clrMapOvr>
-</p:sld>
-</file>
-
 <file path=ppt/slides/slide2.xml><?xml version="1.0" encoding="utf-8"?>
 <p:sld xmlns:a="http://schemas.openxmlformats.org/drawingml/2006/main" xmlns:r="http://schemas.openxmlformats.org/officeDocument/2006/relationships" xmlns:p="http://schemas.openxmlformats.org/presentationml/2006/main">
   <p:cSld>
@@ -36045,6 +36051,173 @@
           <p:cNvPr id="2" name="Title 1">
             <a:extLst>
               <a:ext uri="{FF2B5EF4-FFF2-40B4-BE49-F238E27FC236}">
+                <a16:creationId xmlns:a16="http://schemas.microsoft.com/office/drawing/2014/main" id="{31790845-F67D-AF4F-8F84-73CBC58AA2A9}"/>
+              </a:ext>
+            </a:extLst>
+          </p:cNvPr>
+          <p:cNvSpPr>
+            <a:spLocks noGrp="1"/>
+          </p:cNvSpPr>
+          <p:nvPr>
+            <p:ph type="title"/>
+          </p:nvPr>
+        </p:nvSpPr>
+        <p:spPr/>
+        <p:txBody>
+          <a:bodyPr/>
+          <a:lstStyle/>
+          <a:p>
+            <a:r>
+              <a:rPr lang="en-US" dirty="0"/>
+              <a:t>Statistical Analysis</a:t>
+            </a:r>
+          </a:p>
+        </p:txBody>
+      </p:sp>
+      <p:sp>
+        <p:nvSpPr>
+          <p:cNvPr id="3" name="Content Placeholder 2">
+            <a:extLst>
+              <a:ext uri="{FF2B5EF4-FFF2-40B4-BE49-F238E27FC236}">
+                <a16:creationId xmlns:a16="http://schemas.microsoft.com/office/drawing/2014/main" id="{542141AB-B886-B943-839A-96F6DFDE012E}"/>
+              </a:ext>
+            </a:extLst>
+          </p:cNvPr>
+          <p:cNvSpPr>
+            <a:spLocks noGrp="1"/>
+          </p:cNvSpPr>
+          <p:nvPr>
+            <p:ph idx="1"/>
+          </p:nvPr>
+        </p:nvSpPr>
+        <p:spPr/>
+        <p:txBody>
+          <a:bodyPr/>
+          <a:lstStyle/>
+          <a:p>
+            <a:r>
+              <a:rPr lang="en-US" dirty="0"/>
+              <a:t>Looking at plots is great</a:t>
+            </a:r>
+          </a:p>
+          <a:p>
+            <a:r>
+              <a:rPr lang="en-US" dirty="0"/>
+              <a:t>Let’s quantify data instead</a:t>
+            </a:r>
+          </a:p>
+          <a:p>
+            <a:endParaRPr lang="en-US" dirty="0"/>
+          </a:p>
+          <a:p>
+            <a:r>
+              <a:rPr lang="en-US" dirty="0"/>
+              <a:t>New model: </a:t>
+            </a:r>
+            <a:r>
+              <a:rPr lang="en-US" dirty="0" err="1"/>
+              <a:t>BasicStatistics</a:t>
+            </a:r>
+            <a:r>
+              <a:rPr lang="en-US" dirty="0"/>
+              <a:t> </a:t>
+            </a:r>
+            <a:r>
+              <a:rPr lang="en-US" dirty="0" err="1"/>
+              <a:t>PostProcessor</a:t>
+            </a:r>
+            <a:endParaRPr lang="en-US" dirty="0"/>
+          </a:p>
+          <a:p>
+            <a:pPr lvl="1"/>
+            <a:r>
+              <a:rPr lang="en-US" dirty="0"/>
+              <a:t>Calculates statistics</a:t>
+            </a:r>
+          </a:p>
+          <a:p>
+            <a:pPr lvl="2"/>
+            <a:r>
+              <a:rPr lang="en-US" dirty="0"/>
+              <a:t>Mean, standard deviation, variance, skewness, kurtosis</a:t>
+            </a:r>
+          </a:p>
+          <a:p>
+            <a:pPr lvl="2"/>
+            <a:r>
+              <a:rPr lang="en-US" dirty="0"/>
+              <a:t>Percentiles, minimum, maximum</a:t>
+            </a:r>
+          </a:p>
+          <a:p>
+            <a:pPr lvl="1"/>
+            <a:r>
+              <a:rPr lang="en-US" dirty="0"/>
+              <a:t>Calculation sensitivities and relationships</a:t>
+            </a:r>
+          </a:p>
+          <a:p>
+            <a:pPr lvl="2"/>
+            <a:r>
+              <a:rPr lang="en-US" dirty="0"/>
+              <a:t>Sensitivity</a:t>
+            </a:r>
+          </a:p>
+          <a:p>
+            <a:pPr lvl="2"/>
+            <a:r>
+              <a:rPr lang="en-US" dirty="0"/>
+              <a:t>Covariance</a:t>
+            </a:r>
+          </a:p>
+          <a:p>
+            <a:pPr lvl="2"/>
+            <a:r>
+              <a:rPr lang="en-US" dirty="0"/>
+              <a:t>Pearson correlation</a:t>
+            </a:r>
+          </a:p>
+          <a:p>
+            <a:pPr lvl="2"/>
+            <a:endParaRPr lang="en-US" dirty="0"/>
+          </a:p>
+        </p:txBody>
+      </p:sp>
+    </p:spTree>
+    <p:extLst>
+      <p:ext uri="{BB962C8B-B14F-4D97-AF65-F5344CB8AC3E}">
+        <p14:creationId xmlns:p14="http://schemas.microsoft.com/office/powerpoint/2010/main" val="3167714483"/>
+      </p:ext>
+    </p:extLst>
+  </p:cSld>
+  <p:clrMapOvr>
+    <a:masterClrMapping/>
+  </p:clrMapOvr>
+</p:sld>
+</file>
+
+<file path=ppt/slides/slide21.xml><?xml version="1.0" encoding="utf-8"?>
+<p:sld xmlns:a="http://schemas.openxmlformats.org/drawingml/2006/main" xmlns:r="http://schemas.openxmlformats.org/officeDocument/2006/relationships" xmlns:p="http://schemas.openxmlformats.org/presentationml/2006/main">
+  <p:cSld>
+    <p:spTree>
+      <p:nvGrpSpPr>
+        <p:cNvPr id="1" name=""/>
+        <p:cNvGrpSpPr/>
+        <p:nvPr/>
+      </p:nvGrpSpPr>
+      <p:grpSpPr>
+        <a:xfrm>
+          <a:off x="0" y="0"/>
+          <a:ext cx="0" cy="0"/>
+          <a:chOff x="0" y="0"/>
+          <a:chExt cx="0" cy="0"/>
+        </a:xfrm>
+      </p:grpSpPr>
+      <p:sp>
+        <p:nvSpPr>
+          <p:cNvPr id="2" name="Title 1">
+            <a:extLst>
+              <a:ext uri="{FF2B5EF4-FFF2-40B4-BE49-F238E27FC236}">
                 <a16:creationId xmlns:a16="http://schemas.microsoft.com/office/drawing/2014/main" id="{73FFE82A-22A1-2342-AF75-D43BF35B3B56}"/>
               </a:ext>
             </a:extLst>
@@ -36213,7 +36386,7 @@
 </p:sld>
 </file>
 
-<file path=ppt/slides/slide21.xml><?xml version="1.0" encoding="utf-8"?>
+<file path=ppt/slides/slide22.xml><?xml version="1.0" encoding="utf-8"?>
 <p:sld xmlns:a="http://schemas.openxmlformats.org/drawingml/2006/main" xmlns:r="http://schemas.openxmlformats.org/officeDocument/2006/relationships" xmlns:p="http://schemas.openxmlformats.org/presentationml/2006/main">
   <p:cSld>
     <p:spTree>
@@ -36664,7 +36837,7 @@
 </p:sld>
 </file>
 
-<file path=ppt/slides/slide22.xml><?xml version="1.0" encoding="utf-8"?>
+<file path=ppt/slides/slide23.xml><?xml version="1.0" encoding="utf-8"?>
 <p:sld xmlns:a="http://schemas.openxmlformats.org/drawingml/2006/main" xmlns:r="http://schemas.openxmlformats.org/officeDocument/2006/relationships" xmlns:p="http://schemas.openxmlformats.org/presentationml/2006/main">
   <p:cSld>
     <p:spTree>
@@ -36760,7 +36933,7 @@
             <a:pPr lvl="1"/>
             <a:r>
               <a:rPr lang="en-US" dirty="0"/>
-              <a:t>Curious behaviors?</a:t>
+              <a:t>Curious results?</a:t>
             </a:r>
           </a:p>
           <a:p>
@@ -37157,8 +37330,8 @@
           </a:p>
         </p:txBody>
       </p:sp>
-      <mc:AlternateContent xmlns:mc="http://schemas.openxmlformats.org/markup-compatibility/2006">
-        <mc:Choice xmlns:a14="http://schemas.microsoft.com/office/drawing/2010/main" Requires="a14">
+      <mc:AlternateContent xmlns:mc="http://schemas.openxmlformats.org/markup-compatibility/2006" xmlns:a14="http://schemas.microsoft.com/office/drawing/2010/main">
+        <mc:Choice Requires="a14">
           <p:sp>
             <p:nvSpPr>
               <p:cNvPr id="3" name="Content Placeholder 2">
@@ -37446,7 +37619,7 @@
             </p:txBody>
           </p:sp>
         </mc:Choice>
-        <mc:Fallback>
+        <mc:Fallback xmlns="">
           <p:sp>
             <p:nvSpPr>
               <p:cNvPr id="3" name="Content Placeholder 2">

</xml_diff>

<commit_message>
not agg unless no display
</commit_message>
<xml_diff>
--- a/doc/workshop/forwardSampling/ForwardSampling.pptx
+++ b/doc/workshop/forwardSampling/ForwardSampling.pptx
@@ -37197,8 +37197,23 @@
                 </a:solidFill>
                 <a:latin typeface="Lucida Console" panose="020B0609040504020204" pitchFamily="49" charset="0"/>
               </a:rPr>
-              <a:t>git checkout workshop_2018</a:t>
-            </a:r>
+              <a:t>git checkout </a:t>
+            </a:r>
+            <a:r>
+              <a:rPr lang="en-US" sz="1800" dirty="0" err="1">
+                <a:solidFill>
+                  <a:schemeClr val="bg1"/>
+                </a:solidFill>
+                <a:latin typeface="Lucida Console" panose="020B0609040504020204" pitchFamily="49" charset="0"/>
+              </a:rPr>
+              <a:t>devel</a:t>
+            </a:r>
+            <a:endParaRPr lang="en-US" sz="1800" dirty="0">
+              <a:solidFill>
+                <a:schemeClr val="bg1"/>
+              </a:solidFill>
+              <a:latin typeface="Lucida Console" panose="020B0609040504020204" pitchFamily="49" charset="0"/>
+            </a:endParaRPr>
           </a:p>
           <a:p>
             <a:pPr marL="0" indent="0">
@@ -37342,8 +37357,8 @@
           </a:p>
         </p:txBody>
       </p:sp>
-      <mc:AlternateContent xmlns:mc="http://schemas.openxmlformats.org/markup-compatibility/2006" xmlns:a14="http://schemas.microsoft.com/office/drawing/2010/main">
-        <mc:Choice Requires="a14">
+      <mc:AlternateContent xmlns:mc="http://schemas.openxmlformats.org/markup-compatibility/2006">
+        <mc:Choice xmlns:a14="http://schemas.microsoft.com/office/drawing/2010/main" Requires="a14">
           <p:sp>
             <p:nvSpPr>
               <p:cNvPr id="3" name="Content Placeholder 2">
@@ -37631,7 +37646,7 @@
             </p:txBody>
           </p:sp>
         </mc:Choice>
-        <mc:Fallback xmlns="">
+        <mc:Fallback>
           <p:sp>
             <p:nvSpPr>
               <p:cNvPr id="3" name="Content Placeholder 2">
@@ -37789,24 +37804,8 @@
           <a:p>
             <a:pPr lvl="1"/>
             <a:r>
-              <a:rPr lang="en-US" dirty="0" err="1"/>
-              <a:t>conda</a:t>
-            </a:r>
-            <a:r>
               <a:rPr lang="en-US" dirty="0"/>
-              <a:t> activate </a:t>
-            </a:r>
-            <a:r>
-              <a:rPr lang="en-US" dirty="0" err="1"/>
-              <a:t>raven_libraries</a:t>
-            </a:r>
-            <a:endParaRPr lang="en-US" dirty="0"/>
-          </a:p>
-          <a:p>
-            <a:pPr lvl="1"/>
-            <a:r>
-              <a:rPr lang="en-US" dirty="0"/>
-              <a:t>Windows: use </a:t>
+              <a:t>MSYS Windows: use </a:t>
             </a:r>
             <a:r>
               <a:rPr lang="en-US" dirty="0" err="1"/>
@@ -37900,9 +37899,53 @@
           </a:bodyPr>
           <a:lstStyle/>
           <a:p>
-            <a:pPr marL="0" indent="0">
-              <a:buNone/>
-            </a:pPr>
+            <a:endParaRPr lang="en-US" sz="1800" dirty="0">
+              <a:latin typeface="Lucida Console" panose="020B0609040504020204" pitchFamily="49" charset="0"/>
+            </a:endParaRPr>
+          </a:p>
+          <a:p>
+            <a:r>
+              <a:rPr lang="en-US" sz="1800" dirty="0">
+                <a:latin typeface="Lucida Console" panose="020B0609040504020204" pitchFamily="49" charset="0"/>
+              </a:rPr>
+              <a:t>&gt;</a:t>
+            </a:r>
+            <a:r>
+              <a:rPr lang="en-US" sz="1800" dirty="0">
+                <a:solidFill>
+                  <a:schemeClr val="bg1"/>
+                </a:solidFill>
+                <a:latin typeface="Lucida Console" panose="020B0609040504020204" pitchFamily="49" charset="0"/>
+              </a:rPr>
+              <a:t> </a:t>
+            </a:r>
+            <a:r>
+              <a:rPr lang="en-US" sz="1800" dirty="0" err="1">
+                <a:solidFill>
+                  <a:schemeClr val="bg1"/>
+                </a:solidFill>
+                <a:latin typeface="Lucida Console" panose="020B0609040504020204" pitchFamily="49" charset="0"/>
+              </a:rPr>
+              <a:t>conda</a:t>
+            </a:r>
+            <a:r>
+              <a:rPr lang="en-US" sz="1800" dirty="0">
+                <a:solidFill>
+                  <a:schemeClr val="bg1"/>
+                </a:solidFill>
+                <a:latin typeface="Lucida Console" panose="020B0609040504020204" pitchFamily="49" charset="0"/>
+              </a:rPr>
+              <a:t> activate </a:t>
+            </a:r>
+            <a:r>
+              <a:rPr lang="en-US" sz="1800" dirty="0" err="1">
+                <a:solidFill>
+                  <a:schemeClr val="bg1"/>
+                </a:solidFill>
+                <a:latin typeface="Lucida Console" panose="020B0609040504020204" pitchFamily="49" charset="0"/>
+              </a:rPr>
+              <a:t>raven_libraries</a:t>
+            </a:r>
             <a:endParaRPr lang="en-US" sz="1800" dirty="0">
               <a:latin typeface="Lucida Console" panose="020B0609040504020204" pitchFamily="49" charset="0"/>
             </a:endParaRPr>
@@ -37953,17 +37996,6 @@
               </a:rPr>
               <a:t>projectile_model</a:t>
             </a:r>
-            <a:endParaRPr lang="en-US" sz="1800" dirty="0">
-              <a:solidFill>
-                <a:schemeClr val="bg1"/>
-              </a:solidFill>
-              <a:latin typeface="Lucida Console" panose="020B0609040504020204" pitchFamily="49" charset="0"/>
-            </a:endParaRPr>
-          </a:p>
-          <a:p>
-            <a:pPr marL="0" indent="0">
-              <a:buNone/>
-            </a:pPr>
             <a:endParaRPr lang="en-US" sz="1800" dirty="0">
               <a:latin typeface="Lucida Console" panose="020B0609040504020204" pitchFamily="49" charset="0"/>
             </a:endParaRPr>
@@ -38139,7 +38171,19 @@
           <a:p>
             <a:r>
               <a:rPr lang="en-US" dirty="0"/>
-              <a:t>Run my projectile code 1000 times</a:t>
+              <a:t>Run my </a:t>
+            </a:r>
+            <a:r>
+              <a:rPr lang="en-US" b="1" dirty="0">
+                <a:solidFill>
+                  <a:schemeClr val="accent1"/>
+                </a:solidFill>
+              </a:rPr>
+              <a:t>projectile</a:t>
+            </a:r>
+            <a:r>
+              <a:rPr lang="en-US" dirty="0"/>
+              <a:t> code 1000 times</a:t>
             </a:r>
           </a:p>
           <a:p>
@@ -38294,6 +38338,14 @@
           </a:p>
           <a:p>
             <a:pPr lvl="1"/>
+            <a:endParaRPr lang="en-US" dirty="0">
+              <a:solidFill>
+                <a:srgbClr val="0000FF"/>
+              </a:solidFill>
+            </a:endParaRPr>
+          </a:p>
+          <a:p>
+            <a:pPr lvl="1"/>
             <a:r>
               <a:rPr lang="en-US" dirty="0">
                 <a:solidFill>
@@ -38318,6 +38370,14 @@
               </a:rPr>
               <a:t>Entities</a:t>
             </a:r>
+          </a:p>
+          <a:p>
+            <a:pPr lvl="1"/>
+            <a:endParaRPr lang="en-US" dirty="0">
+              <a:solidFill>
+                <a:srgbClr val="0000FF"/>
+              </a:solidFill>
+            </a:endParaRPr>
           </a:p>
           <a:p>
             <a:pPr lvl="1"/>
@@ -38652,7 +38712,12 @@
             <p:ph idx="1"/>
           </p:nvPr>
         </p:nvSpPr>
-        <p:spPr/>
+        <p:spPr>
+          <a:xfrm>
+            <a:off x="455613" y="1608552"/>
+            <a:ext cx="8231187" cy="4524375"/>
+          </a:xfrm>
+        </p:spPr>
         <p:txBody>
           <a:bodyPr/>
           <a:lstStyle/>
@@ -38683,15 +38748,40 @@
           <a:p>
             <a:pPr lvl="1"/>
             <a:r>
+              <a:rPr lang="en-US" dirty="0" err="1"/>
+              <a:t>visualstudio</a:t>
+            </a:r>
+            <a:r>
               <a:rPr lang="en-US" dirty="0"/>
-              <a:t>notepad++</a:t>
+              <a:t> code</a:t>
             </a:r>
           </a:p>
           <a:p>
             <a:pPr lvl="1"/>
             <a:r>
+              <a:rPr lang="en-US" dirty="0"/>
+              <a:t>atom</a:t>
+            </a:r>
+          </a:p>
+          <a:p>
+            <a:pPr lvl="1"/>
+            <a:r>
+              <a:rPr lang="en-US" dirty="0"/>
+              <a:t>sublime</a:t>
+            </a:r>
+          </a:p>
+          <a:p>
+            <a:pPr lvl="1"/>
+            <a:r>
+              <a:rPr lang="en-US" dirty="0"/>
+              <a:t>notepad++</a:t>
+            </a:r>
+          </a:p>
+          <a:p>
+            <a:pPr lvl="1"/>
+            <a:r>
               <a:rPr lang="en-US" dirty="0" err="1"/>
-              <a:t>visualstudio</a:t>
+              <a:t>gedit</a:t>
             </a:r>
             <a:endParaRPr lang="en-US" dirty="0"/>
           </a:p>
@@ -38699,29 +38789,14 @@
             <a:pPr lvl="1"/>
             <a:r>
               <a:rPr lang="en-US" dirty="0"/>
-              <a:t>atom</a:t>
+              <a:t>vim</a:t>
             </a:r>
           </a:p>
           <a:p>
-            <a:pPr lvl="1"/>
-            <a:r>
-              <a:rPr lang="en-US" dirty="0"/>
-              <a:t>sublime</a:t>
-            </a:r>
-          </a:p>
-          <a:p>
-            <a:pPr lvl="1"/>
-            <a:r>
-              <a:rPr lang="en-US" dirty="0"/>
-              <a:t>emacs</a:t>
-            </a:r>
-          </a:p>
-          <a:p>
-            <a:pPr lvl="1"/>
-            <a:r>
-              <a:rPr lang="en-US" dirty="0"/>
-              <a:t>vim</a:t>
-            </a:r>
+            <a:pPr marL="0" indent="0">
+              <a:buNone/>
+            </a:pPr>
+            <a:endParaRPr lang="en-US" dirty="0"/>
           </a:p>
           <a:p>
             <a:pPr marL="0" indent="0">

</xml_diff>

<commit_message>
finished forward sampling ppt check
</commit_message>
<xml_diff>
--- a/doc/workshop/forwardSampling/ForwardSampling.pptx
+++ b/doc/workshop/forwardSampling/ForwardSampling.pptx
@@ -5,10 +5,10 @@
     <p:sldMasterId id="2147483648" r:id="rId1"/>
   </p:sldMasterIdLst>
   <p:notesMasterIdLst>
-    <p:notesMasterId r:id="rId25"/>
+    <p:notesMasterId r:id="rId26"/>
   </p:notesMasterIdLst>
   <p:handoutMasterIdLst>
-    <p:handoutMasterId r:id="rId26"/>
+    <p:handoutMasterId r:id="rId27"/>
   </p:handoutMasterIdLst>
   <p:sldIdLst>
     <p:sldId id="272" r:id="rId2"/>
@@ -34,6 +34,7 @@
     <p:sldId id="351" r:id="rId22"/>
     <p:sldId id="352" r:id="rId23"/>
     <p:sldId id="340" r:id="rId24"/>
+    <p:sldId id="354" r:id="rId25"/>
   </p:sldIdLst>
   <p:sldSz cx="9144000" cy="6858000" type="screen4x3"/>
   <p:notesSz cx="7010400" cy="9296400"/>
@@ -34008,6 +34009,42 @@
           </a:p>
         </p:txBody>
       </p:sp>
+      <p:pic>
+        <p:nvPicPr>
+          <p:cNvPr id="4" name="Picture 3">
+            <a:extLst>
+              <a:ext uri="{FF2B5EF4-FFF2-40B4-BE49-F238E27FC236}">
+                <a16:creationId xmlns:a16="http://schemas.microsoft.com/office/drawing/2014/main" id="{48D09649-34B7-6640-A277-C2EFCD2A071F}"/>
+              </a:ext>
+            </a:extLst>
+          </p:cNvPr>
+          <p:cNvPicPr>
+            <a:picLocks noChangeAspect="1"/>
+          </p:cNvPicPr>
+          <p:nvPr/>
+        </p:nvPicPr>
+        <p:blipFill>
+          <a:blip r:embed="rId2">
+            <a:extLst>
+              <a:ext uri="{28A0092B-C50C-407E-A947-70E740481C1C}">
+                <a14:useLocalDpi xmlns:a14="http://schemas.microsoft.com/office/drawing/2010/main" val="0"/>
+              </a:ext>
+            </a:extLst>
+          </a:blip>
+          <a:stretch>
+            <a:fillRect/>
+          </a:stretch>
+        </p:blipFill>
+        <p:spPr>
+          <a:xfrm>
+            <a:off x="4702824" y="3562183"/>
+            <a:ext cx="3398078" cy="2548559"/>
+          </a:xfrm>
+          <a:prstGeom prst="rect">
+            <a:avLst/>
+          </a:prstGeom>
+        </p:spPr>
+      </p:pic>
     </p:spTree>
     <p:extLst>
       <p:ext uri="{BB962C8B-B14F-4D97-AF65-F5344CB8AC3E}">
@@ -34390,36 +34427,6 @@
             <a:pPr lvl="1"/>
             <a:r>
               <a:rPr lang="en-US" dirty="0"/>
-              <a:t>Choose one:</a:t>
-            </a:r>
-          </a:p>
-          <a:p>
-            <a:pPr lvl="2"/>
-            <a:r>
-              <a:rPr lang="en-US" dirty="0"/>
-              <a:t>Compile manually (requires </a:t>
-            </a:r>
-            <a:r>
-              <a:rPr lang="en-US" dirty="0" err="1"/>
-              <a:t>TeX</a:t>
-            </a:r>
-            <a:r>
-              <a:rPr lang="en-US" dirty="0"/>
-              <a:t>)</a:t>
-            </a:r>
-          </a:p>
-          <a:p>
-            <a:pPr lvl="1"/>
-            <a:endParaRPr lang="en-US" dirty="0"/>
-          </a:p>
-          <a:p>
-            <a:pPr lvl="1"/>
-            <a:endParaRPr lang="en-US" dirty="0"/>
-          </a:p>
-          <a:p>
-            <a:pPr lvl="2"/>
-            <a:r>
-              <a:rPr lang="en-US" dirty="0"/>
               <a:t>Download from RAVEN wiki</a:t>
             </a:r>
           </a:p>
@@ -34466,100 +34473,18 @@
             <a:endParaRPr lang="en-US" dirty="0"/>
           </a:p>
           <a:p>
+            <a:endParaRPr lang="en-US" dirty="0"/>
+          </a:p>
+          <a:p>
+            <a:endParaRPr lang="en-US" dirty="0"/>
+          </a:p>
+          <a:p>
+            <a:endParaRPr lang="en-US" dirty="0"/>
+          </a:p>
+          <a:p>
             <a:r>
               <a:rPr lang="en-US" dirty="0"/>
               <a:t>New input file:</a:t>
-            </a:r>
-          </a:p>
-        </p:txBody>
-      </p:sp>
-      <p:sp>
-        <p:nvSpPr>
-          <p:cNvPr id="4" name="TextBox 3">
-            <a:extLst>
-              <a:ext uri="{FF2B5EF4-FFF2-40B4-BE49-F238E27FC236}">
-                <a16:creationId xmlns:a16="http://schemas.microsoft.com/office/drawing/2014/main" id="{59E78FA9-D427-9E4D-AABA-A74CA60C46D5}"/>
-              </a:ext>
-            </a:extLst>
-          </p:cNvPr>
-          <p:cNvSpPr txBox="1"/>
-          <p:nvPr/>
-        </p:nvSpPr>
-        <p:spPr>
-          <a:xfrm>
-            <a:off x="2034883" y="2521413"/>
-            <a:ext cx="5665073" cy="646331"/>
-          </a:xfrm>
-          <a:prstGeom prst="rect">
-            <a:avLst/>
-          </a:prstGeom>
-          <a:solidFill>
-            <a:schemeClr val="bg1">
-              <a:lumMod val="50000"/>
-            </a:schemeClr>
-          </a:solidFill>
-        </p:spPr>
-        <p:txBody>
-          <a:bodyPr wrap="square" rtlCol="0">
-            <a:spAutoFit/>
-          </a:bodyPr>
-          <a:lstStyle/>
-          <a:p>
-            <a:pPr marL="0" indent="0">
-              <a:buNone/>
-            </a:pPr>
-            <a:r>
-              <a:rPr lang="en-US" sz="1800" dirty="0">
-                <a:latin typeface="Lucida Console" panose="020B0609040504020204" pitchFamily="49" charset="0"/>
-              </a:rPr>
-              <a:t>&gt;</a:t>
-            </a:r>
-            <a:r>
-              <a:rPr lang="en-US" sz="1800" dirty="0">
-                <a:solidFill>
-                  <a:schemeClr val="bg1"/>
-                </a:solidFill>
-                <a:latin typeface="Lucida Console" panose="020B0609040504020204" pitchFamily="49" charset="0"/>
-              </a:rPr>
-              <a:t> cd raven/doc/</a:t>
-            </a:r>
-          </a:p>
-          <a:p>
-            <a:pPr marL="0" indent="0">
-              <a:buNone/>
-            </a:pPr>
-            <a:r>
-              <a:rPr lang="en-US" sz="1800" dirty="0">
-                <a:latin typeface="Lucida Console" panose="020B0609040504020204" pitchFamily="49" charset="0"/>
-              </a:rPr>
-              <a:t>&gt;</a:t>
-            </a:r>
-            <a:r>
-              <a:rPr lang="en-US" sz="1800" dirty="0">
-                <a:solidFill>
-                  <a:schemeClr val="bg1"/>
-                </a:solidFill>
-                <a:latin typeface="Lucida Console" panose="020B0609040504020204" pitchFamily="49" charset="0"/>
-              </a:rPr>
-              <a:t> ./</a:t>
-            </a:r>
-            <a:r>
-              <a:rPr lang="en-US" sz="1800" dirty="0" err="1">
-                <a:solidFill>
-                  <a:schemeClr val="bg1"/>
-                </a:solidFill>
-                <a:latin typeface="Lucida Console" panose="020B0609040504020204" pitchFamily="49" charset="0"/>
-              </a:rPr>
-              <a:t>make_docs.sh</a:t>
-            </a:r>
-            <a:r>
-              <a:rPr lang="en-US" sz="1800" dirty="0">
-                <a:solidFill>
-                  <a:schemeClr val="bg1"/>
-                </a:solidFill>
-                <a:latin typeface="Lucida Console" panose="020B0609040504020204" pitchFamily="49" charset="0"/>
-              </a:rPr>
-              <a:t> --verbose</a:t>
             </a:r>
           </a:p>
         </p:txBody>
@@ -34893,7 +34818,7 @@
             <a:pPr lvl="1"/>
             <a:r>
               <a:rPr lang="en-US" dirty="0"/>
-              <a:t>See section 11.1.1.8</a:t>
+              <a:t>See section 9.1.1.8</a:t>
             </a:r>
           </a:p>
           <a:p>
@@ -35712,8 +35637,28 @@
               <a:t>nodes, also remove </a:t>
             </a:r>
             <a:r>
-              <a:rPr lang="en-US" dirty="0" err="1"/>
+              <a:rPr lang="en-US" dirty="0">
+                <a:solidFill>
+                  <a:schemeClr val="accent2"/>
+                </a:solidFill>
+              </a:rPr>
+              <a:t>&lt;</a:t>
+            </a:r>
+            <a:r>
+              <a:rPr lang="en-US" dirty="0" err="1">
+                <a:solidFill>
+                  <a:schemeClr val="accent2"/>
+                </a:solidFill>
+              </a:rPr>
               <a:t>samplerInit</a:t>
+            </a:r>
+            <a:r>
+              <a:rPr lang="en-US" dirty="0">
+                <a:solidFill>
+                  <a:schemeClr val="accent2"/>
+                </a:solidFill>
+              </a:rPr>
+              <a:t>&gt;</a:t>
             </a:r>
             <a:r>
               <a:rPr lang="en-US" dirty="0"/>
@@ -36969,18 +36914,12 @@
             <a:pPr lvl="1"/>
             <a:r>
               <a:rPr lang="en-US" dirty="0"/>
-              <a:t>task-oriented input design</a:t>
+              <a:t>task-oriented </a:t>
             </a:r>
-          </a:p>
-          <a:p>
-            <a:pPr lvl="1"/>
             <a:r>
-              <a:rPr lang="en-US" dirty="0"/>
-              <a:t>sandbox time</a:t>
+              <a:rPr lang="en-US"/>
+              <a:t>input design</a:t>
             </a:r>
-          </a:p>
-          <a:p>
-            <a:pPr lvl="1"/>
             <a:endParaRPr lang="en-US" dirty="0"/>
           </a:p>
           <a:p>
@@ -36992,6 +36931,70 @@
     <p:extLst>
       <p:ext uri="{BB962C8B-B14F-4D97-AF65-F5344CB8AC3E}">
         <p14:creationId xmlns:p14="http://schemas.microsoft.com/office/powerpoint/2010/main" val="3202115832"/>
+      </p:ext>
+    </p:extLst>
+  </p:cSld>
+  <p:clrMapOvr>
+    <a:masterClrMapping/>
+  </p:clrMapOvr>
+</p:sld>
+</file>
+
+<file path=ppt/slides/slide24.xml><?xml version="1.0" encoding="utf-8"?>
+<p:sld xmlns:a="http://schemas.openxmlformats.org/drawingml/2006/main" xmlns:r="http://schemas.openxmlformats.org/officeDocument/2006/relationships" xmlns:p="http://schemas.openxmlformats.org/presentationml/2006/main">
+  <p:cSld>
+    <p:spTree>
+      <p:nvGrpSpPr>
+        <p:cNvPr id="1" name=""/>
+        <p:cNvGrpSpPr/>
+        <p:nvPr/>
+      </p:nvGrpSpPr>
+      <p:grpSpPr>
+        <a:xfrm>
+          <a:off x="0" y="0"/>
+          <a:ext cx="0" cy="0"/>
+          <a:chOff x="0" y="0"/>
+          <a:chExt cx="0" cy="0"/>
+        </a:xfrm>
+      </p:grpSpPr>
+      <p:pic>
+        <p:nvPicPr>
+          <p:cNvPr id="6" name="Picture 6" descr="raven.gif"/>
+          <p:cNvPicPr>
+            <a:picLocks noChangeAspect="1"/>
+          </p:cNvPicPr>
+          <p:nvPr/>
+        </p:nvPicPr>
+        <p:blipFill>
+          <a:blip r:embed="rId2">
+            <a:alphaModFix amt="32000"/>
+          </a:blip>
+          <a:srcRect/>
+          <a:stretch>
+            <a:fillRect/>
+          </a:stretch>
+        </p:blipFill>
+        <p:spPr bwMode="auto">
+          <a:xfrm>
+            <a:off x="2866117" y="1659836"/>
+            <a:ext cx="5068549" cy="3801412"/>
+          </a:xfrm>
+          <a:prstGeom prst="rect">
+            <a:avLst/>
+          </a:prstGeom>
+          <a:noFill/>
+          <a:ln w="9525">
+            <a:noFill/>
+            <a:miter lim="800000"/>
+            <a:headEnd/>
+            <a:tailEnd/>
+          </a:ln>
+        </p:spPr>
+      </p:pic>
+    </p:spTree>
+    <p:extLst>
+      <p:ext uri="{BB962C8B-B14F-4D97-AF65-F5344CB8AC3E}">
+        <p14:creationId xmlns:p14="http://schemas.microsoft.com/office/powerpoint/2010/main" val="3418297523"/>
       </p:ext>
     </p:extLst>
   </p:cSld>
@@ -37494,7 +37497,7 @@
                 <a14:m>
                   <m:oMath xmlns:m="http://schemas.openxmlformats.org/officeDocument/2006/math">
                     <m:r>
-                      <a:rPr lang="en-US" b="0" i="1" smtClean="0">
+                      <a:rPr lang="en-US" i="1">
                         <a:latin typeface="Cambria Math" panose="02040503050406030204" pitchFamily="18" charset="0"/>
                       </a:rPr>
                       <m:t>𝜃</m:t>
@@ -38280,246 +38283,347 @@
           </a:p>
         </p:txBody>
       </p:sp>
-      <p:sp>
-        <p:nvSpPr>
-          <p:cNvPr id="70659" name="Rectangle 3"/>
-          <p:cNvSpPr>
-            <a:spLocks noGrp="1" noChangeArrowheads="1"/>
-          </p:cNvSpPr>
-          <p:nvPr>
-            <p:ph type="body" idx="1"/>
-          </p:nvPr>
-        </p:nvSpPr>
-        <p:spPr/>
-        <p:txBody>
-          <a:bodyPr/>
-          <a:lstStyle/>
-          <a:p>
-            <a:pPr>
-              <a:spcAft>
-                <a:spcPts val="1200"/>
-              </a:spcAft>
-            </a:pPr>
-            <a:r>
-              <a:rPr lang="en-US" dirty="0"/>
-              <a:t>RAVEN perspective</a:t>
-            </a:r>
-          </a:p>
-          <a:p>
-            <a:pPr lvl="1"/>
-            <a:r>
-              <a:rPr lang="en-US" dirty="0">
-                <a:solidFill>
-                  <a:srgbClr val="0000FF"/>
-                </a:solidFill>
-              </a:rPr>
-              <a:t>&lt;</a:t>
-            </a:r>
-            <a:r>
-              <a:rPr lang="en-US" dirty="0" err="1">
-                <a:solidFill>
-                  <a:srgbClr val="0000FF"/>
-                </a:solidFill>
-              </a:rPr>
-              <a:t>RunInfo</a:t>
-            </a:r>
-            <a:r>
-              <a:rPr lang="en-US" dirty="0">
-                <a:solidFill>
-                  <a:srgbClr val="0000FF"/>
-                </a:solidFill>
-              </a:rPr>
-              <a:t>&gt;	</a:t>
-            </a:r>
-            <a:r>
-              <a:rPr lang="en-US" dirty="0"/>
-              <a:t>Set up the environment, sequence             </a:t>
-            </a:r>
-          </a:p>
-          <a:p>
-            <a:pPr lvl="1"/>
-            <a:endParaRPr lang="en-US" dirty="0">
-              <a:solidFill>
-                <a:srgbClr val="0000FF"/>
-              </a:solidFill>
-            </a:endParaRPr>
-          </a:p>
-          <a:p>
-            <a:pPr lvl="1"/>
-            <a:r>
-              <a:rPr lang="en-US" dirty="0">
-                <a:solidFill>
-                  <a:srgbClr val="0000FF"/>
-                </a:solidFill>
-              </a:rPr>
-              <a:t>&lt;Steps&gt; 		</a:t>
-            </a:r>
-            <a:r>
-              <a:rPr lang="en-US" dirty="0">
-                <a:solidFill>
-                  <a:srgbClr val="000000"/>
-                </a:solidFill>
-              </a:rPr>
-              <a:t>Combine the </a:t>
-            </a:r>
-            <a:r>
-              <a:rPr lang="en-US" dirty="0">
-                <a:solidFill>
-                  <a:schemeClr val="accent2"/>
-                </a:solidFill>
-              </a:rPr>
-              <a:t>Entities</a:t>
-            </a:r>
-          </a:p>
-          <a:p>
-            <a:pPr lvl="1"/>
-            <a:endParaRPr lang="en-US" dirty="0">
-              <a:solidFill>
-                <a:srgbClr val="0000FF"/>
-              </a:solidFill>
-            </a:endParaRPr>
-          </a:p>
-          <a:p>
-            <a:pPr lvl="1"/>
-            <a:r>
-              <a:rPr lang="en-US" dirty="0">
-                <a:solidFill>
-                  <a:srgbClr val="0000FF"/>
-                </a:solidFill>
-              </a:rPr>
-              <a:t>&lt;Distributions&gt;	</a:t>
-            </a:r>
-            <a:r>
-              <a:rPr lang="en-US" dirty="0">
-                <a:solidFill>
-                  <a:srgbClr val="000000"/>
-                </a:solidFill>
-              </a:rPr>
-              <a:t>Describe the input space  </a:t>
-            </a:r>
-          </a:p>
-          <a:p>
-            <a:pPr lvl="1"/>
-            <a:r>
-              <a:rPr lang="en-US" dirty="0">
-                <a:solidFill>
-                  <a:srgbClr val="0000FF"/>
-                </a:solidFill>
-              </a:rPr>
-              <a:t>&lt;Samplers&gt;	</a:t>
-            </a:r>
-            <a:r>
-              <a:rPr lang="en-US" dirty="0">
-                <a:solidFill>
-                  <a:srgbClr val="000000"/>
-                </a:solidFill>
-              </a:rPr>
-              <a:t>Decide the exploration strategy   </a:t>
-            </a:r>
-          </a:p>
-          <a:p>
-            <a:pPr lvl="1"/>
-            <a:r>
-              <a:rPr lang="en-US" dirty="0">
-                <a:solidFill>
-                  <a:srgbClr val="0000FF"/>
-                </a:solidFill>
-              </a:rPr>
-              <a:t>&lt;</a:t>
-            </a:r>
-            <a:r>
-              <a:rPr lang="en-US" dirty="0" err="1">
-                <a:solidFill>
-                  <a:srgbClr val="0000FF"/>
-                </a:solidFill>
-              </a:rPr>
-              <a:t>DataObjects</a:t>
-            </a:r>
-            <a:r>
-              <a:rPr lang="en-US" dirty="0">
-                <a:solidFill>
-                  <a:srgbClr val="0000FF"/>
-                </a:solidFill>
-              </a:rPr>
-              <a:t>&gt;	</a:t>
-            </a:r>
-            <a:r>
-              <a:rPr lang="en-US" dirty="0"/>
-              <a:t>Moving and keeping data around</a:t>
-            </a:r>
-          </a:p>
-          <a:p>
-            <a:pPr lvl="1"/>
-            <a:r>
-              <a:rPr lang="en-US" dirty="0">
-                <a:solidFill>
-                  <a:srgbClr val="0000FF"/>
-                </a:solidFill>
-              </a:rPr>
-              <a:t>&lt;Models&gt;		</a:t>
-            </a:r>
-            <a:r>
-              <a:rPr lang="en-US" dirty="0"/>
-              <a:t>Interact with codes</a:t>
-            </a:r>
-          </a:p>
-          <a:p>
-            <a:pPr lvl="1"/>
-            <a:r>
-              <a:rPr lang="en-US" dirty="0">
-                <a:solidFill>
-                  <a:srgbClr val="0000FF"/>
-                </a:solidFill>
-              </a:rPr>
-              <a:t>&lt;Files&gt;		</a:t>
-            </a:r>
-            <a:r>
-              <a:rPr lang="en-US" dirty="0"/>
-              <a:t>I/O with the hard drive</a:t>
-            </a:r>
-          </a:p>
-          <a:p>
-            <a:pPr lvl="1"/>
-            <a:r>
-              <a:rPr lang="en-US" dirty="0">
-                <a:solidFill>
-                  <a:srgbClr val="0000FF"/>
-                </a:solidFill>
-              </a:rPr>
-              <a:t>&lt;</a:t>
-            </a:r>
-            <a:r>
-              <a:rPr lang="en-US" dirty="0" err="1">
-                <a:solidFill>
-                  <a:srgbClr val="0000FF"/>
-                </a:solidFill>
-              </a:rPr>
-              <a:t>OutStreams</a:t>
-            </a:r>
-            <a:r>
-              <a:rPr lang="en-US" dirty="0">
-                <a:solidFill>
-                  <a:srgbClr val="0000FF"/>
-                </a:solidFill>
-              </a:rPr>
-              <a:t>&gt;	</a:t>
-            </a:r>
-            <a:r>
-              <a:rPr lang="en-US" dirty="0">
-                <a:solidFill>
-                  <a:srgbClr val="000000"/>
-                </a:solidFill>
-              </a:rPr>
-              <a:t>Viewing Results</a:t>
-            </a:r>
-            <a:endParaRPr lang="en-US" dirty="0">
-              <a:solidFill>
-                <a:srgbClr val="0000FF"/>
-              </a:solidFill>
-            </a:endParaRPr>
-          </a:p>
-        </p:txBody>
-      </p:sp>
+      <mc:AlternateContent xmlns:mc="http://schemas.openxmlformats.org/markup-compatibility/2006">
+        <mc:Choice xmlns:a14="http://schemas.microsoft.com/office/drawing/2010/main" Requires="a14">
+          <p:sp>
+            <p:nvSpPr>
+              <p:cNvPr id="70659" name="Rectangle 3"/>
+              <p:cNvSpPr>
+                <a:spLocks noGrp="1" noChangeArrowheads="1"/>
+              </p:cNvSpPr>
+              <p:nvPr>
+                <p:ph type="body" idx="1"/>
+              </p:nvPr>
+            </p:nvSpPr>
+            <p:spPr/>
+            <p:txBody>
+              <a:bodyPr/>
+              <a:lstStyle/>
+              <a:p>
+                <a:pPr>
+                  <a:spcAft>
+                    <a:spcPts val="1200"/>
+                  </a:spcAft>
+                </a:pPr>
+                <a:r>
+                  <a:rPr lang="en-US" dirty="0"/>
+                  <a:t>RAVEN perspective</a:t>
+                </a:r>
+              </a:p>
+              <a:p>
+                <a:pPr lvl="1"/>
+                <a:r>
+                  <a:rPr lang="en-US" dirty="0">
+                    <a:solidFill>
+                      <a:srgbClr val="0000FF"/>
+                    </a:solidFill>
+                  </a:rPr>
+                  <a:t>&lt;</a:t>
+                </a:r>
+                <a:r>
+                  <a:rPr lang="en-US" dirty="0" err="1">
+                    <a:solidFill>
+                      <a:srgbClr val="0000FF"/>
+                    </a:solidFill>
+                  </a:rPr>
+                  <a:t>RunInfo</a:t>
+                </a:r>
+                <a:r>
+                  <a:rPr lang="en-US" dirty="0">
+                    <a:solidFill>
+                      <a:srgbClr val="0000FF"/>
+                    </a:solidFill>
+                  </a:rPr>
+                  <a:t>&gt;	</a:t>
+                </a:r>
+                <a:r>
+                  <a:rPr lang="en-US" dirty="0"/>
+                  <a:t>Set up the environment, sequence             </a:t>
+                </a:r>
+              </a:p>
+              <a:p>
+                <a:pPr lvl="1"/>
+                <a:endParaRPr lang="en-US" dirty="0">
+                  <a:solidFill>
+                    <a:srgbClr val="0000FF"/>
+                  </a:solidFill>
+                </a:endParaRPr>
+              </a:p>
+              <a:p>
+                <a:pPr lvl="1"/>
+                <a:r>
+                  <a:rPr lang="en-US" dirty="0">
+                    <a:solidFill>
+                      <a:srgbClr val="0000FF"/>
+                    </a:solidFill>
+                  </a:rPr>
+                  <a:t>&lt;Steps&gt; 		</a:t>
+                </a:r>
+                <a:r>
+                  <a:rPr lang="en-US" dirty="0">
+                    <a:solidFill>
+                      <a:srgbClr val="000000"/>
+                    </a:solidFill>
+                  </a:rPr>
+                  <a:t>Combine the </a:t>
+                </a:r>
+                <a:r>
+                  <a:rPr lang="en-US" dirty="0">
+                    <a:solidFill>
+                      <a:schemeClr val="accent2"/>
+                    </a:solidFill>
+                  </a:rPr>
+                  <a:t>Entities</a:t>
+                </a:r>
+              </a:p>
+              <a:p>
+                <a:pPr lvl="1"/>
+                <a:endParaRPr lang="en-US" dirty="0">
+                  <a:solidFill>
+                    <a:srgbClr val="0000FF"/>
+                  </a:solidFill>
+                </a:endParaRPr>
+              </a:p>
+              <a:p>
+                <a:pPr lvl="1"/>
+                <a:r>
+                  <a:rPr lang="en-US" dirty="0">
+                    <a:solidFill>
+                      <a:srgbClr val="0000FF"/>
+                    </a:solidFill>
+                  </a:rPr>
+                  <a:t>&lt;Distributions&gt;	</a:t>
+                </a:r>
+                <a:r>
+                  <a:rPr lang="en-US" dirty="0">
+                    <a:solidFill>
+                      <a:srgbClr val="000000"/>
+                    </a:solidFill>
+                  </a:rPr>
+                  <a:t>Describe the input space (</a:t>
+                </a:r>
+                <a14:m>
+                  <m:oMath xmlns:m="http://schemas.openxmlformats.org/officeDocument/2006/math">
+                    <m:r>
+                      <a:rPr lang="en-US" i="1">
+                        <a:latin typeface="Cambria Math" panose="02040503050406030204" pitchFamily="18" charset="0"/>
+                      </a:rPr>
+                      <m:t>𝜃</m:t>
+                    </m:r>
+                  </m:oMath>
+                </a14:m>
+                <a:r>
+                  <a:rPr lang="en-US" dirty="0">
+                    <a:solidFill>
+                      <a:srgbClr val="000000"/>
+                    </a:solidFill>
+                  </a:rPr>
+                  <a:t>, </a:t>
+                </a:r>
+                <a14:m>
+                  <m:oMath xmlns:m="http://schemas.openxmlformats.org/officeDocument/2006/math">
+                    <m:sSub>
+                      <m:sSubPr>
+                        <m:ctrlPr>
+                          <a:rPr lang="en-US" b="0" i="1" smtClean="0">
+                            <a:solidFill>
+                              <a:srgbClr val="000000"/>
+                            </a:solidFill>
+                            <a:latin typeface="Cambria Math" panose="02040503050406030204" pitchFamily="18" charset="0"/>
+                          </a:rPr>
+                        </m:ctrlPr>
+                      </m:sSubPr>
+                      <m:e>
+                        <m:r>
+                          <a:rPr lang="en-US" b="0" i="1" smtClean="0">
+                            <a:solidFill>
+                              <a:srgbClr val="000000"/>
+                            </a:solidFill>
+                            <a:latin typeface="Cambria Math" panose="02040503050406030204" pitchFamily="18" charset="0"/>
+                          </a:rPr>
+                          <m:t>𝑣</m:t>
+                        </m:r>
+                      </m:e>
+                      <m:sub>
+                        <m:r>
+                          <a:rPr lang="en-US" b="0" i="1" smtClean="0">
+                            <a:solidFill>
+                              <a:srgbClr val="000000"/>
+                            </a:solidFill>
+                            <a:latin typeface="Cambria Math" panose="02040503050406030204" pitchFamily="18" charset="0"/>
+                          </a:rPr>
+                          <m:t>0</m:t>
+                        </m:r>
+                      </m:sub>
+                    </m:sSub>
+                  </m:oMath>
+                </a14:m>
+                <a:r>
+                  <a:rPr lang="en-US" dirty="0">
+                    <a:solidFill>
+                      <a:srgbClr val="000000"/>
+                    </a:solidFill>
+                  </a:rPr>
+                  <a:t>)</a:t>
+                </a:r>
+              </a:p>
+              <a:p>
+                <a:pPr lvl="1"/>
+                <a:r>
+                  <a:rPr lang="en-US" dirty="0">
+                    <a:solidFill>
+                      <a:srgbClr val="0000FF"/>
+                    </a:solidFill>
+                  </a:rPr>
+                  <a:t>&lt;Samplers&gt;	</a:t>
+                </a:r>
+                <a:r>
+                  <a:rPr lang="en-US" dirty="0">
+                    <a:solidFill>
+                      <a:srgbClr val="000000"/>
+                    </a:solidFill>
+                  </a:rPr>
+                  <a:t>Decide the exploration strategy   </a:t>
+                </a:r>
+              </a:p>
+              <a:p>
+                <a:pPr lvl="1"/>
+                <a:r>
+                  <a:rPr lang="en-US" dirty="0">
+                    <a:solidFill>
+                      <a:srgbClr val="0000FF"/>
+                    </a:solidFill>
+                  </a:rPr>
+                  <a:t>&lt;</a:t>
+                </a:r>
+                <a:r>
+                  <a:rPr lang="en-US" dirty="0" err="1">
+                    <a:solidFill>
+                      <a:srgbClr val="0000FF"/>
+                    </a:solidFill>
+                  </a:rPr>
+                  <a:t>DataObjects</a:t>
+                </a:r>
+                <a:r>
+                  <a:rPr lang="en-US" dirty="0">
+                    <a:solidFill>
+                      <a:srgbClr val="0000FF"/>
+                    </a:solidFill>
+                  </a:rPr>
+                  <a:t>&gt;	</a:t>
+                </a:r>
+                <a:r>
+                  <a:rPr lang="en-US" dirty="0"/>
+                  <a:t>Recording data</a:t>
+                </a:r>
+              </a:p>
+              <a:p>
+                <a:pPr lvl="1"/>
+                <a:r>
+                  <a:rPr lang="en-US" dirty="0">
+                    <a:solidFill>
+                      <a:srgbClr val="0000FF"/>
+                    </a:solidFill>
+                  </a:rPr>
+                  <a:t>&lt;Models&gt;		</a:t>
+                </a:r>
+                <a:r>
+                  <a:rPr lang="en-US" dirty="0"/>
+                  <a:t>Interact with codes</a:t>
+                </a:r>
+              </a:p>
+              <a:p>
+                <a:pPr lvl="1"/>
+                <a:r>
+                  <a:rPr lang="en-US" dirty="0">
+                    <a:solidFill>
+                      <a:srgbClr val="0000FF"/>
+                    </a:solidFill>
+                  </a:rPr>
+                  <a:t>&lt;Files&gt;		</a:t>
+                </a:r>
+                <a:r>
+                  <a:rPr lang="en-US" dirty="0"/>
+                  <a:t>I/O with the hard drive</a:t>
+                </a:r>
+              </a:p>
+              <a:p>
+                <a:pPr lvl="1"/>
+                <a:r>
+                  <a:rPr lang="en-US" dirty="0">
+                    <a:solidFill>
+                      <a:srgbClr val="0000FF"/>
+                    </a:solidFill>
+                  </a:rPr>
+                  <a:t>&lt;</a:t>
+                </a:r>
+                <a:r>
+                  <a:rPr lang="en-US" dirty="0" err="1">
+                    <a:solidFill>
+                      <a:srgbClr val="0000FF"/>
+                    </a:solidFill>
+                  </a:rPr>
+                  <a:t>OutStreams</a:t>
+                </a:r>
+                <a:r>
+                  <a:rPr lang="en-US" dirty="0">
+                    <a:solidFill>
+                      <a:srgbClr val="0000FF"/>
+                    </a:solidFill>
+                  </a:rPr>
+                  <a:t>&gt;	</a:t>
+                </a:r>
+                <a:r>
+                  <a:rPr lang="en-US" dirty="0">
+                    <a:solidFill>
+                      <a:srgbClr val="000000"/>
+                    </a:solidFill>
+                  </a:rPr>
+                  <a:t>Viewing Results</a:t>
+                </a:r>
+                <a:endParaRPr lang="en-US" dirty="0">
+                  <a:solidFill>
+                    <a:srgbClr val="0000FF"/>
+                  </a:solidFill>
+                </a:endParaRPr>
+              </a:p>
+            </p:txBody>
+          </p:sp>
+        </mc:Choice>
+        <mc:Fallback>
+          <p:sp>
+            <p:nvSpPr>
+              <p:cNvPr id="70659" name="Rectangle 3"/>
+              <p:cNvSpPr>
+                <a:spLocks noGrp="1" noRot="1" noChangeAspect="1" noMove="1" noResize="1" noEditPoints="1" noAdjustHandles="1" noChangeArrowheads="1" noChangeShapeType="1" noTextEdit="1"/>
+              </p:cNvSpPr>
+              <p:nvPr>
+                <p:ph type="body" idx="1"/>
+              </p:nvPr>
+            </p:nvSpPr>
+            <p:spPr>
+              <a:blipFill>
+                <a:blip r:embed="rId2"/>
+                <a:stretch>
+                  <a:fillRect l="-1852" t="-2521"/>
+                </a:stretch>
+              </a:blipFill>
+            </p:spPr>
+            <p:txBody>
+              <a:bodyPr/>
+              <a:lstStyle/>
+              <a:p>
+                <a:r>
+                  <a:rPr lang="en-US">
+                    <a:noFill/>
+                  </a:rPr>
+                  <a:t> </a:t>
+                </a:r>
+              </a:p>
+            </p:txBody>
+          </p:sp>
+        </mc:Fallback>
+      </mc:AlternateContent>
     </p:spTree>
     <p:extLst>
       <p:ext uri="{BB962C8B-B14F-4D97-AF65-F5344CB8AC3E}">
@@ -38740,6 +38844,12 @@
             <a:pPr marL="0" indent="0">
               <a:buNone/>
             </a:pPr>
+            <a:endParaRPr lang="en-US" dirty="0"/>
+          </a:p>
+          <a:p>
+            <a:pPr marL="0" indent="0">
+              <a:buNone/>
+            </a:pPr>
             <a:r>
               <a:rPr lang="en-US" dirty="0"/>
               <a:t>Optional: Instead of “vim”, use whatever program you like to edit XMLs</a:t>
@@ -38830,7 +38940,7 @@
         <p:spPr>
           <a:xfrm>
             <a:off x="455613" y="1974060"/>
-            <a:ext cx="8494423" cy="646331"/>
+            <a:ext cx="8494423" cy="1200329"/>
           </a:xfrm>
           <a:prstGeom prst="rect">
             <a:avLst/>
@@ -38846,6 +38956,14 @@
             <a:spAutoFit/>
           </a:bodyPr>
           <a:lstStyle/>
+          <a:p>
+            <a:pPr marL="0" indent="0">
+              <a:buNone/>
+            </a:pPr>
+            <a:endParaRPr lang="en-US" sz="1800" dirty="0">
+              <a:latin typeface="Lucida Console" panose="020B0609040504020204" pitchFamily="49" charset="0"/>
+            </a:endParaRPr>
+          </a:p>
           <a:p>
             <a:pPr marL="0" indent="0">
               <a:buNone/>
@@ -38903,6 +39021,17 @@
               </a:rPr>
               <a:t> vim 1_sample_and_plot.xml</a:t>
             </a:r>
+          </a:p>
+          <a:p>
+            <a:pPr marL="0" indent="0">
+              <a:buNone/>
+            </a:pPr>
+            <a:endParaRPr lang="en-US" sz="1800" dirty="0">
+              <a:solidFill>
+                <a:schemeClr val="bg1"/>
+              </a:solidFill>
+              <a:latin typeface="Lucida Console" panose="020B0609040504020204" pitchFamily="49" charset="0"/>
+            </a:endParaRPr>
           </a:p>
         </p:txBody>
       </p:sp>

</xml_diff>

<commit_message>
changes from during workshop
</commit_message>
<xml_diff>
--- a/doc/workshop/forwardSampling/ForwardSampling.pptx
+++ b/doc/workshop/forwardSampling/ForwardSampling.pptx
@@ -34081,6 +34081,49 @@
           </a:prstGeom>
         </p:spPr>
       </p:pic>
+      <p:sp>
+        <p:nvSpPr>
+          <p:cNvPr id="3" name="TextBox 2">
+            <a:extLst>
+              <a:ext uri="{FF2B5EF4-FFF2-40B4-BE49-F238E27FC236}">
+                <a16:creationId xmlns:a16="http://schemas.microsoft.com/office/drawing/2014/main" id="{21AF0815-A0A2-EB45-8A65-24F6A25D3AA1}"/>
+              </a:ext>
+            </a:extLst>
+          </p:cNvPr>
+          <p:cNvSpPr txBox="1"/>
+          <p:nvPr/>
+        </p:nvSpPr>
+        <p:spPr>
+          <a:xfrm>
+            <a:off x="455612" y="6272511"/>
+            <a:ext cx="6783388" cy="461665"/>
+          </a:xfrm>
+          <a:prstGeom prst="rect">
+            <a:avLst/>
+          </a:prstGeom>
+          <a:noFill/>
+        </p:spPr>
+        <p:txBody>
+          <a:bodyPr wrap="square" rtlCol="0">
+            <a:spAutoFit/>
+          </a:bodyPr>
+          <a:lstStyle/>
+          <a:p>
+            <a:r>
+              <a:rPr lang="en-US" dirty="0"/>
+              <a:t>./scripts/</a:t>
+            </a:r>
+            <a:r>
+              <a:rPr lang="en-US" dirty="0" err="1"/>
+              <a:t>establish_conda_env.sh</a:t>
+            </a:r>
+            <a:r>
+              <a:rPr lang="en-US" dirty="0"/>
+              <a:t> --install --no-clean</a:t>
+            </a:r>
+          </a:p>
+        </p:txBody>
+      </p:sp>
     </p:spTree>
     <p:extLst>
       <p:ext uri="{BB962C8B-B14F-4D97-AF65-F5344CB8AC3E}">
@@ -34883,6 +34926,97 @@
           </a:p>
         </p:txBody>
       </p:sp>
+      <p:sp>
+        <p:nvSpPr>
+          <p:cNvPr id="8" name="TextBox 7">
+            <a:extLst>
+              <a:ext uri="{FF2B5EF4-FFF2-40B4-BE49-F238E27FC236}">
+                <a16:creationId xmlns:a16="http://schemas.microsoft.com/office/drawing/2014/main" id="{C4DEB5CA-7FD8-3F45-9152-FADB77BFED5B}"/>
+              </a:ext>
+            </a:extLst>
+          </p:cNvPr>
+          <p:cNvSpPr txBox="1"/>
+          <p:nvPr/>
+        </p:nvSpPr>
+        <p:spPr>
+          <a:xfrm>
+            <a:off x="323994" y="199807"/>
+            <a:ext cx="8494423" cy="646331"/>
+          </a:xfrm>
+          <a:prstGeom prst="rect">
+            <a:avLst/>
+          </a:prstGeom>
+          <a:solidFill>
+            <a:schemeClr val="bg1">
+              <a:lumMod val="50000"/>
+            </a:schemeClr>
+          </a:solidFill>
+        </p:spPr>
+        <p:txBody>
+          <a:bodyPr wrap="square" rtlCol="0">
+            <a:spAutoFit/>
+          </a:bodyPr>
+          <a:lstStyle/>
+          <a:p>
+            <a:pPr marL="0" indent="0">
+              <a:buNone/>
+            </a:pPr>
+            <a:r>
+              <a:rPr lang="en-US" sz="1800" dirty="0">
+                <a:latin typeface="Lucida Console" panose="020B0609040504020204" pitchFamily="49" charset="0"/>
+              </a:rPr>
+              <a:t>&gt;</a:t>
+            </a:r>
+            <a:r>
+              <a:rPr lang="en-US" sz="1800" dirty="0">
+                <a:solidFill>
+                  <a:schemeClr val="bg1"/>
+                </a:solidFill>
+                <a:latin typeface="Lucida Console" panose="020B0609040504020204" pitchFamily="49" charset="0"/>
+              </a:rPr>
+              <a:t> cd raven/doc/workshop/</a:t>
+            </a:r>
+            <a:r>
+              <a:rPr lang="en-US" sz="1800" dirty="0" err="1">
+                <a:solidFill>
+                  <a:schemeClr val="bg1"/>
+                </a:solidFill>
+                <a:latin typeface="Lucida Console" panose="020B0609040504020204" pitchFamily="49" charset="0"/>
+              </a:rPr>
+              <a:t>forwardSampling</a:t>
+            </a:r>
+            <a:r>
+              <a:rPr lang="en-US" sz="1800" dirty="0">
+                <a:solidFill>
+                  <a:schemeClr val="bg1"/>
+                </a:solidFill>
+                <a:latin typeface="Lucida Console" panose="020B0609040504020204" pitchFamily="49" charset="0"/>
+              </a:rPr>
+              <a:t>/exercises</a:t>
+            </a:r>
+          </a:p>
+          <a:p>
+            <a:pPr marL="0" indent="0">
+              <a:buNone/>
+            </a:pPr>
+            <a:r>
+              <a:rPr lang="en-US" sz="1800" dirty="0">
+                <a:latin typeface="Lucida Console" panose="020B0609040504020204" pitchFamily="49" charset="0"/>
+              </a:rPr>
+              <a:t>&gt;</a:t>
+            </a:r>
+            <a:r>
+              <a:rPr lang="en-US" sz="1800" dirty="0">
+                <a:solidFill>
+                  <a:schemeClr val="bg1"/>
+                </a:solidFill>
+                <a:latin typeface="Lucida Console" panose="020B0609040504020204" pitchFamily="49" charset="0"/>
+              </a:rPr>
+              <a:t> vim 2_normal_distribution.xml</a:t>
+            </a:r>
+          </a:p>
+        </p:txBody>
+      </p:sp>
     </p:spTree>
     <p:extLst>
       <p:ext uri="{BB962C8B-B14F-4D97-AF65-F5344CB8AC3E}">
@@ -35366,6 +35500,59 @@
           </a:p>
         </p:txBody>
       </p:sp>
+      <p:sp>
+        <p:nvSpPr>
+          <p:cNvPr id="5" name="TextBox 4">
+            <a:extLst>
+              <a:ext uri="{FF2B5EF4-FFF2-40B4-BE49-F238E27FC236}">
+                <a16:creationId xmlns:a16="http://schemas.microsoft.com/office/drawing/2014/main" id="{15C1D0CF-B101-B047-B028-D000EFFC5909}"/>
+              </a:ext>
+            </a:extLst>
+          </p:cNvPr>
+          <p:cNvSpPr txBox="1"/>
+          <p:nvPr/>
+        </p:nvSpPr>
+        <p:spPr>
+          <a:xfrm>
+            <a:off x="152400" y="80411"/>
+            <a:ext cx="8991600" cy="461665"/>
+          </a:xfrm>
+          <a:prstGeom prst="rect">
+            <a:avLst/>
+          </a:prstGeom>
+          <a:solidFill>
+            <a:schemeClr val="accent1"/>
+          </a:solidFill>
+        </p:spPr>
+        <p:txBody>
+          <a:bodyPr wrap="square" rtlCol="0">
+            <a:spAutoFit/>
+          </a:bodyPr>
+          <a:lstStyle/>
+          <a:p>
+            <a:r>
+              <a:rPr lang="en-US" dirty="0"/>
+              <a:t>Function raven($a) {</a:t>
+            </a:r>
+            <a:r>
+              <a:rPr lang="en-US" dirty="0" err="1"/>
+              <a:t>bash.exe</a:t>
+            </a:r>
+            <a:r>
+              <a:rPr lang="en-US" dirty="0"/>
+              <a:t> "C:\projects\raven\</a:t>
+            </a:r>
+            <a:r>
+              <a:rPr lang="en-US" dirty="0" err="1"/>
+              <a:t>raven_framework</a:t>
+            </a:r>
+            <a:r>
+              <a:rPr lang="en-US" dirty="0"/>
+              <a:t>" $a}</a:t>
+            </a:r>
+          </a:p>
+        </p:txBody>
+      </p:sp>
     </p:spTree>
     <p:extLst>
       <p:ext uri="{BB962C8B-B14F-4D97-AF65-F5344CB8AC3E}">
@@ -35651,7 +35838,7 @@
             <a:pPr lvl="1"/>
             <a:r>
               <a:rPr lang="en-US" dirty="0"/>
-              <a:t>See user manual section 12.1.2</a:t>
+              <a:t>See user manual section 10.1.2</a:t>
             </a:r>
           </a:p>
           <a:p>

</xml_diff>

<commit_message>
Workshop 2019 09 post (#1052)
* changes from during workshop

* exercise for data mining on projectile
</commit_message>
<xml_diff>
--- a/doc/workshop/forwardSampling/ForwardSampling.pptx
+++ b/doc/workshop/forwardSampling/ForwardSampling.pptx
@@ -34081,6 +34081,49 @@
           </a:prstGeom>
         </p:spPr>
       </p:pic>
+      <p:sp>
+        <p:nvSpPr>
+          <p:cNvPr id="3" name="TextBox 2">
+            <a:extLst>
+              <a:ext uri="{FF2B5EF4-FFF2-40B4-BE49-F238E27FC236}">
+                <a16:creationId xmlns:a16="http://schemas.microsoft.com/office/drawing/2014/main" id="{21AF0815-A0A2-EB45-8A65-24F6A25D3AA1}"/>
+              </a:ext>
+            </a:extLst>
+          </p:cNvPr>
+          <p:cNvSpPr txBox="1"/>
+          <p:nvPr/>
+        </p:nvSpPr>
+        <p:spPr>
+          <a:xfrm>
+            <a:off x="455612" y="6272511"/>
+            <a:ext cx="6783388" cy="461665"/>
+          </a:xfrm>
+          <a:prstGeom prst="rect">
+            <a:avLst/>
+          </a:prstGeom>
+          <a:noFill/>
+        </p:spPr>
+        <p:txBody>
+          <a:bodyPr wrap="square" rtlCol="0">
+            <a:spAutoFit/>
+          </a:bodyPr>
+          <a:lstStyle/>
+          <a:p>
+            <a:r>
+              <a:rPr lang="en-US" dirty="0"/>
+              <a:t>./scripts/</a:t>
+            </a:r>
+            <a:r>
+              <a:rPr lang="en-US" dirty="0" err="1"/>
+              <a:t>establish_conda_env.sh</a:t>
+            </a:r>
+            <a:r>
+              <a:rPr lang="en-US" dirty="0"/>
+              <a:t> --install --no-clean</a:t>
+            </a:r>
+          </a:p>
+        </p:txBody>
+      </p:sp>
     </p:spTree>
     <p:extLst>
       <p:ext uri="{BB962C8B-B14F-4D97-AF65-F5344CB8AC3E}">
@@ -34883,6 +34926,97 @@
           </a:p>
         </p:txBody>
       </p:sp>
+      <p:sp>
+        <p:nvSpPr>
+          <p:cNvPr id="8" name="TextBox 7">
+            <a:extLst>
+              <a:ext uri="{FF2B5EF4-FFF2-40B4-BE49-F238E27FC236}">
+                <a16:creationId xmlns:a16="http://schemas.microsoft.com/office/drawing/2014/main" id="{C4DEB5CA-7FD8-3F45-9152-FADB77BFED5B}"/>
+              </a:ext>
+            </a:extLst>
+          </p:cNvPr>
+          <p:cNvSpPr txBox="1"/>
+          <p:nvPr/>
+        </p:nvSpPr>
+        <p:spPr>
+          <a:xfrm>
+            <a:off x="323994" y="199807"/>
+            <a:ext cx="8494423" cy="646331"/>
+          </a:xfrm>
+          <a:prstGeom prst="rect">
+            <a:avLst/>
+          </a:prstGeom>
+          <a:solidFill>
+            <a:schemeClr val="bg1">
+              <a:lumMod val="50000"/>
+            </a:schemeClr>
+          </a:solidFill>
+        </p:spPr>
+        <p:txBody>
+          <a:bodyPr wrap="square" rtlCol="0">
+            <a:spAutoFit/>
+          </a:bodyPr>
+          <a:lstStyle/>
+          <a:p>
+            <a:pPr marL="0" indent="0">
+              <a:buNone/>
+            </a:pPr>
+            <a:r>
+              <a:rPr lang="en-US" sz="1800" dirty="0">
+                <a:latin typeface="Lucida Console" panose="020B0609040504020204" pitchFamily="49" charset="0"/>
+              </a:rPr>
+              <a:t>&gt;</a:t>
+            </a:r>
+            <a:r>
+              <a:rPr lang="en-US" sz="1800" dirty="0">
+                <a:solidFill>
+                  <a:schemeClr val="bg1"/>
+                </a:solidFill>
+                <a:latin typeface="Lucida Console" panose="020B0609040504020204" pitchFamily="49" charset="0"/>
+              </a:rPr>
+              <a:t> cd raven/doc/workshop/</a:t>
+            </a:r>
+            <a:r>
+              <a:rPr lang="en-US" sz="1800" dirty="0" err="1">
+                <a:solidFill>
+                  <a:schemeClr val="bg1"/>
+                </a:solidFill>
+                <a:latin typeface="Lucida Console" panose="020B0609040504020204" pitchFamily="49" charset="0"/>
+              </a:rPr>
+              <a:t>forwardSampling</a:t>
+            </a:r>
+            <a:r>
+              <a:rPr lang="en-US" sz="1800" dirty="0">
+                <a:solidFill>
+                  <a:schemeClr val="bg1"/>
+                </a:solidFill>
+                <a:latin typeface="Lucida Console" panose="020B0609040504020204" pitchFamily="49" charset="0"/>
+              </a:rPr>
+              <a:t>/exercises</a:t>
+            </a:r>
+          </a:p>
+          <a:p>
+            <a:pPr marL="0" indent="0">
+              <a:buNone/>
+            </a:pPr>
+            <a:r>
+              <a:rPr lang="en-US" sz="1800" dirty="0">
+                <a:latin typeface="Lucida Console" panose="020B0609040504020204" pitchFamily="49" charset="0"/>
+              </a:rPr>
+              <a:t>&gt;</a:t>
+            </a:r>
+            <a:r>
+              <a:rPr lang="en-US" sz="1800" dirty="0">
+                <a:solidFill>
+                  <a:schemeClr val="bg1"/>
+                </a:solidFill>
+                <a:latin typeface="Lucida Console" panose="020B0609040504020204" pitchFamily="49" charset="0"/>
+              </a:rPr>
+              <a:t> vim 2_normal_distribution.xml</a:t>
+            </a:r>
+          </a:p>
+        </p:txBody>
+      </p:sp>
     </p:spTree>
     <p:extLst>
       <p:ext uri="{BB962C8B-B14F-4D97-AF65-F5344CB8AC3E}">
@@ -35366,6 +35500,59 @@
           </a:p>
         </p:txBody>
       </p:sp>
+      <p:sp>
+        <p:nvSpPr>
+          <p:cNvPr id="5" name="TextBox 4">
+            <a:extLst>
+              <a:ext uri="{FF2B5EF4-FFF2-40B4-BE49-F238E27FC236}">
+                <a16:creationId xmlns:a16="http://schemas.microsoft.com/office/drawing/2014/main" id="{15C1D0CF-B101-B047-B028-D000EFFC5909}"/>
+              </a:ext>
+            </a:extLst>
+          </p:cNvPr>
+          <p:cNvSpPr txBox="1"/>
+          <p:nvPr/>
+        </p:nvSpPr>
+        <p:spPr>
+          <a:xfrm>
+            <a:off x="152400" y="80411"/>
+            <a:ext cx="8991600" cy="461665"/>
+          </a:xfrm>
+          <a:prstGeom prst="rect">
+            <a:avLst/>
+          </a:prstGeom>
+          <a:solidFill>
+            <a:schemeClr val="accent1"/>
+          </a:solidFill>
+        </p:spPr>
+        <p:txBody>
+          <a:bodyPr wrap="square" rtlCol="0">
+            <a:spAutoFit/>
+          </a:bodyPr>
+          <a:lstStyle/>
+          <a:p>
+            <a:r>
+              <a:rPr lang="en-US" dirty="0"/>
+              <a:t>Function raven($a) {</a:t>
+            </a:r>
+            <a:r>
+              <a:rPr lang="en-US" dirty="0" err="1"/>
+              <a:t>bash.exe</a:t>
+            </a:r>
+            <a:r>
+              <a:rPr lang="en-US" dirty="0"/>
+              <a:t> "C:\projects\raven\</a:t>
+            </a:r>
+            <a:r>
+              <a:rPr lang="en-US" dirty="0" err="1"/>
+              <a:t>raven_framework</a:t>
+            </a:r>
+            <a:r>
+              <a:rPr lang="en-US" dirty="0"/>
+              <a:t>" $a}</a:t>
+            </a:r>
+          </a:p>
+        </p:txBody>
+      </p:sp>
     </p:spTree>
     <p:extLst>
       <p:ext uri="{BB962C8B-B14F-4D97-AF65-F5344CB8AC3E}">
@@ -35651,7 +35838,7 @@
             <a:pPr lvl="1"/>
             <a:r>
               <a:rPr lang="en-US" dirty="0"/>
-              <a:t>See user manual section 12.1.2</a:t>
+              <a:t>See user manual section 10.1.2</a:t>
             </a:r>
           </a:p>
           <a:p>

</xml_diff>

<commit_message>
Autofilling Workshop Exercises (#1056)
* changes from during workshop

* exercise for data mining on projectile

* no colors option, multiple test source option

* stash

* stash

* stash

* working examples

* extra file

* updated pptx for timedep stats

* skipping uncoverted tests

* xpath unnecessary change reverted

* pylint changes
</commit_message>
<xml_diff>
--- a/doc/workshop/forwardSampling/ForwardSampling.pptx
+++ b/doc/workshop/forwardSampling/ForwardSampling.pptx
@@ -35017,6 +35017,42 @@
           </a:p>
         </p:txBody>
       </p:sp>
+      <p:pic>
+        <p:nvPicPr>
+          <p:cNvPr id="9" name="Picture 8">
+            <a:extLst>
+              <a:ext uri="{FF2B5EF4-FFF2-40B4-BE49-F238E27FC236}">
+                <a16:creationId xmlns:a16="http://schemas.microsoft.com/office/drawing/2014/main" id="{6F56C865-A558-0248-B4B7-6B59FEC83D3F}"/>
+              </a:ext>
+            </a:extLst>
+          </p:cNvPr>
+          <p:cNvPicPr>
+            <a:picLocks noChangeAspect="1"/>
+          </p:cNvPicPr>
+          <p:nvPr/>
+        </p:nvPicPr>
+        <p:blipFill>
+          <a:blip r:embed="rId4">
+            <a:extLst>
+              <a:ext uri="{28A0092B-C50C-407E-A947-70E740481C1C}">
+                <a14:useLocalDpi xmlns:a14="http://schemas.microsoft.com/office/drawing/2010/main" val="0"/>
+              </a:ext>
+            </a:extLst>
+          </a:blip>
+          <a:stretch>
+            <a:fillRect/>
+          </a:stretch>
+        </p:blipFill>
+        <p:spPr>
+          <a:xfrm>
+            <a:off x="6761533" y="4346644"/>
+            <a:ext cx="2433982" cy="1825486"/>
+          </a:xfrm>
+          <a:prstGeom prst="rect">
+            <a:avLst/>
+          </a:prstGeom>
+        </p:spPr>
+      </p:pic>
     </p:spTree>
     <p:extLst>
       <p:ext uri="{BB962C8B-B14F-4D97-AF65-F5344CB8AC3E}">
@@ -35165,34 +35201,42 @@
           <a:chExt cx="0" cy="0"/>
         </a:xfrm>
       </p:grpSpPr>
-      <p:sp>
-        <p:nvSpPr>
-          <p:cNvPr id="2" name="Title 1">
+      <p:pic>
+        <p:nvPicPr>
+          <p:cNvPr id="7" name="Picture 6">
             <a:extLst>
               <a:ext uri="{FF2B5EF4-FFF2-40B4-BE49-F238E27FC236}">
-                <a16:creationId xmlns:a16="http://schemas.microsoft.com/office/drawing/2014/main" id="{6CFE73B4-A998-1C41-B18E-D5A5FC19D5C1}"/>
+                <a16:creationId xmlns:a16="http://schemas.microsoft.com/office/drawing/2014/main" id="{51795857-196C-BC4F-A3D5-0A10F315FE37}"/>
               </a:ext>
             </a:extLst>
           </p:cNvPr>
-          <p:cNvSpPr>
-            <a:spLocks noGrp="1"/>
-          </p:cNvSpPr>
-          <p:nvPr>
-            <p:ph type="title"/>
-          </p:nvPr>
-        </p:nvSpPr>
-        <p:spPr/>
-        <p:txBody>
-          <a:bodyPr/>
-          <a:lstStyle/>
-          <a:p>
-            <a:r>
-              <a:rPr lang="en-US" dirty="0"/>
-              <a:t>3) Changing the Variables</a:t>
-            </a:r>
-          </a:p>
-        </p:txBody>
-      </p:sp>
+          <p:cNvPicPr>
+            <a:picLocks noChangeAspect="1"/>
+          </p:cNvPicPr>
+          <p:nvPr/>
+        </p:nvPicPr>
+        <p:blipFill>
+          <a:blip r:embed="rId2">
+            <a:extLst>
+              <a:ext uri="{28A0092B-C50C-407E-A947-70E740481C1C}">
+                <a14:useLocalDpi xmlns:a14="http://schemas.microsoft.com/office/drawing/2010/main" val="0"/>
+              </a:ext>
+            </a:extLst>
+          </a:blip>
+          <a:stretch>
+            <a:fillRect/>
+          </a:stretch>
+        </p:blipFill>
+        <p:spPr>
+          <a:xfrm>
+            <a:off x="7002268" y="3282291"/>
+            <a:ext cx="2141732" cy="1606299"/>
+          </a:xfrm>
+          <a:prstGeom prst="rect">
+            <a:avLst/>
+          </a:prstGeom>
+        </p:spPr>
+      </p:pic>
       <p:sp>
         <p:nvSpPr>
           <p:cNvPr id="3" name="Content Placeholder 2">
@@ -35380,6 +35424,34 @@
       </p:sp>
       <p:sp>
         <p:nvSpPr>
+          <p:cNvPr id="2" name="Title 1">
+            <a:extLst>
+              <a:ext uri="{FF2B5EF4-FFF2-40B4-BE49-F238E27FC236}">
+                <a16:creationId xmlns:a16="http://schemas.microsoft.com/office/drawing/2014/main" id="{6CFE73B4-A998-1C41-B18E-D5A5FC19D5C1}"/>
+              </a:ext>
+            </a:extLst>
+          </p:cNvPr>
+          <p:cNvSpPr>
+            <a:spLocks noGrp="1"/>
+          </p:cNvSpPr>
+          <p:nvPr>
+            <p:ph type="title"/>
+          </p:nvPr>
+        </p:nvSpPr>
+        <p:spPr/>
+        <p:txBody>
+          <a:bodyPr/>
+          <a:lstStyle/>
+          <a:p>
+            <a:r>
+              <a:rPr lang="en-US" dirty="0"/>
+              <a:t>3) Changing the Variables</a:t>
+            </a:r>
+          </a:p>
+        </p:txBody>
+      </p:sp>
+      <p:sp>
+        <p:nvSpPr>
           <p:cNvPr id="4" name="TextBox 3">
             <a:extLst>
               <a:ext uri="{FF2B5EF4-FFF2-40B4-BE49-F238E27FC236}">
@@ -35497,59 +35569,6 @@
               </a:solidFill>
               <a:latin typeface="Lucida Console" panose="020B0609040504020204" pitchFamily="49" charset="0"/>
             </a:endParaRPr>
-          </a:p>
-        </p:txBody>
-      </p:sp>
-      <p:sp>
-        <p:nvSpPr>
-          <p:cNvPr id="5" name="TextBox 4">
-            <a:extLst>
-              <a:ext uri="{FF2B5EF4-FFF2-40B4-BE49-F238E27FC236}">
-                <a16:creationId xmlns:a16="http://schemas.microsoft.com/office/drawing/2014/main" id="{15C1D0CF-B101-B047-B028-D000EFFC5909}"/>
-              </a:ext>
-            </a:extLst>
-          </p:cNvPr>
-          <p:cNvSpPr txBox="1"/>
-          <p:nvPr/>
-        </p:nvSpPr>
-        <p:spPr>
-          <a:xfrm>
-            <a:off x="152400" y="80411"/>
-            <a:ext cx="8991600" cy="461665"/>
-          </a:xfrm>
-          <a:prstGeom prst="rect">
-            <a:avLst/>
-          </a:prstGeom>
-          <a:solidFill>
-            <a:schemeClr val="accent1"/>
-          </a:solidFill>
-        </p:spPr>
-        <p:txBody>
-          <a:bodyPr wrap="square" rtlCol="0">
-            <a:spAutoFit/>
-          </a:bodyPr>
-          <a:lstStyle/>
-          <a:p>
-            <a:r>
-              <a:rPr lang="en-US" dirty="0"/>
-              <a:t>Function raven($a) {</a:t>
-            </a:r>
-            <a:r>
-              <a:rPr lang="en-US" dirty="0" err="1"/>
-              <a:t>bash.exe</a:t>
-            </a:r>
-            <a:r>
-              <a:rPr lang="en-US" dirty="0"/>
-              <a:t> "C:\projects\raven\</a:t>
-            </a:r>
-            <a:r>
-              <a:rPr lang="en-US" dirty="0" err="1"/>
-              <a:t>raven_framework</a:t>
-            </a:r>
-            <a:r>
-              <a:rPr lang="en-US" dirty="0"/>
-              <a:t>" $a}</a:t>
-            </a:r>
           </a:p>
         </p:txBody>
       </p:sp>
@@ -35911,6 +35930,42 @@
           </a:p>
         </p:txBody>
       </p:sp>
+      <p:pic>
+        <p:nvPicPr>
+          <p:cNvPr id="5" name="Picture 4">
+            <a:extLst>
+              <a:ext uri="{FF2B5EF4-FFF2-40B4-BE49-F238E27FC236}">
+                <a16:creationId xmlns:a16="http://schemas.microsoft.com/office/drawing/2014/main" id="{BAF6F1EB-7CD0-2745-924C-1F893734ED55}"/>
+              </a:ext>
+            </a:extLst>
+          </p:cNvPr>
+          <p:cNvPicPr>
+            <a:picLocks noChangeAspect="1"/>
+          </p:cNvPicPr>
+          <p:nvPr/>
+        </p:nvPicPr>
+        <p:blipFill>
+          <a:blip r:embed="rId2">
+            <a:extLst>
+              <a:ext uri="{28A0092B-C50C-407E-A947-70E740481C1C}">
+                <a14:useLocalDpi xmlns:a14="http://schemas.microsoft.com/office/drawing/2010/main" val="0"/>
+              </a:ext>
+            </a:extLst>
+          </a:blip>
+          <a:stretch>
+            <a:fillRect/>
+          </a:stretch>
+        </p:blipFill>
+        <p:spPr>
+          <a:xfrm>
+            <a:off x="5883966" y="3230218"/>
+            <a:ext cx="2921000" cy="2190750"/>
+          </a:xfrm>
+          <a:prstGeom prst="rect">
+            <a:avLst/>
+          </a:prstGeom>
+        </p:spPr>
+      </p:pic>
     </p:spTree>
     <p:extLst>
       <p:ext uri="{BB962C8B-B14F-4D97-AF65-F5344CB8AC3E}">
@@ -36709,6 +36764,126 @@
           <a:p>
             <a:r>
               <a:rPr lang="en-US" dirty="0"/>
+              <a:t>Add a new </a:t>
+            </a:r>
+            <a:r>
+              <a:rPr lang="en-US" dirty="0" err="1"/>
+              <a:t>DataObject</a:t>
+            </a:r>
+            <a:endParaRPr lang="en-US" dirty="0"/>
+          </a:p>
+          <a:p>
+            <a:pPr lvl="1"/>
+            <a:r>
+              <a:rPr lang="en-US" dirty="0"/>
+              <a:t>Inputs are </a:t>
+            </a:r>
+            <a:r>
+              <a:rPr lang="en-US" dirty="0">
+                <a:solidFill>
+                  <a:schemeClr val="accent2"/>
+                </a:solidFill>
+              </a:rPr>
+              <a:t>mean</a:t>
+            </a:r>
+            <a:r>
+              <a:rPr lang="en-US" dirty="0"/>
+              <a:t>, </a:t>
+            </a:r>
+            <a:r>
+              <a:rPr lang="en-US" dirty="0">
+                <a:solidFill>
+                  <a:schemeClr val="accent2"/>
+                </a:solidFill>
+              </a:rPr>
+              <a:t>variance</a:t>
+            </a:r>
+            <a:r>
+              <a:rPr lang="en-US" dirty="0"/>
+              <a:t> for range, time of flight</a:t>
+            </a:r>
+          </a:p>
+          <a:p>
+            <a:pPr lvl="1"/>
+            <a:r>
+              <a:rPr lang="en-US" dirty="0"/>
+              <a:t>Outputs are </a:t>
+            </a:r>
+            <a:r>
+              <a:rPr lang="en-US" dirty="0">
+                <a:solidFill>
+                  <a:schemeClr val="accent2"/>
+                </a:solidFill>
+              </a:rPr>
+              <a:t>sensitivities </a:t>
+            </a:r>
+            <a:r>
+              <a:rPr lang="en-US" dirty="0"/>
+              <a:t>of</a:t>
+            </a:r>
+            <a:r>
+              <a:rPr lang="en-US" dirty="0">
+                <a:solidFill>
+                  <a:schemeClr val="accent2"/>
+                </a:solidFill>
+              </a:rPr>
+              <a:t> r </a:t>
+            </a:r>
+            <a:r>
+              <a:rPr lang="en-US" dirty="0"/>
+              <a:t>to</a:t>
+            </a:r>
+            <a:r>
+              <a:rPr lang="en-US" dirty="0">
+                <a:solidFill>
+                  <a:schemeClr val="accent2"/>
+                </a:solidFill>
+              </a:rPr>
+              <a:t> y0</a:t>
+            </a:r>
+            <a:r>
+              <a:rPr lang="en-US" dirty="0"/>
+              <a:t>,</a:t>
+            </a:r>
+            <a:r>
+              <a:rPr lang="en-US" dirty="0">
+                <a:solidFill>
+                  <a:schemeClr val="accent2"/>
+                </a:solidFill>
+              </a:rPr>
+              <a:t> angle</a:t>
+            </a:r>
+            <a:endParaRPr lang="en-US" dirty="0"/>
+          </a:p>
+          <a:p>
+            <a:r>
+              <a:rPr lang="en-US" dirty="0"/>
+              <a:t>Add a new </a:t>
+            </a:r>
+            <a:r>
+              <a:rPr lang="en-US" dirty="0" err="1"/>
+              <a:t>OutStream</a:t>
+            </a:r>
+            <a:r>
+              <a:rPr lang="en-US" dirty="0"/>
+              <a:t> </a:t>
+            </a:r>
+            <a:r>
+              <a:rPr lang="en-US" dirty="0">
+                <a:solidFill>
+                  <a:schemeClr val="accent2"/>
+                </a:solidFill>
+              </a:rPr>
+              <a:t>Print </a:t>
+            </a:r>
+            <a:r>
+              <a:rPr lang="en-US" dirty="0"/>
+              <a:t>for the statistics data object</a:t>
+            </a:r>
+          </a:p>
+          <a:p>
+            <a:r>
+              <a:rPr lang="en-US" dirty="0"/>
               <a:t>Add a </a:t>
             </a:r>
             <a:r>
@@ -36771,7 +36946,7 @@
             <a:pPr lvl="1"/>
             <a:r>
               <a:rPr lang="en-US" dirty="0"/>
-              <a:t>Output is a new </a:t>
+              <a:t>Output is the new </a:t>
             </a:r>
             <a:r>
               <a:rPr lang="en-US" dirty="0" err="1">
@@ -36795,7 +36970,39 @@
             <a:pPr lvl="1"/>
             <a:r>
               <a:rPr lang="en-US" dirty="0"/>
-              <a:t>Don’t forget to add it to </a:t>
+              <a:t>Also add the </a:t>
+            </a:r>
+            <a:r>
+              <a:rPr lang="en-US" dirty="0" err="1"/>
+              <a:t>OutStream</a:t>
+            </a:r>
+            <a:r>
+              <a:rPr lang="en-US" dirty="0"/>
+              <a:t> </a:t>
+            </a:r>
+            <a:r>
+              <a:rPr lang="en-US" dirty="0">
+                <a:solidFill>
+                  <a:schemeClr val="accent2"/>
+                </a:solidFill>
+              </a:rPr>
+              <a:t>Print</a:t>
+            </a:r>
+            <a:r>
+              <a:rPr lang="en-US" dirty="0"/>
+              <a:t> for the new </a:t>
+            </a:r>
+            <a:r>
+              <a:rPr lang="en-US" dirty="0" err="1"/>
+              <a:t>DataObject</a:t>
+            </a:r>
+            <a:endParaRPr lang="en-US" dirty="0"/>
+          </a:p>
+          <a:p>
+            <a:pPr lvl="1"/>
+            <a:r>
+              <a:rPr lang="en-US" dirty="0"/>
+              <a:t>Don’t forget to add Step to </a:t>
             </a:r>
             <a:r>
               <a:rPr lang="en-US" dirty="0">
@@ -36824,186 +37031,50 @@
             </a:endParaRPr>
           </a:p>
           <a:p>
-            <a:r>
-              <a:rPr lang="en-US" dirty="0"/>
-              <a:t>Add a new </a:t>
-            </a:r>
-            <a:r>
-              <a:rPr lang="en-US" dirty="0" err="1"/>
-              <a:t>DataObject</a:t>
-            </a:r>
-            <a:endParaRPr lang="en-US" dirty="0"/>
-          </a:p>
-          <a:p>
-            <a:pPr lvl="1"/>
-            <a:r>
-              <a:rPr lang="en-US" dirty="0"/>
-              <a:t>Inputs can be </a:t>
-            </a:r>
-            <a:r>
-              <a:rPr lang="en-US" dirty="0">
-                <a:solidFill>
-                  <a:schemeClr val="accent2"/>
-                </a:solidFill>
-              </a:rPr>
-              <a:t>mean</a:t>
-            </a:r>
-            <a:r>
-              <a:rPr lang="en-US" dirty="0"/>
-              <a:t>, </a:t>
-            </a:r>
-            <a:r>
-              <a:rPr lang="en-US" dirty="0">
-                <a:solidFill>
-                  <a:schemeClr val="accent2"/>
-                </a:solidFill>
-              </a:rPr>
-              <a:t>variance</a:t>
-            </a:r>
-            <a:r>
-              <a:rPr lang="en-US" dirty="0"/>
-              <a:t> for range, time of flight</a:t>
-            </a:r>
-          </a:p>
-          <a:p>
-            <a:pPr lvl="1"/>
-            <a:r>
-              <a:rPr lang="en-US" dirty="0"/>
-              <a:t>Outputs can be </a:t>
-            </a:r>
-            <a:r>
-              <a:rPr lang="en-US" dirty="0">
-                <a:solidFill>
-                  <a:schemeClr val="accent2"/>
-                </a:solidFill>
-              </a:rPr>
-              <a:t>sensitivities</a:t>
-            </a:r>
-            <a:r>
-              <a:rPr lang="en-US" dirty="0"/>
-              <a:t> (</a:t>
-            </a:r>
-            <a:r>
-              <a:rPr lang="en-US" dirty="0">
-                <a:solidFill>
-                  <a:schemeClr val="accent2"/>
-                </a:solidFill>
-              </a:rPr>
-              <a:t>sens_r_y0</a:t>
-            </a:r>
-            <a:r>
-              <a:rPr lang="en-US" dirty="0"/>
-              <a:t>, </a:t>
-            </a:r>
-            <a:r>
-              <a:rPr lang="en-US" dirty="0" err="1">
-                <a:solidFill>
-                  <a:schemeClr val="accent2"/>
-                </a:solidFill>
-              </a:rPr>
-              <a:t>sens_r_ang</a:t>
-            </a:r>
-            <a:r>
-              <a:rPr lang="en-US" dirty="0"/>
-              <a:t>, </a:t>
-            </a:r>
-            <a:r>
-              <a:rPr lang="en-US" dirty="0" err="1"/>
-              <a:t>etc</a:t>
-            </a:r>
-            <a:r>
-              <a:rPr lang="en-US" dirty="0"/>
-              <a:t>)</a:t>
-            </a:r>
-          </a:p>
-          <a:p>
-            <a:r>
-              <a:rPr lang="en-US" dirty="0"/>
-              <a:t>Add a new </a:t>
-            </a:r>
-            <a:r>
-              <a:rPr lang="en-US" dirty="0" err="1"/>
-              <a:t>OutStream</a:t>
-            </a:r>
-            <a:r>
-              <a:rPr lang="en-US" dirty="0"/>
-              <a:t> </a:t>
-            </a:r>
-            <a:r>
-              <a:rPr lang="en-US" dirty="0">
-                <a:solidFill>
-                  <a:schemeClr val="accent2"/>
-                </a:solidFill>
-              </a:rPr>
-              <a:t>Print</a:t>
-            </a:r>
-          </a:p>
-          <a:p>
-            <a:r>
-              <a:rPr lang="en-US" dirty="0"/>
-              <a:t>Add new </a:t>
-            </a:r>
-            <a:r>
-              <a:rPr lang="en-US" dirty="0" err="1"/>
-              <a:t>OutStream</a:t>
-            </a:r>
-            <a:r>
-              <a:rPr lang="en-US" dirty="0"/>
-              <a:t> to </a:t>
-            </a:r>
-            <a:r>
-              <a:rPr lang="en-US" dirty="0" err="1"/>
-              <a:t>IOStep</a:t>
-            </a:r>
-            <a:r>
-              <a:rPr lang="en-US" dirty="0"/>
-              <a:t> “</a:t>
-            </a:r>
-            <a:r>
-              <a:rPr lang="en-US" dirty="0">
-                <a:solidFill>
-                  <a:schemeClr val="accent2"/>
-                </a:solidFill>
-              </a:rPr>
-              <a:t>plot</a:t>
-            </a:r>
-            <a:r>
-              <a:rPr lang="en-US" dirty="0"/>
-              <a:t>”</a:t>
-            </a:r>
-          </a:p>
-          <a:p>
-            <a:pPr lvl="1"/>
-            <a:r>
-              <a:rPr lang="en-US" dirty="0"/>
-              <a:t>Add new </a:t>
-            </a:r>
-            <a:r>
-              <a:rPr lang="en-US" dirty="0" err="1"/>
-              <a:t>DataObject</a:t>
-            </a:r>
-            <a:r>
-              <a:rPr lang="en-US" dirty="0"/>
-              <a:t> as Input</a:t>
-            </a:r>
-          </a:p>
-          <a:p>
-            <a:pPr lvl="1"/>
-            <a:r>
-              <a:rPr lang="en-US" dirty="0"/>
-              <a:t>Add new </a:t>
-            </a:r>
-            <a:r>
-              <a:rPr lang="en-US" dirty="0" err="1"/>
-              <a:t>OutStream</a:t>
-            </a:r>
-            <a:r>
-              <a:rPr lang="en-US" dirty="0"/>
-              <a:t> as Output</a:t>
-            </a:r>
+            <a:endParaRPr lang="en-US" dirty="0">
+              <a:solidFill>
+                <a:schemeClr val="accent2"/>
+              </a:solidFill>
+            </a:endParaRPr>
           </a:p>
         </p:txBody>
       </p:sp>
+      <p:pic>
+        <p:nvPicPr>
+          <p:cNvPr id="5" name="Picture 4">
+            <a:extLst>
+              <a:ext uri="{FF2B5EF4-FFF2-40B4-BE49-F238E27FC236}">
+                <a16:creationId xmlns:a16="http://schemas.microsoft.com/office/drawing/2014/main" id="{E34BD50D-C922-FC4D-B0F9-9F14155F9510}"/>
+              </a:ext>
+            </a:extLst>
+          </p:cNvPr>
+          <p:cNvPicPr>
+            <a:picLocks noChangeAspect="1"/>
+          </p:cNvPicPr>
+          <p:nvPr/>
+        </p:nvPicPr>
+        <p:blipFill>
+          <a:blip r:embed="rId2">
+            <a:extLst>
+              <a:ext uri="{28A0092B-C50C-407E-A947-70E740481C1C}">
+                <a14:useLocalDpi xmlns:a14="http://schemas.microsoft.com/office/drawing/2010/main" val="0"/>
+              </a:ext>
+            </a:extLst>
+          </a:blip>
+          <a:stretch>
+            <a:fillRect/>
+          </a:stretch>
+        </p:blipFill>
+        <p:spPr>
+          <a:xfrm>
+            <a:off x="2186609" y="6237301"/>
+            <a:ext cx="6957391" cy="620699"/>
+          </a:xfrm>
+          <a:prstGeom prst="rect">
+            <a:avLst/>
+          </a:prstGeom>
+        </p:spPr>
+      </p:pic>
     </p:spTree>
     <p:extLst>
       <p:ext uri="{BB962C8B-B14F-4D97-AF65-F5344CB8AC3E}">

</xml_diff>

<commit_message>
made a correction in the path of the projectile model in the slides
</commit_message>
<xml_diff>
--- a/doc/workshop/forwardSampling/ForwardSampling.pptx
+++ b/doc/workshop/forwardSampling/ForwardSampling.pptx
@@ -38179,7 +38179,7 @@
         <p:spPr>
           <a:xfrm>
             <a:off x="455613" y="1935179"/>
-            <a:ext cx="8494423" cy="1477328"/>
+            <a:ext cx="8494423" cy="1200329"/>
           </a:xfrm>
           <a:prstGeom prst="rect">
             <a:avLst/>
@@ -38264,7 +38264,7 @@
                 </a:solidFill>
                 <a:latin typeface="Lucida Console" panose="020B0609040504020204" pitchFamily="49" charset="0"/>
               </a:rPr>
-              <a:t> cd doc/workshop/</a:t>
+              <a:t> cd ~/projects/raven/doc/workshop/</a:t>
             </a:r>
             <a:r>
               <a:rPr lang="en-US" sz="1800" dirty="0" err="1">
@@ -38273,25 +38273,7 @@
                 </a:solidFill>
                 <a:latin typeface="Lucida Console" panose="020B0609040504020204" pitchFamily="49" charset="0"/>
               </a:rPr>
-              <a:t>forwardSampling</a:t>
-            </a:r>
-            <a:r>
-              <a:rPr lang="en-US" sz="1800" dirty="0">
-                <a:solidFill>
-                  <a:schemeClr val="bg1"/>
-                </a:solidFill>
-                <a:latin typeface="Lucida Console" panose="020B0609040504020204" pitchFamily="49" charset="0"/>
-              </a:rPr>
-              <a:t>/</a:t>
-            </a:r>
-            <a:r>
-              <a:rPr lang="en-US" sz="1800" dirty="0" err="1">
-                <a:solidFill>
-                  <a:schemeClr val="bg1"/>
-                </a:solidFill>
-                <a:latin typeface="Lucida Console" panose="020B0609040504020204" pitchFamily="49" charset="0"/>
-              </a:rPr>
-              <a:t>projectile_model</a:t>
+              <a:t>ExternalModels</a:t>
             </a:r>
             <a:endParaRPr lang="en-US" sz="1800" dirty="0">
               <a:latin typeface="Lucida Console" panose="020B0609040504020204" pitchFamily="49" charset="0"/>
@@ -38370,17 +38352,6 @@
               </a:rPr>
               <a:t> –o out</a:t>
             </a:r>
-          </a:p>
-          <a:p>
-            <a:pPr marL="0" indent="0">
-              <a:buNone/>
-            </a:pPr>
-            <a:endParaRPr lang="en-US" sz="1800" dirty="0">
-              <a:solidFill>
-                <a:schemeClr val="bg1"/>
-              </a:solidFill>
-              <a:latin typeface="Lucida Console" panose="020B0609040504020204" pitchFamily="49" charset="0"/>
-            </a:endParaRPr>
           </a:p>
         </p:txBody>
       </p:sp>
@@ -39152,12 +39123,8 @@
           <a:p>
             <a:pPr lvl="1"/>
             <a:r>
-              <a:rPr lang="en-US" dirty="0" err="1"/>
-              <a:t>visualstudio</a:t>
-            </a:r>
-            <a:r>
               <a:rPr lang="en-US" dirty="0"/>
-              <a:t> code</a:t>
+              <a:t>Visual Studio Code</a:t>
             </a:r>
           </a:p>
           <a:p>

</xml_diff>

<commit_message>
fixing instructions for exercise 3
</commit_message>
<xml_diff>
--- a/doc/workshop/forwardSampling/ForwardSampling.pptx
+++ b/doc/workshop/forwardSampling/ForwardSampling.pptx
@@ -35275,17 +35275,29 @@
           <a:p>
             <a:r>
               <a:rPr lang="en-US" dirty="0"/>
-              <a:t>Entities to adjust:</a:t>
+              <a:t>Entities to adjust: Change the working directory to ‘</a:t>
+            </a:r>
+            <a:r>
+              <a:rPr lang="en-US" dirty="0">
+                <a:solidFill>
+                  <a:srgbClr val="1A4DB2"/>
+                </a:solidFill>
+              </a:rPr>
+              <a:t>r3</a:t>
+            </a:r>
+            <a:r>
+              <a:rPr lang="en-US" dirty="0"/>
+              <a:t>’</a:t>
             </a:r>
           </a:p>
           <a:p>
             <a:pPr lvl="1"/>
             <a:r>
-              <a:rPr lang="en-US" dirty="0"/>
+              <a:rPr lang="en-US" sz="1800" dirty="0"/>
               <a:t>Change </a:t>
             </a:r>
             <a:r>
-              <a:rPr lang="en-US" dirty="0">
+              <a:rPr lang="en-US" sz="1800" dirty="0">
                 <a:solidFill>
                   <a:schemeClr val="accent2"/>
                 </a:solidFill>
@@ -35293,11 +35305,11 @@
               <a:t>v0</a:t>
             </a:r>
             <a:r>
-              <a:rPr lang="en-US" dirty="0"/>
+              <a:rPr lang="en-US" sz="1800" dirty="0"/>
               <a:t> to </a:t>
             </a:r>
             <a:r>
-              <a:rPr lang="en-US" dirty="0">
+              <a:rPr lang="en-US" sz="1800" dirty="0">
                 <a:solidFill>
                   <a:schemeClr val="accent2"/>
                 </a:solidFill>
@@ -35305,32 +35317,66 @@
               <a:t>y0</a:t>
             </a:r>
             <a:r>
-              <a:rPr lang="en-US" dirty="0"/>
+              <a:rPr lang="en-US" sz="1800" dirty="0"/>
               <a:t> in:</a:t>
             </a:r>
           </a:p>
           <a:p>
             <a:pPr lvl="2"/>
             <a:r>
-              <a:rPr lang="en-US" dirty="0"/>
-              <a:t>Models</a:t>
+              <a:rPr lang="en-US" sz="1800" dirty="0"/>
+              <a:t>Models </a:t>
+            </a:r>
+            <a:r>
+              <a:rPr lang="en-US" sz="1800" dirty="0">
+                <a:solidFill>
+                  <a:srgbClr val="FF0000"/>
+                </a:solidFill>
+              </a:rPr>
+              <a:t>(In fact, here you need to add both</a:t>
+            </a:r>
+          </a:p>
+          <a:p>
+            <a:pPr marL="914400" lvl="2" indent="0">
+              <a:buNone/>
+            </a:pPr>
+            <a:r>
+              <a:rPr lang="en-US" sz="1800" dirty="0">
+                <a:solidFill>
+                  <a:srgbClr val="FF0000"/>
+                </a:solidFill>
+              </a:rPr>
+              <a:t>otherwise v0=30 will not be recognized and will be</a:t>
+            </a:r>
+          </a:p>
+          <a:p>
+            <a:pPr marL="914400" lvl="2" indent="0">
+              <a:buNone/>
+            </a:pPr>
+            <a:r>
+              <a:rPr lang="en-US" sz="1800" dirty="0">
+                <a:solidFill>
+                  <a:srgbClr val="FF0000"/>
+                </a:solidFill>
+              </a:rPr>
+              <a:t>overwritten with default value in the model i.e., 1 m/s)</a:t>
             </a:r>
           </a:p>
           <a:p>
             <a:pPr lvl="2"/>
             <a:r>
-              <a:rPr lang="en-US" dirty="0"/>
+              <a:rPr lang="en-US" sz="1800" dirty="0"/>
               <a:t>Samplers</a:t>
             </a:r>
           </a:p>
           <a:p>
             <a:pPr lvl="3"/>
             <a:r>
-              <a:rPr lang="en-US" dirty="0"/>
+              <a:rPr lang="en-US" sz="1800" dirty="0"/>
               <a:t>Also change constant </a:t>
             </a:r>
             <a:r>
-              <a:rPr lang="en-US" dirty="0">
+              <a:rPr lang="en-US" sz="1800" dirty="0">
                 <a:solidFill>
                   <a:schemeClr val="accent2"/>
                 </a:solidFill>
@@ -35338,11 +35384,11 @@
               <a:t>y0</a:t>
             </a:r>
             <a:r>
-              <a:rPr lang="en-US" dirty="0"/>
+              <a:rPr lang="en-US" sz="1800" dirty="0"/>
               <a:t> to </a:t>
             </a:r>
             <a:r>
-              <a:rPr lang="en-US" dirty="0">
+              <a:rPr lang="en-US" sz="1800" dirty="0">
                 <a:solidFill>
                   <a:schemeClr val="accent2"/>
                 </a:solidFill>
@@ -35350,25 +35396,25 @@
               <a:t>v0</a:t>
             </a:r>
             <a:r>
-              <a:rPr lang="en-US" dirty="0"/>
+              <a:rPr lang="en-US" sz="1800" dirty="0"/>
               <a:t> with value of 30</a:t>
             </a:r>
           </a:p>
           <a:p>
             <a:pPr lvl="2"/>
             <a:r>
-              <a:rPr lang="en-US" dirty="0"/>
+              <a:rPr lang="en-US" sz="1800" dirty="0"/>
               <a:t>Distributions</a:t>
             </a:r>
           </a:p>
           <a:p>
             <a:pPr lvl="3"/>
             <a:r>
-              <a:rPr lang="en-US" dirty="0"/>
+              <a:rPr lang="en-US" sz="1800" dirty="0"/>
               <a:t>Also change the distribution </a:t>
             </a:r>
             <a:r>
-              <a:rPr lang="en-US" dirty="0">
+              <a:rPr lang="en-US" sz="1800" dirty="0">
                 <a:solidFill>
                   <a:schemeClr val="accent2"/>
                 </a:solidFill>
@@ -35376,39 +35422,39 @@
               <a:t>y0_dist </a:t>
             </a:r>
             <a:r>
-              <a:rPr lang="en-US" dirty="0"/>
+              <a:rPr lang="en-US" sz="1800" dirty="0"/>
               <a:t>to Uniform, 0 to 1</a:t>
             </a:r>
           </a:p>
           <a:p>
             <a:pPr lvl="2"/>
             <a:r>
-              <a:rPr lang="en-US" dirty="0" err="1"/>
+              <a:rPr lang="en-US" sz="1800" dirty="0" err="1"/>
               <a:t>DataObjects</a:t>
             </a:r>
-            <a:endParaRPr lang="en-US" dirty="0"/>
+            <a:endParaRPr lang="en-US" sz="1800" dirty="0"/>
           </a:p>
           <a:p>
             <a:pPr lvl="2"/>
             <a:r>
-              <a:rPr lang="en-US" dirty="0" err="1"/>
+              <a:rPr lang="en-US" sz="1800" dirty="0" err="1"/>
               <a:t>OutStreams</a:t>
             </a:r>
             <a:r>
-              <a:rPr lang="en-US" dirty="0"/>
+              <a:rPr lang="en-US" sz="1800" dirty="0"/>
               <a:t> </a:t>
             </a:r>
             <a:r>
-              <a:rPr lang="en-US" dirty="0">
+              <a:rPr lang="en-US" sz="1800" dirty="0">
                 <a:sym typeface="Wingdings" pitchFamily="2" charset="2"/>
               </a:rPr>
               <a:t> Plot</a:t>
             </a:r>
-            <a:endParaRPr lang="en-US" dirty="0"/>
+            <a:endParaRPr lang="en-US" sz="1800" dirty="0"/>
           </a:p>
           <a:p>
             <a:r>
-              <a:rPr lang="en-US" b="1" dirty="0">
+              <a:rPr lang="en-US" sz="1800" b="1" dirty="0">
                 <a:solidFill>
                   <a:schemeClr val="accent1"/>
                 </a:solidFill>
@@ -35416,7 +35462,7 @@
               <a:t>Run the case.</a:t>
             </a:r>
             <a:r>
-              <a:rPr lang="en-US" dirty="0"/>
+              <a:rPr lang="en-US" sz="1800" dirty="0"/>
               <a:t>  Plot should have y0 instead of v0.</a:t>
             </a:r>
           </a:p>

</xml_diff>

<commit_message>
Fixing through execise 4
</commit_message>
<xml_diff>
--- a/doc/workshop/forwardSampling/ForwardSampling.pptx
+++ b/doc/workshop/forwardSampling/ForwardSampling.pptx
@@ -35766,216 +35766,6 @@
           <a:chExt cx="0" cy="0"/>
         </a:xfrm>
       </p:grpSpPr>
-      <p:sp>
-        <p:nvSpPr>
-          <p:cNvPr id="2" name="Title 1">
-            <a:extLst>
-              <a:ext uri="{FF2B5EF4-FFF2-40B4-BE49-F238E27FC236}">
-                <a16:creationId xmlns:a16="http://schemas.microsoft.com/office/drawing/2014/main" id="{6CFE73B4-A998-1C41-B18E-D5A5FC19D5C1}"/>
-              </a:ext>
-            </a:extLst>
-          </p:cNvPr>
-          <p:cNvSpPr>
-            <a:spLocks noGrp="1"/>
-          </p:cNvSpPr>
-          <p:nvPr>
-            <p:ph type="title"/>
-          </p:nvPr>
-        </p:nvSpPr>
-        <p:spPr/>
-        <p:txBody>
-          <a:bodyPr/>
-          <a:lstStyle/>
-          <a:p>
-            <a:r>
-              <a:rPr lang="en-US" dirty="0"/>
-              <a:t>4) Changing Samplers</a:t>
-            </a:r>
-          </a:p>
-        </p:txBody>
-      </p:sp>
-      <p:sp>
-        <p:nvSpPr>
-          <p:cNvPr id="3" name="Content Placeholder 2">
-            <a:extLst>
-              <a:ext uri="{FF2B5EF4-FFF2-40B4-BE49-F238E27FC236}">
-                <a16:creationId xmlns:a16="http://schemas.microsoft.com/office/drawing/2014/main" id="{69B98CC8-17F2-0244-9C8C-816FE596FC02}"/>
-              </a:ext>
-            </a:extLst>
-          </p:cNvPr>
-          <p:cNvSpPr>
-            <a:spLocks noGrp="1"/>
-          </p:cNvSpPr>
-          <p:nvPr>
-            <p:ph idx="1"/>
-          </p:nvPr>
-        </p:nvSpPr>
-        <p:spPr/>
-        <p:txBody>
-          <a:bodyPr/>
-          <a:lstStyle/>
-          <a:p>
-            <a:r>
-              <a:rPr lang="en-US" dirty="0"/>
-              <a:t>So far we’ve used the Monte Carlo sampler</a:t>
-            </a:r>
-          </a:p>
-          <a:p>
-            <a:pPr lvl="1"/>
-            <a:r>
-              <a:rPr lang="en-US" dirty="0"/>
-              <a:t>Samples randomly each time from variable distributions</a:t>
-            </a:r>
-          </a:p>
-          <a:p>
-            <a:r>
-              <a:rPr lang="en-US" dirty="0"/>
-              <a:t>Many other sampling strategies exist.  For example:</a:t>
-            </a:r>
-          </a:p>
-          <a:p>
-            <a:pPr lvl="1"/>
-            <a:r>
-              <a:rPr lang="en-US" dirty="0"/>
-              <a:t>Grid</a:t>
-            </a:r>
-          </a:p>
-          <a:p>
-            <a:pPr lvl="2"/>
-            <a:r>
-              <a:rPr lang="en-US" dirty="0"/>
-              <a:t>Takes uniformly-spaced samples across variable’s domain</a:t>
-            </a:r>
-          </a:p>
-          <a:p>
-            <a:pPr lvl="2"/>
-            <a:r>
-              <a:rPr lang="en-US" dirty="0"/>
-              <a:t>Samples uniformly in:</a:t>
-            </a:r>
-          </a:p>
-          <a:p>
-            <a:pPr lvl="3"/>
-            <a:r>
-              <a:rPr lang="en-US" dirty="0"/>
-              <a:t>Value space</a:t>
-            </a:r>
-          </a:p>
-          <a:p>
-            <a:pPr lvl="3"/>
-            <a:r>
-              <a:rPr lang="en-US" dirty="0"/>
-              <a:t>Probability space</a:t>
-            </a:r>
-          </a:p>
-          <a:p>
-            <a:r>
-              <a:rPr lang="en-US" dirty="0"/>
-              <a:t>Copy exercise 3, add a </a:t>
-            </a:r>
-            <a:r>
-              <a:rPr lang="en-US" b="1" dirty="0">
-                <a:solidFill>
-                  <a:schemeClr val="accent2"/>
-                </a:solidFill>
-              </a:rPr>
-              <a:t>Grid</a:t>
-            </a:r>
-            <a:r>
-              <a:rPr lang="en-US" dirty="0"/>
-              <a:t> sampler</a:t>
-            </a:r>
-          </a:p>
-          <a:p>
-            <a:r>
-              <a:rPr lang="en-US" dirty="0"/>
-              <a:t>change Steps to use Grid sampler you make</a:t>
-            </a:r>
-          </a:p>
-          <a:p>
-            <a:pPr lvl="1"/>
-            <a:r>
-              <a:rPr lang="en-US" dirty="0"/>
-              <a:t>Don’t remove the Monte Carlo sampler!</a:t>
-            </a:r>
-          </a:p>
-          <a:p>
-            <a:pPr lvl="1"/>
-            <a:r>
-              <a:rPr lang="en-US" dirty="0"/>
-              <a:t>See user manual section 10.1.2</a:t>
-            </a:r>
-          </a:p>
-          <a:p>
-            <a:pPr lvl="1"/>
-            <a:r>
-              <a:rPr lang="en-US" dirty="0"/>
-              <a:t>Don’t forget the </a:t>
-            </a:r>
-            <a:r>
-              <a:rPr lang="en-US" dirty="0">
-                <a:solidFill>
-                  <a:schemeClr val="accent2"/>
-                </a:solidFill>
-              </a:rPr>
-              <a:t>&lt;grid&gt; </a:t>
-            </a:r>
-            <a:r>
-              <a:rPr lang="en-US" dirty="0"/>
-              <a:t>nodes, also remove </a:t>
-            </a:r>
-            <a:r>
-              <a:rPr lang="en-US" dirty="0">
-                <a:solidFill>
-                  <a:schemeClr val="accent2"/>
-                </a:solidFill>
-              </a:rPr>
-              <a:t>&lt;</a:t>
-            </a:r>
-            <a:r>
-              <a:rPr lang="en-US" dirty="0" err="1">
-                <a:solidFill>
-                  <a:schemeClr val="accent2"/>
-                </a:solidFill>
-              </a:rPr>
-              <a:t>samplerInit</a:t>
-            </a:r>
-            <a:r>
-              <a:rPr lang="en-US" dirty="0">
-                <a:solidFill>
-                  <a:schemeClr val="accent2"/>
-                </a:solidFill>
-              </a:rPr>
-              <a:t>&gt;</a:t>
-            </a:r>
-            <a:r>
-              <a:rPr lang="en-US" dirty="0"/>
-              <a:t> node </a:t>
-            </a:r>
-          </a:p>
-          <a:p>
-            <a:pPr lvl="1"/>
-            <a:r>
-              <a:rPr lang="en-US" dirty="0"/>
-              <a:t>Choose how you want to space samples (try a couple options!)</a:t>
-            </a:r>
-          </a:p>
-          <a:p>
-            <a:r>
-              <a:rPr lang="en-US" b="1" dirty="0">
-                <a:solidFill>
-                  <a:schemeClr val="accent1"/>
-                </a:solidFill>
-              </a:rPr>
-              <a:t>Run the case.</a:t>
-            </a:r>
-            <a:r>
-              <a:rPr lang="en-US" dirty="0"/>
-              <a:t>  How are the samples dispersed differently?</a:t>
-            </a:r>
-          </a:p>
-        </p:txBody>
-      </p:sp>
       <p:pic>
         <p:nvPicPr>
           <p:cNvPr id="5" name="Picture 4">
@@ -36012,6 +35802,277 @@
           </a:prstGeom>
         </p:spPr>
       </p:pic>
+      <p:sp>
+        <p:nvSpPr>
+          <p:cNvPr id="2" name="Title 1">
+            <a:extLst>
+              <a:ext uri="{FF2B5EF4-FFF2-40B4-BE49-F238E27FC236}">
+                <a16:creationId xmlns:a16="http://schemas.microsoft.com/office/drawing/2014/main" id="{6CFE73B4-A998-1C41-B18E-D5A5FC19D5C1}"/>
+              </a:ext>
+            </a:extLst>
+          </p:cNvPr>
+          <p:cNvSpPr>
+            <a:spLocks noGrp="1"/>
+          </p:cNvSpPr>
+          <p:nvPr>
+            <p:ph type="title"/>
+          </p:nvPr>
+        </p:nvSpPr>
+        <p:spPr/>
+        <p:txBody>
+          <a:bodyPr/>
+          <a:lstStyle/>
+          <a:p>
+            <a:r>
+              <a:rPr lang="en-US" dirty="0"/>
+              <a:t>4) Changing Samplers</a:t>
+            </a:r>
+          </a:p>
+        </p:txBody>
+      </p:sp>
+      <p:sp>
+        <p:nvSpPr>
+          <p:cNvPr id="3" name="Content Placeholder 2">
+            <a:extLst>
+              <a:ext uri="{FF2B5EF4-FFF2-40B4-BE49-F238E27FC236}">
+                <a16:creationId xmlns:a16="http://schemas.microsoft.com/office/drawing/2014/main" id="{69B98CC8-17F2-0244-9C8C-816FE596FC02}"/>
+              </a:ext>
+            </a:extLst>
+          </p:cNvPr>
+          <p:cNvSpPr>
+            <a:spLocks noGrp="1"/>
+          </p:cNvSpPr>
+          <p:nvPr>
+            <p:ph idx="1"/>
+          </p:nvPr>
+        </p:nvSpPr>
+        <p:spPr>
+          <a:xfrm>
+            <a:off x="455613" y="1437032"/>
+            <a:ext cx="8231187" cy="4524375"/>
+          </a:xfrm>
+        </p:spPr>
+        <p:txBody>
+          <a:bodyPr/>
+          <a:lstStyle/>
+          <a:p>
+            <a:r>
+              <a:rPr lang="en-US" sz="1800" dirty="0"/>
+              <a:t>So far, we’ve used the Monte Carlo sampler</a:t>
+            </a:r>
+          </a:p>
+          <a:p>
+            <a:pPr lvl="1"/>
+            <a:r>
+              <a:rPr lang="en-US" sz="1800" dirty="0"/>
+              <a:t>Samples randomly each time from variable distributions</a:t>
+            </a:r>
+          </a:p>
+          <a:p>
+            <a:r>
+              <a:rPr lang="en-US" sz="1800" dirty="0"/>
+              <a:t>Many other sampling strategies exist.  For example:</a:t>
+            </a:r>
+          </a:p>
+          <a:p>
+            <a:pPr lvl="1"/>
+            <a:r>
+              <a:rPr lang="en-US" sz="1800" dirty="0"/>
+              <a:t>Grid</a:t>
+            </a:r>
+          </a:p>
+          <a:p>
+            <a:pPr lvl="2"/>
+            <a:r>
+              <a:rPr lang="en-US" sz="1800" dirty="0"/>
+              <a:t>Takes uniformly-spaced samples across the variable’s domain</a:t>
+            </a:r>
+          </a:p>
+          <a:p>
+            <a:pPr lvl="2"/>
+            <a:r>
+              <a:rPr lang="en-US" sz="1800" dirty="0"/>
+              <a:t>Samples uniformly in:</a:t>
+            </a:r>
+          </a:p>
+          <a:p>
+            <a:pPr lvl="3"/>
+            <a:r>
+              <a:rPr lang="en-US" sz="1800" dirty="0"/>
+              <a:t>Value space</a:t>
+            </a:r>
+          </a:p>
+          <a:p>
+            <a:pPr lvl="3"/>
+            <a:r>
+              <a:rPr lang="en-US" sz="1800" dirty="0"/>
+              <a:t>Probability space</a:t>
+            </a:r>
+          </a:p>
+          <a:p>
+            <a:r>
+              <a:rPr lang="en-US" sz="1800" dirty="0"/>
+              <a:t>Copy exercise 3 to </a:t>
+            </a:r>
+            <a:r>
+              <a:rPr lang="en-US" sz="1800" dirty="0">
+                <a:solidFill>
+                  <a:srgbClr val="FF0000"/>
+                </a:solidFill>
+              </a:rPr>
+              <a:t>4_grid_sampler.xml</a:t>
+            </a:r>
+            <a:r>
+              <a:rPr lang="en-US" sz="1800" dirty="0"/>
+              <a:t>,</a:t>
+            </a:r>
+          </a:p>
+          <a:p>
+            <a:pPr marL="0" indent="0">
+              <a:buNone/>
+            </a:pPr>
+            <a:r>
+              <a:rPr lang="en-US" sz="1800" dirty="0"/>
+              <a:t>    set &lt;</a:t>
+            </a:r>
+            <a:r>
+              <a:rPr lang="en-US" sz="1800" dirty="0" err="1"/>
+              <a:t>workingDirectory</a:t>
+            </a:r>
+            <a:r>
+              <a:rPr lang="en-US" sz="1800" dirty="0"/>
+              <a:t>&gt; to </a:t>
+            </a:r>
+            <a:r>
+              <a:rPr lang="en-US" sz="1800" dirty="0">
+                <a:solidFill>
+                  <a:srgbClr val="FF0000"/>
+                </a:solidFill>
+              </a:rPr>
+              <a:t>r4</a:t>
+            </a:r>
+          </a:p>
+          <a:p>
+            <a:r>
+              <a:rPr lang="en-US" sz="1800" dirty="0"/>
+              <a:t>Add a </a:t>
+            </a:r>
+            <a:r>
+              <a:rPr lang="en-US" sz="1800" b="1" dirty="0">
+                <a:solidFill>
+                  <a:schemeClr val="accent2"/>
+                </a:solidFill>
+              </a:rPr>
+              <a:t>Grid</a:t>
+            </a:r>
+            <a:r>
+              <a:rPr lang="en-US" sz="1800" dirty="0"/>
+              <a:t> sampler and call it </a:t>
+            </a:r>
+            <a:r>
+              <a:rPr lang="en-US" sz="1800" dirty="0" err="1">
+                <a:solidFill>
+                  <a:srgbClr val="FF0000"/>
+                </a:solidFill>
+              </a:rPr>
+              <a:t>my_grid</a:t>
+            </a:r>
+            <a:endParaRPr lang="en-US" sz="1800" dirty="0">
+              <a:solidFill>
+                <a:srgbClr val="FF0000"/>
+              </a:solidFill>
+            </a:endParaRPr>
+          </a:p>
+          <a:p>
+            <a:r>
+              <a:rPr lang="en-US" sz="1800" dirty="0"/>
+              <a:t>change Steps to use the Grid sampler you make</a:t>
+            </a:r>
+          </a:p>
+          <a:p>
+            <a:pPr lvl="1"/>
+            <a:r>
+              <a:rPr lang="en-US" sz="1800" dirty="0"/>
+              <a:t>Don’t remove the Monte Carlo sampler!</a:t>
+            </a:r>
+          </a:p>
+          <a:p>
+            <a:pPr lvl="1"/>
+            <a:r>
+              <a:rPr lang="en-US" sz="1800" dirty="0"/>
+              <a:t>See user manual section 10.1.2</a:t>
+            </a:r>
+          </a:p>
+          <a:p>
+            <a:pPr lvl="1"/>
+            <a:r>
+              <a:rPr lang="en-US" sz="1800" dirty="0"/>
+              <a:t>Don’t forget the </a:t>
+            </a:r>
+            <a:r>
+              <a:rPr lang="en-US" sz="1800" dirty="0">
+                <a:solidFill>
+                  <a:schemeClr val="accent2"/>
+                </a:solidFill>
+              </a:rPr>
+              <a:t>&lt;grid&gt; </a:t>
+            </a:r>
+            <a:r>
+              <a:rPr lang="en-US" sz="1800" dirty="0"/>
+              <a:t>nodes, also remove </a:t>
+            </a:r>
+            <a:r>
+              <a:rPr lang="en-US" sz="1800" dirty="0">
+                <a:solidFill>
+                  <a:schemeClr val="accent2"/>
+                </a:solidFill>
+              </a:rPr>
+              <a:t>&lt;</a:t>
+            </a:r>
+            <a:r>
+              <a:rPr lang="en-US" sz="1800" dirty="0" err="1">
+                <a:solidFill>
+                  <a:schemeClr val="accent2"/>
+                </a:solidFill>
+              </a:rPr>
+              <a:t>samplerInit</a:t>
+            </a:r>
+            <a:r>
+              <a:rPr lang="en-US" sz="1800" dirty="0">
+                <a:solidFill>
+                  <a:schemeClr val="accent2"/>
+                </a:solidFill>
+              </a:rPr>
+              <a:t>&gt;</a:t>
+            </a:r>
+            <a:r>
+              <a:rPr lang="en-US" sz="1800" dirty="0"/>
+              <a:t> node </a:t>
+            </a:r>
+          </a:p>
+          <a:p>
+            <a:pPr lvl="1"/>
+            <a:r>
+              <a:rPr lang="en-US" sz="1800" dirty="0"/>
+              <a:t>Choose how you want to space samples (try a couple of options!)</a:t>
+            </a:r>
+          </a:p>
+          <a:p>
+            <a:r>
+              <a:rPr lang="en-US" sz="1800" b="1" dirty="0">
+                <a:solidFill>
+                  <a:schemeClr val="accent1"/>
+                </a:solidFill>
+              </a:rPr>
+              <a:t>Run the case.</a:t>
+            </a:r>
+            <a:r>
+              <a:rPr lang="en-US" sz="1800" dirty="0"/>
+              <a:t>  How are the samples dispersed differently?</a:t>
+            </a:r>
+          </a:p>
+        </p:txBody>
+      </p:sp>
     </p:spTree>
     <p:extLst>
       <p:ext uri="{BB962C8B-B14F-4D97-AF65-F5344CB8AC3E}">

</xml_diff>

<commit_message>
fixing caller in models factory, fixing the frward sampoling issues in the power points
</commit_message>
<xml_diff>
--- a/doc/workshop/forwardSampling/ForwardSampling.pptx
+++ b/doc/workshop/forwardSampling/ForwardSampling.pptx
@@ -36761,7 +36761,12 @@
             <p:ph type="title"/>
           </p:nvPr>
         </p:nvSpPr>
-        <p:spPr/>
+        <p:spPr>
+          <a:xfrm>
+            <a:off x="286647" y="408540"/>
+            <a:ext cx="8231187" cy="363537"/>
+          </a:xfrm>
+        </p:spPr>
         <p:txBody>
           <a:bodyPr/>
           <a:lstStyle/>
@@ -36789,7 +36794,12 @@
             <p:ph idx="1"/>
           </p:nvPr>
         </p:nvSpPr>
-        <p:spPr/>
+        <p:spPr>
+          <a:xfrm>
+            <a:off x="286647" y="1002265"/>
+            <a:ext cx="8231187" cy="4524375"/>
+          </a:xfrm>
+        </p:spPr>
         <p:txBody>
           <a:bodyPr/>
           <a:lstStyle/>
@@ -36958,9 +36968,16 @@
                   <a:schemeClr val="accent2"/>
                 </a:solidFill>
               </a:rPr>
-              <a:t> angle</a:t>
-            </a:r>
-            <a:endParaRPr lang="en-US" dirty="0"/>
+              <a:t> angle </a:t>
+            </a:r>
+            <a:r>
+              <a:rPr lang="en-US" dirty="0">
+                <a:solidFill>
+                  <a:srgbClr val="FF0000"/>
+                </a:solidFill>
+              </a:rPr>
+              <a:t>(What happens if all are in outputs)</a:t>
+            </a:r>
           </a:p>
           <a:p>
             <a:r>
@@ -37168,14 +37185,13 @@
               </a:ext>
             </a:extLst>
           </a:blip>
-          <a:stretch>
-            <a:fillRect/>
-          </a:stretch>
+          <a:srcRect/>
+          <a:stretch/>
         </p:blipFill>
         <p:spPr>
           <a:xfrm>
-            <a:off x="2186609" y="6237301"/>
-            <a:ext cx="6957391" cy="620699"/>
+            <a:off x="1249734" y="6008701"/>
+            <a:ext cx="6644531" cy="620699"/>
           </a:xfrm>
           <a:prstGeom prst="rect">
             <a:avLst/>

</xml_diff>

<commit_message>
Fixing workshop Issues related to Forward Sampling (#1888)
* adding linModel.py

* made a correction in the path of the projectile model in the slides

* fixing instructions for exercise 3

* Fixing through execise 4

* fixing caller in models factory, fixing the frward sampoling issues in the power points

* removing linModel

* adding pptx again
</commit_message>
<xml_diff>
--- a/doc/workshop/forwardSampling/ForwardSampling.pptx
+++ b/doc/workshop/forwardSampling/ForwardSampling.pptx
@@ -35275,17 +35275,29 @@
           <a:p>
             <a:r>
               <a:rPr lang="en-US" dirty="0"/>
-              <a:t>Entities to adjust:</a:t>
+              <a:t>Entities to adjust: Change the working directory to ‘</a:t>
+            </a:r>
+            <a:r>
+              <a:rPr lang="en-US" dirty="0">
+                <a:solidFill>
+                  <a:srgbClr val="1A4DB2"/>
+                </a:solidFill>
+              </a:rPr>
+              <a:t>r3</a:t>
+            </a:r>
+            <a:r>
+              <a:rPr lang="en-US" dirty="0"/>
+              <a:t>’</a:t>
             </a:r>
           </a:p>
           <a:p>
             <a:pPr lvl="1"/>
             <a:r>
-              <a:rPr lang="en-US" dirty="0"/>
+              <a:rPr lang="en-US" sz="1800" dirty="0"/>
               <a:t>Change </a:t>
             </a:r>
             <a:r>
-              <a:rPr lang="en-US" dirty="0">
+              <a:rPr lang="en-US" sz="1800" dirty="0">
                 <a:solidFill>
                   <a:schemeClr val="accent2"/>
                 </a:solidFill>
@@ -35293,11 +35305,11 @@
               <a:t>v0</a:t>
             </a:r>
             <a:r>
-              <a:rPr lang="en-US" dirty="0"/>
+              <a:rPr lang="en-US" sz="1800" dirty="0"/>
               <a:t> to </a:t>
             </a:r>
             <a:r>
-              <a:rPr lang="en-US" dirty="0">
+              <a:rPr lang="en-US" sz="1800" dirty="0">
                 <a:solidFill>
                   <a:schemeClr val="accent2"/>
                 </a:solidFill>
@@ -35305,32 +35317,66 @@
               <a:t>y0</a:t>
             </a:r>
             <a:r>
-              <a:rPr lang="en-US" dirty="0"/>
+              <a:rPr lang="en-US" sz="1800" dirty="0"/>
               <a:t> in:</a:t>
             </a:r>
           </a:p>
           <a:p>
             <a:pPr lvl="2"/>
             <a:r>
-              <a:rPr lang="en-US" dirty="0"/>
-              <a:t>Models</a:t>
+              <a:rPr lang="en-US" sz="1800" dirty="0"/>
+              <a:t>Models </a:t>
+            </a:r>
+            <a:r>
+              <a:rPr lang="en-US" sz="1800" dirty="0">
+                <a:solidFill>
+                  <a:srgbClr val="FF0000"/>
+                </a:solidFill>
+              </a:rPr>
+              <a:t>(In fact, here you need to add both</a:t>
+            </a:r>
+          </a:p>
+          <a:p>
+            <a:pPr marL="914400" lvl="2" indent="0">
+              <a:buNone/>
+            </a:pPr>
+            <a:r>
+              <a:rPr lang="en-US" sz="1800" dirty="0">
+                <a:solidFill>
+                  <a:srgbClr val="FF0000"/>
+                </a:solidFill>
+              </a:rPr>
+              <a:t>otherwise v0=30 will not be recognized and will be</a:t>
+            </a:r>
+          </a:p>
+          <a:p>
+            <a:pPr marL="914400" lvl="2" indent="0">
+              <a:buNone/>
+            </a:pPr>
+            <a:r>
+              <a:rPr lang="en-US" sz="1800" dirty="0">
+                <a:solidFill>
+                  <a:srgbClr val="FF0000"/>
+                </a:solidFill>
+              </a:rPr>
+              <a:t>overwritten with default value in the model i.e., 1 m/s)</a:t>
             </a:r>
           </a:p>
           <a:p>
             <a:pPr lvl="2"/>
             <a:r>
-              <a:rPr lang="en-US" dirty="0"/>
+              <a:rPr lang="en-US" sz="1800" dirty="0"/>
               <a:t>Samplers</a:t>
             </a:r>
           </a:p>
           <a:p>
             <a:pPr lvl="3"/>
             <a:r>
-              <a:rPr lang="en-US" dirty="0"/>
+              <a:rPr lang="en-US" sz="1800" dirty="0"/>
               <a:t>Also change constant </a:t>
             </a:r>
             <a:r>
-              <a:rPr lang="en-US" dirty="0">
+              <a:rPr lang="en-US" sz="1800" dirty="0">
                 <a:solidFill>
                   <a:schemeClr val="accent2"/>
                 </a:solidFill>
@@ -35338,11 +35384,11 @@
               <a:t>y0</a:t>
             </a:r>
             <a:r>
-              <a:rPr lang="en-US" dirty="0"/>
+              <a:rPr lang="en-US" sz="1800" dirty="0"/>
               <a:t> to </a:t>
             </a:r>
             <a:r>
-              <a:rPr lang="en-US" dirty="0">
+              <a:rPr lang="en-US" sz="1800" dirty="0">
                 <a:solidFill>
                   <a:schemeClr val="accent2"/>
                 </a:solidFill>
@@ -35350,25 +35396,25 @@
               <a:t>v0</a:t>
             </a:r>
             <a:r>
-              <a:rPr lang="en-US" dirty="0"/>
+              <a:rPr lang="en-US" sz="1800" dirty="0"/>
               <a:t> with value of 30</a:t>
             </a:r>
           </a:p>
           <a:p>
             <a:pPr lvl="2"/>
             <a:r>
-              <a:rPr lang="en-US" dirty="0"/>
+              <a:rPr lang="en-US" sz="1800" dirty="0"/>
               <a:t>Distributions</a:t>
             </a:r>
           </a:p>
           <a:p>
             <a:pPr lvl="3"/>
             <a:r>
-              <a:rPr lang="en-US" dirty="0"/>
+              <a:rPr lang="en-US" sz="1800" dirty="0"/>
               <a:t>Also change the distribution </a:t>
             </a:r>
             <a:r>
-              <a:rPr lang="en-US" dirty="0">
+              <a:rPr lang="en-US" sz="1800" dirty="0">
                 <a:solidFill>
                   <a:schemeClr val="accent2"/>
                 </a:solidFill>
@@ -35376,39 +35422,39 @@
               <a:t>y0_dist </a:t>
             </a:r>
             <a:r>
-              <a:rPr lang="en-US" dirty="0"/>
+              <a:rPr lang="en-US" sz="1800" dirty="0"/>
               <a:t>to Uniform, 0 to 1</a:t>
             </a:r>
           </a:p>
           <a:p>
             <a:pPr lvl="2"/>
             <a:r>
-              <a:rPr lang="en-US" dirty="0" err="1"/>
+              <a:rPr lang="en-US" sz="1800" dirty="0" err="1"/>
               <a:t>DataObjects</a:t>
             </a:r>
-            <a:endParaRPr lang="en-US" dirty="0"/>
+            <a:endParaRPr lang="en-US" sz="1800" dirty="0"/>
           </a:p>
           <a:p>
             <a:pPr lvl="2"/>
             <a:r>
-              <a:rPr lang="en-US" dirty="0" err="1"/>
+              <a:rPr lang="en-US" sz="1800" dirty="0" err="1"/>
               <a:t>OutStreams</a:t>
             </a:r>
             <a:r>
-              <a:rPr lang="en-US" dirty="0"/>
+              <a:rPr lang="en-US" sz="1800" dirty="0"/>
               <a:t> </a:t>
             </a:r>
             <a:r>
-              <a:rPr lang="en-US" dirty="0">
+              <a:rPr lang="en-US" sz="1800" dirty="0">
                 <a:sym typeface="Wingdings" pitchFamily="2" charset="2"/>
               </a:rPr>
               <a:t> Plot</a:t>
             </a:r>
-            <a:endParaRPr lang="en-US" dirty="0"/>
+            <a:endParaRPr lang="en-US" sz="1800" dirty="0"/>
           </a:p>
           <a:p>
             <a:r>
-              <a:rPr lang="en-US" b="1" dirty="0">
+              <a:rPr lang="en-US" sz="1800" b="1" dirty="0">
                 <a:solidFill>
                   <a:schemeClr val="accent1"/>
                 </a:solidFill>
@@ -35416,7 +35462,7 @@
               <a:t>Run the case.</a:t>
             </a:r>
             <a:r>
-              <a:rPr lang="en-US" dirty="0"/>
+              <a:rPr lang="en-US" sz="1800" dirty="0"/>
               <a:t>  Plot should have y0 instead of v0.</a:t>
             </a:r>
           </a:p>
@@ -35720,216 +35766,6 @@
           <a:chExt cx="0" cy="0"/>
         </a:xfrm>
       </p:grpSpPr>
-      <p:sp>
-        <p:nvSpPr>
-          <p:cNvPr id="2" name="Title 1">
-            <a:extLst>
-              <a:ext uri="{FF2B5EF4-FFF2-40B4-BE49-F238E27FC236}">
-                <a16:creationId xmlns:a16="http://schemas.microsoft.com/office/drawing/2014/main" id="{6CFE73B4-A998-1C41-B18E-D5A5FC19D5C1}"/>
-              </a:ext>
-            </a:extLst>
-          </p:cNvPr>
-          <p:cNvSpPr>
-            <a:spLocks noGrp="1"/>
-          </p:cNvSpPr>
-          <p:nvPr>
-            <p:ph type="title"/>
-          </p:nvPr>
-        </p:nvSpPr>
-        <p:spPr/>
-        <p:txBody>
-          <a:bodyPr/>
-          <a:lstStyle/>
-          <a:p>
-            <a:r>
-              <a:rPr lang="en-US" dirty="0"/>
-              <a:t>4) Changing Samplers</a:t>
-            </a:r>
-          </a:p>
-        </p:txBody>
-      </p:sp>
-      <p:sp>
-        <p:nvSpPr>
-          <p:cNvPr id="3" name="Content Placeholder 2">
-            <a:extLst>
-              <a:ext uri="{FF2B5EF4-FFF2-40B4-BE49-F238E27FC236}">
-                <a16:creationId xmlns:a16="http://schemas.microsoft.com/office/drawing/2014/main" id="{69B98CC8-17F2-0244-9C8C-816FE596FC02}"/>
-              </a:ext>
-            </a:extLst>
-          </p:cNvPr>
-          <p:cNvSpPr>
-            <a:spLocks noGrp="1"/>
-          </p:cNvSpPr>
-          <p:nvPr>
-            <p:ph idx="1"/>
-          </p:nvPr>
-        </p:nvSpPr>
-        <p:spPr/>
-        <p:txBody>
-          <a:bodyPr/>
-          <a:lstStyle/>
-          <a:p>
-            <a:r>
-              <a:rPr lang="en-US" dirty="0"/>
-              <a:t>So far we’ve used the Monte Carlo sampler</a:t>
-            </a:r>
-          </a:p>
-          <a:p>
-            <a:pPr lvl="1"/>
-            <a:r>
-              <a:rPr lang="en-US" dirty="0"/>
-              <a:t>Samples randomly each time from variable distributions</a:t>
-            </a:r>
-          </a:p>
-          <a:p>
-            <a:r>
-              <a:rPr lang="en-US" dirty="0"/>
-              <a:t>Many other sampling strategies exist.  For example:</a:t>
-            </a:r>
-          </a:p>
-          <a:p>
-            <a:pPr lvl="1"/>
-            <a:r>
-              <a:rPr lang="en-US" dirty="0"/>
-              <a:t>Grid</a:t>
-            </a:r>
-          </a:p>
-          <a:p>
-            <a:pPr lvl="2"/>
-            <a:r>
-              <a:rPr lang="en-US" dirty="0"/>
-              <a:t>Takes uniformly-spaced samples across variable’s domain</a:t>
-            </a:r>
-          </a:p>
-          <a:p>
-            <a:pPr lvl="2"/>
-            <a:r>
-              <a:rPr lang="en-US" dirty="0"/>
-              <a:t>Samples uniformly in:</a:t>
-            </a:r>
-          </a:p>
-          <a:p>
-            <a:pPr lvl="3"/>
-            <a:r>
-              <a:rPr lang="en-US" dirty="0"/>
-              <a:t>Value space</a:t>
-            </a:r>
-          </a:p>
-          <a:p>
-            <a:pPr lvl="3"/>
-            <a:r>
-              <a:rPr lang="en-US" dirty="0"/>
-              <a:t>Probability space</a:t>
-            </a:r>
-          </a:p>
-          <a:p>
-            <a:r>
-              <a:rPr lang="en-US" dirty="0"/>
-              <a:t>Copy exercise 3, add a </a:t>
-            </a:r>
-            <a:r>
-              <a:rPr lang="en-US" b="1" dirty="0">
-                <a:solidFill>
-                  <a:schemeClr val="accent2"/>
-                </a:solidFill>
-              </a:rPr>
-              <a:t>Grid</a:t>
-            </a:r>
-            <a:r>
-              <a:rPr lang="en-US" dirty="0"/>
-              <a:t> sampler</a:t>
-            </a:r>
-          </a:p>
-          <a:p>
-            <a:r>
-              <a:rPr lang="en-US" dirty="0"/>
-              <a:t>change Steps to use Grid sampler you make</a:t>
-            </a:r>
-          </a:p>
-          <a:p>
-            <a:pPr lvl="1"/>
-            <a:r>
-              <a:rPr lang="en-US" dirty="0"/>
-              <a:t>Don’t remove the Monte Carlo sampler!</a:t>
-            </a:r>
-          </a:p>
-          <a:p>
-            <a:pPr lvl="1"/>
-            <a:r>
-              <a:rPr lang="en-US" dirty="0"/>
-              <a:t>See user manual section 10.1.2</a:t>
-            </a:r>
-          </a:p>
-          <a:p>
-            <a:pPr lvl="1"/>
-            <a:r>
-              <a:rPr lang="en-US" dirty="0"/>
-              <a:t>Don’t forget the </a:t>
-            </a:r>
-            <a:r>
-              <a:rPr lang="en-US" dirty="0">
-                <a:solidFill>
-                  <a:schemeClr val="accent2"/>
-                </a:solidFill>
-              </a:rPr>
-              <a:t>&lt;grid&gt; </a:t>
-            </a:r>
-            <a:r>
-              <a:rPr lang="en-US" dirty="0"/>
-              <a:t>nodes, also remove </a:t>
-            </a:r>
-            <a:r>
-              <a:rPr lang="en-US" dirty="0">
-                <a:solidFill>
-                  <a:schemeClr val="accent2"/>
-                </a:solidFill>
-              </a:rPr>
-              <a:t>&lt;</a:t>
-            </a:r>
-            <a:r>
-              <a:rPr lang="en-US" dirty="0" err="1">
-                <a:solidFill>
-                  <a:schemeClr val="accent2"/>
-                </a:solidFill>
-              </a:rPr>
-              <a:t>samplerInit</a:t>
-            </a:r>
-            <a:r>
-              <a:rPr lang="en-US" dirty="0">
-                <a:solidFill>
-                  <a:schemeClr val="accent2"/>
-                </a:solidFill>
-              </a:rPr>
-              <a:t>&gt;</a:t>
-            </a:r>
-            <a:r>
-              <a:rPr lang="en-US" dirty="0"/>
-              <a:t> node </a:t>
-            </a:r>
-          </a:p>
-          <a:p>
-            <a:pPr lvl="1"/>
-            <a:r>
-              <a:rPr lang="en-US" dirty="0"/>
-              <a:t>Choose how you want to space samples (try a couple options!)</a:t>
-            </a:r>
-          </a:p>
-          <a:p>
-            <a:r>
-              <a:rPr lang="en-US" b="1" dirty="0">
-                <a:solidFill>
-                  <a:schemeClr val="accent1"/>
-                </a:solidFill>
-              </a:rPr>
-              <a:t>Run the case.</a:t>
-            </a:r>
-            <a:r>
-              <a:rPr lang="en-US" dirty="0"/>
-              <a:t>  How are the samples dispersed differently?</a:t>
-            </a:r>
-          </a:p>
-        </p:txBody>
-      </p:sp>
       <p:pic>
         <p:nvPicPr>
           <p:cNvPr id="5" name="Picture 4">
@@ -35966,6 +35802,277 @@
           </a:prstGeom>
         </p:spPr>
       </p:pic>
+      <p:sp>
+        <p:nvSpPr>
+          <p:cNvPr id="2" name="Title 1">
+            <a:extLst>
+              <a:ext uri="{FF2B5EF4-FFF2-40B4-BE49-F238E27FC236}">
+                <a16:creationId xmlns:a16="http://schemas.microsoft.com/office/drawing/2014/main" id="{6CFE73B4-A998-1C41-B18E-D5A5FC19D5C1}"/>
+              </a:ext>
+            </a:extLst>
+          </p:cNvPr>
+          <p:cNvSpPr>
+            <a:spLocks noGrp="1"/>
+          </p:cNvSpPr>
+          <p:nvPr>
+            <p:ph type="title"/>
+          </p:nvPr>
+        </p:nvSpPr>
+        <p:spPr/>
+        <p:txBody>
+          <a:bodyPr/>
+          <a:lstStyle/>
+          <a:p>
+            <a:r>
+              <a:rPr lang="en-US" dirty="0"/>
+              <a:t>4) Changing Samplers</a:t>
+            </a:r>
+          </a:p>
+        </p:txBody>
+      </p:sp>
+      <p:sp>
+        <p:nvSpPr>
+          <p:cNvPr id="3" name="Content Placeholder 2">
+            <a:extLst>
+              <a:ext uri="{FF2B5EF4-FFF2-40B4-BE49-F238E27FC236}">
+                <a16:creationId xmlns:a16="http://schemas.microsoft.com/office/drawing/2014/main" id="{69B98CC8-17F2-0244-9C8C-816FE596FC02}"/>
+              </a:ext>
+            </a:extLst>
+          </p:cNvPr>
+          <p:cNvSpPr>
+            <a:spLocks noGrp="1"/>
+          </p:cNvSpPr>
+          <p:nvPr>
+            <p:ph idx="1"/>
+          </p:nvPr>
+        </p:nvSpPr>
+        <p:spPr>
+          <a:xfrm>
+            <a:off x="455613" y="1437032"/>
+            <a:ext cx="8231187" cy="4524375"/>
+          </a:xfrm>
+        </p:spPr>
+        <p:txBody>
+          <a:bodyPr/>
+          <a:lstStyle/>
+          <a:p>
+            <a:r>
+              <a:rPr lang="en-US" sz="1800" dirty="0"/>
+              <a:t>So far, we’ve used the Monte Carlo sampler</a:t>
+            </a:r>
+          </a:p>
+          <a:p>
+            <a:pPr lvl="1"/>
+            <a:r>
+              <a:rPr lang="en-US" sz="1800" dirty="0"/>
+              <a:t>Samples randomly each time from variable distributions</a:t>
+            </a:r>
+          </a:p>
+          <a:p>
+            <a:r>
+              <a:rPr lang="en-US" sz="1800" dirty="0"/>
+              <a:t>Many other sampling strategies exist.  For example:</a:t>
+            </a:r>
+          </a:p>
+          <a:p>
+            <a:pPr lvl="1"/>
+            <a:r>
+              <a:rPr lang="en-US" sz="1800" dirty="0"/>
+              <a:t>Grid</a:t>
+            </a:r>
+          </a:p>
+          <a:p>
+            <a:pPr lvl="2"/>
+            <a:r>
+              <a:rPr lang="en-US" sz="1800" dirty="0"/>
+              <a:t>Takes uniformly-spaced samples across the variable’s domain</a:t>
+            </a:r>
+          </a:p>
+          <a:p>
+            <a:pPr lvl="2"/>
+            <a:r>
+              <a:rPr lang="en-US" sz="1800" dirty="0"/>
+              <a:t>Samples uniformly in:</a:t>
+            </a:r>
+          </a:p>
+          <a:p>
+            <a:pPr lvl="3"/>
+            <a:r>
+              <a:rPr lang="en-US" sz="1800" dirty="0"/>
+              <a:t>Value space</a:t>
+            </a:r>
+          </a:p>
+          <a:p>
+            <a:pPr lvl="3"/>
+            <a:r>
+              <a:rPr lang="en-US" sz="1800" dirty="0"/>
+              <a:t>Probability space</a:t>
+            </a:r>
+          </a:p>
+          <a:p>
+            <a:r>
+              <a:rPr lang="en-US" sz="1800" dirty="0"/>
+              <a:t>Copy exercise 3 to </a:t>
+            </a:r>
+            <a:r>
+              <a:rPr lang="en-US" sz="1800" dirty="0">
+                <a:solidFill>
+                  <a:srgbClr val="FF0000"/>
+                </a:solidFill>
+              </a:rPr>
+              <a:t>4_grid_sampler.xml</a:t>
+            </a:r>
+            <a:r>
+              <a:rPr lang="en-US" sz="1800" dirty="0"/>
+              <a:t>,</a:t>
+            </a:r>
+          </a:p>
+          <a:p>
+            <a:pPr marL="0" indent="0">
+              <a:buNone/>
+            </a:pPr>
+            <a:r>
+              <a:rPr lang="en-US" sz="1800" dirty="0"/>
+              <a:t>    set &lt;</a:t>
+            </a:r>
+            <a:r>
+              <a:rPr lang="en-US" sz="1800" dirty="0" err="1"/>
+              <a:t>workingDirectory</a:t>
+            </a:r>
+            <a:r>
+              <a:rPr lang="en-US" sz="1800" dirty="0"/>
+              <a:t>&gt; to </a:t>
+            </a:r>
+            <a:r>
+              <a:rPr lang="en-US" sz="1800" dirty="0">
+                <a:solidFill>
+                  <a:srgbClr val="FF0000"/>
+                </a:solidFill>
+              </a:rPr>
+              <a:t>r4</a:t>
+            </a:r>
+          </a:p>
+          <a:p>
+            <a:r>
+              <a:rPr lang="en-US" sz="1800" dirty="0"/>
+              <a:t>Add a </a:t>
+            </a:r>
+            <a:r>
+              <a:rPr lang="en-US" sz="1800" b="1" dirty="0">
+                <a:solidFill>
+                  <a:schemeClr val="accent2"/>
+                </a:solidFill>
+              </a:rPr>
+              <a:t>Grid</a:t>
+            </a:r>
+            <a:r>
+              <a:rPr lang="en-US" sz="1800" dirty="0"/>
+              <a:t> sampler and call it </a:t>
+            </a:r>
+            <a:r>
+              <a:rPr lang="en-US" sz="1800" dirty="0" err="1">
+                <a:solidFill>
+                  <a:srgbClr val="FF0000"/>
+                </a:solidFill>
+              </a:rPr>
+              <a:t>my_grid</a:t>
+            </a:r>
+            <a:endParaRPr lang="en-US" sz="1800" dirty="0">
+              <a:solidFill>
+                <a:srgbClr val="FF0000"/>
+              </a:solidFill>
+            </a:endParaRPr>
+          </a:p>
+          <a:p>
+            <a:r>
+              <a:rPr lang="en-US" sz="1800" dirty="0"/>
+              <a:t>change Steps to use the Grid sampler you make</a:t>
+            </a:r>
+          </a:p>
+          <a:p>
+            <a:pPr lvl="1"/>
+            <a:r>
+              <a:rPr lang="en-US" sz="1800" dirty="0"/>
+              <a:t>Don’t remove the Monte Carlo sampler!</a:t>
+            </a:r>
+          </a:p>
+          <a:p>
+            <a:pPr lvl="1"/>
+            <a:r>
+              <a:rPr lang="en-US" sz="1800" dirty="0"/>
+              <a:t>See user manual section 10.1.2</a:t>
+            </a:r>
+          </a:p>
+          <a:p>
+            <a:pPr lvl="1"/>
+            <a:r>
+              <a:rPr lang="en-US" sz="1800" dirty="0"/>
+              <a:t>Don’t forget the </a:t>
+            </a:r>
+            <a:r>
+              <a:rPr lang="en-US" sz="1800" dirty="0">
+                <a:solidFill>
+                  <a:schemeClr val="accent2"/>
+                </a:solidFill>
+              </a:rPr>
+              <a:t>&lt;grid&gt; </a:t>
+            </a:r>
+            <a:r>
+              <a:rPr lang="en-US" sz="1800" dirty="0"/>
+              <a:t>nodes, also remove </a:t>
+            </a:r>
+            <a:r>
+              <a:rPr lang="en-US" sz="1800" dirty="0">
+                <a:solidFill>
+                  <a:schemeClr val="accent2"/>
+                </a:solidFill>
+              </a:rPr>
+              <a:t>&lt;</a:t>
+            </a:r>
+            <a:r>
+              <a:rPr lang="en-US" sz="1800" dirty="0" err="1">
+                <a:solidFill>
+                  <a:schemeClr val="accent2"/>
+                </a:solidFill>
+              </a:rPr>
+              <a:t>samplerInit</a:t>
+            </a:r>
+            <a:r>
+              <a:rPr lang="en-US" sz="1800" dirty="0">
+                <a:solidFill>
+                  <a:schemeClr val="accent2"/>
+                </a:solidFill>
+              </a:rPr>
+              <a:t>&gt;</a:t>
+            </a:r>
+            <a:r>
+              <a:rPr lang="en-US" sz="1800" dirty="0"/>
+              <a:t> node </a:t>
+            </a:r>
+          </a:p>
+          <a:p>
+            <a:pPr lvl="1"/>
+            <a:r>
+              <a:rPr lang="en-US" sz="1800" dirty="0"/>
+              <a:t>Choose how you want to space samples (try a couple of options!)</a:t>
+            </a:r>
+          </a:p>
+          <a:p>
+            <a:r>
+              <a:rPr lang="en-US" sz="1800" b="1" dirty="0">
+                <a:solidFill>
+                  <a:schemeClr val="accent1"/>
+                </a:solidFill>
+              </a:rPr>
+              <a:t>Run the case.</a:t>
+            </a:r>
+            <a:r>
+              <a:rPr lang="en-US" sz="1800" dirty="0"/>
+              <a:t>  How are the samples dispersed differently?</a:t>
+            </a:r>
+          </a:p>
+        </p:txBody>
+      </p:sp>
     </p:spTree>
     <p:extLst>
       <p:ext uri="{BB962C8B-B14F-4D97-AF65-F5344CB8AC3E}">
@@ -36654,7 +36761,12 @@
             <p:ph type="title"/>
           </p:nvPr>
         </p:nvSpPr>
-        <p:spPr/>
+        <p:spPr>
+          <a:xfrm>
+            <a:off x="286647" y="408540"/>
+            <a:ext cx="8231187" cy="363537"/>
+          </a:xfrm>
+        </p:spPr>
         <p:txBody>
           <a:bodyPr/>
           <a:lstStyle/>
@@ -36682,7 +36794,12 @@
             <p:ph idx="1"/>
           </p:nvPr>
         </p:nvSpPr>
-        <p:spPr/>
+        <p:spPr>
+          <a:xfrm>
+            <a:off x="286647" y="1002265"/>
+            <a:ext cx="8231187" cy="4524375"/>
+          </a:xfrm>
+        </p:spPr>
         <p:txBody>
           <a:bodyPr/>
           <a:lstStyle/>
@@ -36851,9 +36968,16 @@
                   <a:schemeClr val="accent2"/>
                 </a:solidFill>
               </a:rPr>
-              <a:t> angle</a:t>
-            </a:r>
-            <a:endParaRPr lang="en-US" dirty="0"/>
+              <a:t> angle </a:t>
+            </a:r>
+            <a:r>
+              <a:rPr lang="en-US" dirty="0">
+                <a:solidFill>
+                  <a:srgbClr val="FF0000"/>
+                </a:solidFill>
+              </a:rPr>
+              <a:t>(What happens if all are in outputs)</a:t>
+            </a:r>
           </a:p>
           <a:p>
             <a:r>
@@ -37061,14 +37185,13 @@
               </a:ext>
             </a:extLst>
           </a:blip>
-          <a:stretch>
-            <a:fillRect/>
-          </a:stretch>
+          <a:srcRect/>
+          <a:stretch/>
         </p:blipFill>
         <p:spPr>
           <a:xfrm>
-            <a:off x="2186609" y="6237301"/>
-            <a:ext cx="6957391" cy="620699"/>
+            <a:off x="1249734" y="6008701"/>
+            <a:ext cx="6644531" cy="620699"/>
           </a:xfrm>
           <a:prstGeom prst="rect">
             <a:avLst/>
@@ -38179,7 +38302,7 @@
         <p:spPr>
           <a:xfrm>
             <a:off x="455613" y="1935179"/>
-            <a:ext cx="8494423" cy="1477328"/>
+            <a:ext cx="8494423" cy="1200329"/>
           </a:xfrm>
           <a:prstGeom prst="rect">
             <a:avLst/>
@@ -38264,7 +38387,7 @@
                 </a:solidFill>
                 <a:latin typeface="Lucida Console" panose="020B0609040504020204" pitchFamily="49" charset="0"/>
               </a:rPr>
-              <a:t> cd doc/workshop/</a:t>
+              <a:t> cd ~/projects/raven/doc/workshop/</a:t>
             </a:r>
             <a:r>
               <a:rPr lang="en-US" sz="1800" dirty="0" err="1">
@@ -38273,25 +38396,7 @@
                 </a:solidFill>
                 <a:latin typeface="Lucida Console" panose="020B0609040504020204" pitchFamily="49" charset="0"/>
               </a:rPr>
-              <a:t>forwardSampling</a:t>
-            </a:r>
-            <a:r>
-              <a:rPr lang="en-US" sz="1800" dirty="0">
-                <a:solidFill>
-                  <a:schemeClr val="bg1"/>
-                </a:solidFill>
-                <a:latin typeface="Lucida Console" panose="020B0609040504020204" pitchFamily="49" charset="0"/>
-              </a:rPr>
-              <a:t>/</a:t>
-            </a:r>
-            <a:r>
-              <a:rPr lang="en-US" sz="1800" dirty="0" err="1">
-                <a:solidFill>
-                  <a:schemeClr val="bg1"/>
-                </a:solidFill>
-                <a:latin typeface="Lucida Console" panose="020B0609040504020204" pitchFamily="49" charset="0"/>
-              </a:rPr>
-              <a:t>projectile_model</a:t>
+              <a:t>ExternalModels</a:t>
             </a:r>
             <a:endParaRPr lang="en-US" sz="1800" dirty="0">
               <a:latin typeface="Lucida Console" panose="020B0609040504020204" pitchFamily="49" charset="0"/>
@@ -38370,17 +38475,6 @@
               </a:rPr>
               <a:t> –o out</a:t>
             </a:r>
-          </a:p>
-          <a:p>
-            <a:pPr marL="0" indent="0">
-              <a:buNone/>
-            </a:pPr>
-            <a:endParaRPr lang="en-US" sz="1800" dirty="0">
-              <a:solidFill>
-                <a:schemeClr val="bg1"/>
-              </a:solidFill>
-              <a:latin typeface="Lucida Console" panose="020B0609040504020204" pitchFamily="49" charset="0"/>
-            </a:endParaRPr>
           </a:p>
         </p:txBody>
       </p:sp>
@@ -39152,12 +39246,8 @@
           <a:p>
             <a:pPr lvl="1"/>
             <a:r>
-              <a:rPr lang="en-US" dirty="0" err="1"/>
-              <a:t>visualstudio</a:t>
-            </a:r>
-            <a:r>
               <a:rPr lang="en-US" dirty="0"/>
-              <a:t> code</a:t>
+              <a:t>Visual Studio Code</a:t>
             </a:r>
           </a:p>
           <a:p>

</xml_diff>

<commit_message>
Initial commit for GA SIM3 interface
</commit_message>
<xml_diff>
--- a/doc/workshop/forwardSampling/ForwardSampling.pptx
+++ b/doc/workshop/forwardSampling/ForwardSampling.pptx
@@ -35275,17 +35275,29 @@
           <a:p>
             <a:r>
               <a:rPr lang="en-US" dirty="0"/>
-              <a:t>Entities to adjust:</a:t>
+              <a:t>Entities to adjust: Change the working directory to ‘</a:t>
+            </a:r>
+            <a:r>
+              <a:rPr lang="en-US" dirty="0">
+                <a:solidFill>
+                  <a:srgbClr val="1A4DB2"/>
+                </a:solidFill>
+              </a:rPr>
+              <a:t>r3</a:t>
+            </a:r>
+            <a:r>
+              <a:rPr lang="en-US" dirty="0"/>
+              <a:t>’</a:t>
             </a:r>
           </a:p>
           <a:p>
             <a:pPr lvl="1"/>
             <a:r>
-              <a:rPr lang="en-US" dirty="0"/>
+              <a:rPr lang="en-US" sz="1800" dirty="0"/>
               <a:t>Change </a:t>
             </a:r>
             <a:r>
-              <a:rPr lang="en-US" dirty="0">
+              <a:rPr lang="en-US" sz="1800" dirty="0">
                 <a:solidFill>
                   <a:schemeClr val="accent2"/>
                 </a:solidFill>
@@ -35293,11 +35305,11 @@
               <a:t>v0</a:t>
             </a:r>
             <a:r>
-              <a:rPr lang="en-US" dirty="0"/>
+              <a:rPr lang="en-US" sz="1800" dirty="0"/>
               <a:t> to </a:t>
             </a:r>
             <a:r>
-              <a:rPr lang="en-US" dirty="0">
+              <a:rPr lang="en-US" sz="1800" dirty="0">
                 <a:solidFill>
                   <a:schemeClr val="accent2"/>
                 </a:solidFill>
@@ -35305,32 +35317,66 @@
               <a:t>y0</a:t>
             </a:r>
             <a:r>
-              <a:rPr lang="en-US" dirty="0"/>
+              <a:rPr lang="en-US" sz="1800" dirty="0"/>
               <a:t> in:</a:t>
             </a:r>
           </a:p>
           <a:p>
             <a:pPr lvl="2"/>
             <a:r>
-              <a:rPr lang="en-US" dirty="0"/>
-              <a:t>Models</a:t>
+              <a:rPr lang="en-US" sz="1800" dirty="0"/>
+              <a:t>Models </a:t>
+            </a:r>
+            <a:r>
+              <a:rPr lang="en-US" sz="1800" dirty="0">
+                <a:solidFill>
+                  <a:srgbClr val="FF0000"/>
+                </a:solidFill>
+              </a:rPr>
+              <a:t>(In fact, here you need to add both</a:t>
+            </a:r>
+          </a:p>
+          <a:p>
+            <a:pPr marL="914400" lvl="2" indent="0">
+              <a:buNone/>
+            </a:pPr>
+            <a:r>
+              <a:rPr lang="en-US" sz="1800" dirty="0">
+                <a:solidFill>
+                  <a:srgbClr val="FF0000"/>
+                </a:solidFill>
+              </a:rPr>
+              <a:t>otherwise v0=30 will not be recognized and will be</a:t>
+            </a:r>
+          </a:p>
+          <a:p>
+            <a:pPr marL="914400" lvl="2" indent="0">
+              <a:buNone/>
+            </a:pPr>
+            <a:r>
+              <a:rPr lang="en-US" sz="1800" dirty="0">
+                <a:solidFill>
+                  <a:srgbClr val="FF0000"/>
+                </a:solidFill>
+              </a:rPr>
+              <a:t>overwritten with default value in the model i.e., 1 m/s)</a:t>
             </a:r>
           </a:p>
           <a:p>
             <a:pPr lvl="2"/>
             <a:r>
-              <a:rPr lang="en-US" dirty="0"/>
+              <a:rPr lang="en-US" sz="1800" dirty="0"/>
               <a:t>Samplers</a:t>
             </a:r>
           </a:p>
           <a:p>
             <a:pPr lvl="3"/>
             <a:r>
-              <a:rPr lang="en-US" dirty="0"/>
+              <a:rPr lang="en-US" sz="1800" dirty="0"/>
               <a:t>Also change constant </a:t>
             </a:r>
             <a:r>
-              <a:rPr lang="en-US" dirty="0">
+              <a:rPr lang="en-US" sz="1800" dirty="0">
                 <a:solidFill>
                   <a:schemeClr val="accent2"/>
                 </a:solidFill>
@@ -35338,11 +35384,11 @@
               <a:t>y0</a:t>
             </a:r>
             <a:r>
-              <a:rPr lang="en-US" dirty="0"/>
+              <a:rPr lang="en-US" sz="1800" dirty="0"/>
               <a:t> to </a:t>
             </a:r>
             <a:r>
-              <a:rPr lang="en-US" dirty="0">
+              <a:rPr lang="en-US" sz="1800" dirty="0">
                 <a:solidFill>
                   <a:schemeClr val="accent2"/>
                 </a:solidFill>
@@ -35350,25 +35396,25 @@
               <a:t>v0</a:t>
             </a:r>
             <a:r>
-              <a:rPr lang="en-US" dirty="0"/>
+              <a:rPr lang="en-US" sz="1800" dirty="0"/>
               <a:t> with value of 30</a:t>
             </a:r>
           </a:p>
           <a:p>
             <a:pPr lvl="2"/>
             <a:r>
-              <a:rPr lang="en-US" dirty="0"/>
+              <a:rPr lang="en-US" sz="1800" dirty="0"/>
               <a:t>Distributions</a:t>
             </a:r>
           </a:p>
           <a:p>
             <a:pPr lvl="3"/>
             <a:r>
-              <a:rPr lang="en-US" dirty="0"/>
+              <a:rPr lang="en-US" sz="1800" dirty="0"/>
               <a:t>Also change the distribution </a:t>
             </a:r>
             <a:r>
-              <a:rPr lang="en-US" dirty="0">
+              <a:rPr lang="en-US" sz="1800" dirty="0">
                 <a:solidFill>
                   <a:schemeClr val="accent2"/>
                 </a:solidFill>
@@ -35376,39 +35422,39 @@
               <a:t>y0_dist </a:t>
             </a:r>
             <a:r>
-              <a:rPr lang="en-US" dirty="0"/>
+              <a:rPr lang="en-US" sz="1800" dirty="0"/>
               <a:t>to Uniform, 0 to 1</a:t>
             </a:r>
           </a:p>
           <a:p>
             <a:pPr lvl="2"/>
             <a:r>
-              <a:rPr lang="en-US" dirty="0" err="1"/>
+              <a:rPr lang="en-US" sz="1800" dirty="0" err="1"/>
               <a:t>DataObjects</a:t>
             </a:r>
-            <a:endParaRPr lang="en-US" dirty="0"/>
+            <a:endParaRPr lang="en-US" sz="1800" dirty="0"/>
           </a:p>
           <a:p>
             <a:pPr lvl="2"/>
             <a:r>
-              <a:rPr lang="en-US" dirty="0" err="1"/>
+              <a:rPr lang="en-US" sz="1800" dirty="0" err="1"/>
               <a:t>OutStreams</a:t>
             </a:r>
             <a:r>
-              <a:rPr lang="en-US" dirty="0"/>
+              <a:rPr lang="en-US" sz="1800" dirty="0"/>
               <a:t> </a:t>
             </a:r>
             <a:r>
-              <a:rPr lang="en-US" dirty="0">
+              <a:rPr lang="en-US" sz="1800" dirty="0">
                 <a:sym typeface="Wingdings" pitchFamily="2" charset="2"/>
               </a:rPr>
               <a:t> Plot</a:t>
             </a:r>
-            <a:endParaRPr lang="en-US" dirty="0"/>
+            <a:endParaRPr lang="en-US" sz="1800" dirty="0"/>
           </a:p>
           <a:p>
             <a:r>
-              <a:rPr lang="en-US" b="1" dirty="0">
+              <a:rPr lang="en-US" sz="1800" b="1" dirty="0">
                 <a:solidFill>
                   <a:schemeClr val="accent1"/>
                 </a:solidFill>
@@ -35416,7 +35462,7 @@
               <a:t>Run the case.</a:t>
             </a:r>
             <a:r>
-              <a:rPr lang="en-US" dirty="0"/>
+              <a:rPr lang="en-US" sz="1800" dirty="0"/>
               <a:t>  Plot should have y0 instead of v0.</a:t>
             </a:r>
           </a:p>
@@ -35720,216 +35766,6 @@
           <a:chExt cx="0" cy="0"/>
         </a:xfrm>
       </p:grpSpPr>
-      <p:sp>
-        <p:nvSpPr>
-          <p:cNvPr id="2" name="Title 1">
-            <a:extLst>
-              <a:ext uri="{FF2B5EF4-FFF2-40B4-BE49-F238E27FC236}">
-                <a16:creationId xmlns:a16="http://schemas.microsoft.com/office/drawing/2014/main" id="{6CFE73B4-A998-1C41-B18E-D5A5FC19D5C1}"/>
-              </a:ext>
-            </a:extLst>
-          </p:cNvPr>
-          <p:cNvSpPr>
-            <a:spLocks noGrp="1"/>
-          </p:cNvSpPr>
-          <p:nvPr>
-            <p:ph type="title"/>
-          </p:nvPr>
-        </p:nvSpPr>
-        <p:spPr/>
-        <p:txBody>
-          <a:bodyPr/>
-          <a:lstStyle/>
-          <a:p>
-            <a:r>
-              <a:rPr lang="en-US" dirty="0"/>
-              <a:t>4) Changing Samplers</a:t>
-            </a:r>
-          </a:p>
-        </p:txBody>
-      </p:sp>
-      <p:sp>
-        <p:nvSpPr>
-          <p:cNvPr id="3" name="Content Placeholder 2">
-            <a:extLst>
-              <a:ext uri="{FF2B5EF4-FFF2-40B4-BE49-F238E27FC236}">
-                <a16:creationId xmlns:a16="http://schemas.microsoft.com/office/drawing/2014/main" id="{69B98CC8-17F2-0244-9C8C-816FE596FC02}"/>
-              </a:ext>
-            </a:extLst>
-          </p:cNvPr>
-          <p:cNvSpPr>
-            <a:spLocks noGrp="1"/>
-          </p:cNvSpPr>
-          <p:nvPr>
-            <p:ph idx="1"/>
-          </p:nvPr>
-        </p:nvSpPr>
-        <p:spPr/>
-        <p:txBody>
-          <a:bodyPr/>
-          <a:lstStyle/>
-          <a:p>
-            <a:r>
-              <a:rPr lang="en-US" dirty="0"/>
-              <a:t>So far we’ve used the Monte Carlo sampler</a:t>
-            </a:r>
-          </a:p>
-          <a:p>
-            <a:pPr lvl="1"/>
-            <a:r>
-              <a:rPr lang="en-US" dirty="0"/>
-              <a:t>Samples randomly each time from variable distributions</a:t>
-            </a:r>
-          </a:p>
-          <a:p>
-            <a:r>
-              <a:rPr lang="en-US" dirty="0"/>
-              <a:t>Many other sampling strategies exist.  For example:</a:t>
-            </a:r>
-          </a:p>
-          <a:p>
-            <a:pPr lvl="1"/>
-            <a:r>
-              <a:rPr lang="en-US" dirty="0"/>
-              <a:t>Grid</a:t>
-            </a:r>
-          </a:p>
-          <a:p>
-            <a:pPr lvl="2"/>
-            <a:r>
-              <a:rPr lang="en-US" dirty="0"/>
-              <a:t>Takes uniformly-spaced samples across variable’s domain</a:t>
-            </a:r>
-          </a:p>
-          <a:p>
-            <a:pPr lvl="2"/>
-            <a:r>
-              <a:rPr lang="en-US" dirty="0"/>
-              <a:t>Samples uniformly in:</a:t>
-            </a:r>
-          </a:p>
-          <a:p>
-            <a:pPr lvl="3"/>
-            <a:r>
-              <a:rPr lang="en-US" dirty="0"/>
-              <a:t>Value space</a:t>
-            </a:r>
-          </a:p>
-          <a:p>
-            <a:pPr lvl="3"/>
-            <a:r>
-              <a:rPr lang="en-US" dirty="0"/>
-              <a:t>Probability space</a:t>
-            </a:r>
-          </a:p>
-          <a:p>
-            <a:r>
-              <a:rPr lang="en-US" dirty="0"/>
-              <a:t>Copy exercise 3, add a </a:t>
-            </a:r>
-            <a:r>
-              <a:rPr lang="en-US" b="1" dirty="0">
-                <a:solidFill>
-                  <a:schemeClr val="accent2"/>
-                </a:solidFill>
-              </a:rPr>
-              <a:t>Grid</a:t>
-            </a:r>
-            <a:r>
-              <a:rPr lang="en-US" dirty="0"/>
-              <a:t> sampler</a:t>
-            </a:r>
-          </a:p>
-          <a:p>
-            <a:r>
-              <a:rPr lang="en-US" dirty="0"/>
-              <a:t>change Steps to use Grid sampler you make</a:t>
-            </a:r>
-          </a:p>
-          <a:p>
-            <a:pPr lvl="1"/>
-            <a:r>
-              <a:rPr lang="en-US" dirty="0"/>
-              <a:t>Don’t remove the Monte Carlo sampler!</a:t>
-            </a:r>
-          </a:p>
-          <a:p>
-            <a:pPr lvl="1"/>
-            <a:r>
-              <a:rPr lang="en-US" dirty="0"/>
-              <a:t>See user manual section 10.1.2</a:t>
-            </a:r>
-          </a:p>
-          <a:p>
-            <a:pPr lvl="1"/>
-            <a:r>
-              <a:rPr lang="en-US" dirty="0"/>
-              <a:t>Don’t forget the </a:t>
-            </a:r>
-            <a:r>
-              <a:rPr lang="en-US" dirty="0">
-                <a:solidFill>
-                  <a:schemeClr val="accent2"/>
-                </a:solidFill>
-              </a:rPr>
-              <a:t>&lt;grid&gt; </a:t>
-            </a:r>
-            <a:r>
-              <a:rPr lang="en-US" dirty="0"/>
-              <a:t>nodes, also remove </a:t>
-            </a:r>
-            <a:r>
-              <a:rPr lang="en-US" dirty="0">
-                <a:solidFill>
-                  <a:schemeClr val="accent2"/>
-                </a:solidFill>
-              </a:rPr>
-              <a:t>&lt;</a:t>
-            </a:r>
-            <a:r>
-              <a:rPr lang="en-US" dirty="0" err="1">
-                <a:solidFill>
-                  <a:schemeClr val="accent2"/>
-                </a:solidFill>
-              </a:rPr>
-              <a:t>samplerInit</a:t>
-            </a:r>
-            <a:r>
-              <a:rPr lang="en-US" dirty="0">
-                <a:solidFill>
-                  <a:schemeClr val="accent2"/>
-                </a:solidFill>
-              </a:rPr>
-              <a:t>&gt;</a:t>
-            </a:r>
-            <a:r>
-              <a:rPr lang="en-US" dirty="0"/>
-              <a:t> node </a:t>
-            </a:r>
-          </a:p>
-          <a:p>
-            <a:pPr lvl="1"/>
-            <a:r>
-              <a:rPr lang="en-US" dirty="0"/>
-              <a:t>Choose how you want to space samples (try a couple options!)</a:t>
-            </a:r>
-          </a:p>
-          <a:p>
-            <a:r>
-              <a:rPr lang="en-US" b="1" dirty="0">
-                <a:solidFill>
-                  <a:schemeClr val="accent1"/>
-                </a:solidFill>
-              </a:rPr>
-              <a:t>Run the case.</a:t>
-            </a:r>
-            <a:r>
-              <a:rPr lang="en-US" dirty="0"/>
-              <a:t>  How are the samples dispersed differently?</a:t>
-            </a:r>
-          </a:p>
-        </p:txBody>
-      </p:sp>
       <p:pic>
         <p:nvPicPr>
           <p:cNvPr id="5" name="Picture 4">
@@ -35966,6 +35802,277 @@
           </a:prstGeom>
         </p:spPr>
       </p:pic>
+      <p:sp>
+        <p:nvSpPr>
+          <p:cNvPr id="2" name="Title 1">
+            <a:extLst>
+              <a:ext uri="{FF2B5EF4-FFF2-40B4-BE49-F238E27FC236}">
+                <a16:creationId xmlns:a16="http://schemas.microsoft.com/office/drawing/2014/main" id="{6CFE73B4-A998-1C41-B18E-D5A5FC19D5C1}"/>
+              </a:ext>
+            </a:extLst>
+          </p:cNvPr>
+          <p:cNvSpPr>
+            <a:spLocks noGrp="1"/>
+          </p:cNvSpPr>
+          <p:nvPr>
+            <p:ph type="title"/>
+          </p:nvPr>
+        </p:nvSpPr>
+        <p:spPr/>
+        <p:txBody>
+          <a:bodyPr/>
+          <a:lstStyle/>
+          <a:p>
+            <a:r>
+              <a:rPr lang="en-US" dirty="0"/>
+              <a:t>4) Changing Samplers</a:t>
+            </a:r>
+          </a:p>
+        </p:txBody>
+      </p:sp>
+      <p:sp>
+        <p:nvSpPr>
+          <p:cNvPr id="3" name="Content Placeholder 2">
+            <a:extLst>
+              <a:ext uri="{FF2B5EF4-FFF2-40B4-BE49-F238E27FC236}">
+                <a16:creationId xmlns:a16="http://schemas.microsoft.com/office/drawing/2014/main" id="{69B98CC8-17F2-0244-9C8C-816FE596FC02}"/>
+              </a:ext>
+            </a:extLst>
+          </p:cNvPr>
+          <p:cNvSpPr>
+            <a:spLocks noGrp="1"/>
+          </p:cNvSpPr>
+          <p:nvPr>
+            <p:ph idx="1"/>
+          </p:nvPr>
+        </p:nvSpPr>
+        <p:spPr>
+          <a:xfrm>
+            <a:off x="455613" y="1437032"/>
+            <a:ext cx="8231187" cy="4524375"/>
+          </a:xfrm>
+        </p:spPr>
+        <p:txBody>
+          <a:bodyPr/>
+          <a:lstStyle/>
+          <a:p>
+            <a:r>
+              <a:rPr lang="en-US" sz="1800" dirty="0"/>
+              <a:t>So far, we’ve used the Monte Carlo sampler</a:t>
+            </a:r>
+          </a:p>
+          <a:p>
+            <a:pPr lvl="1"/>
+            <a:r>
+              <a:rPr lang="en-US" sz="1800" dirty="0"/>
+              <a:t>Samples randomly each time from variable distributions</a:t>
+            </a:r>
+          </a:p>
+          <a:p>
+            <a:r>
+              <a:rPr lang="en-US" sz="1800" dirty="0"/>
+              <a:t>Many other sampling strategies exist.  For example:</a:t>
+            </a:r>
+          </a:p>
+          <a:p>
+            <a:pPr lvl="1"/>
+            <a:r>
+              <a:rPr lang="en-US" sz="1800" dirty="0"/>
+              <a:t>Grid</a:t>
+            </a:r>
+          </a:p>
+          <a:p>
+            <a:pPr lvl="2"/>
+            <a:r>
+              <a:rPr lang="en-US" sz="1800" dirty="0"/>
+              <a:t>Takes uniformly-spaced samples across the variable’s domain</a:t>
+            </a:r>
+          </a:p>
+          <a:p>
+            <a:pPr lvl="2"/>
+            <a:r>
+              <a:rPr lang="en-US" sz="1800" dirty="0"/>
+              <a:t>Samples uniformly in:</a:t>
+            </a:r>
+          </a:p>
+          <a:p>
+            <a:pPr lvl="3"/>
+            <a:r>
+              <a:rPr lang="en-US" sz="1800" dirty="0"/>
+              <a:t>Value space</a:t>
+            </a:r>
+          </a:p>
+          <a:p>
+            <a:pPr lvl="3"/>
+            <a:r>
+              <a:rPr lang="en-US" sz="1800" dirty="0"/>
+              <a:t>Probability space</a:t>
+            </a:r>
+          </a:p>
+          <a:p>
+            <a:r>
+              <a:rPr lang="en-US" sz="1800" dirty="0"/>
+              <a:t>Copy exercise 3 to </a:t>
+            </a:r>
+            <a:r>
+              <a:rPr lang="en-US" sz="1800" dirty="0">
+                <a:solidFill>
+                  <a:srgbClr val="FF0000"/>
+                </a:solidFill>
+              </a:rPr>
+              <a:t>4_grid_sampler.xml</a:t>
+            </a:r>
+            <a:r>
+              <a:rPr lang="en-US" sz="1800" dirty="0"/>
+              <a:t>,</a:t>
+            </a:r>
+          </a:p>
+          <a:p>
+            <a:pPr marL="0" indent="0">
+              <a:buNone/>
+            </a:pPr>
+            <a:r>
+              <a:rPr lang="en-US" sz="1800" dirty="0"/>
+              <a:t>    set &lt;</a:t>
+            </a:r>
+            <a:r>
+              <a:rPr lang="en-US" sz="1800" dirty="0" err="1"/>
+              <a:t>workingDirectory</a:t>
+            </a:r>
+            <a:r>
+              <a:rPr lang="en-US" sz="1800" dirty="0"/>
+              <a:t>&gt; to </a:t>
+            </a:r>
+            <a:r>
+              <a:rPr lang="en-US" sz="1800" dirty="0">
+                <a:solidFill>
+                  <a:srgbClr val="FF0000"/>
+                </a:solidFill>
+              </a:rPr>
+              <a:t>r4</a:t>
+            </a:r>
+          </a:p>
+          <a:p>
+            <a:r>
+              <a:rPr lang="en-US" sz="1800" dirty="0"/>
+              <a:t>Add a </a:t>
+            </a:r>
+            <a:r>
+              <a:rPr lang="en-US" sz="1800" b="1" dirty="0">
+                <a:solidFill>
+                  <a:schemeClr val="accent2"/>
+                </a:solidFill>
+              </a:rPr>
+              <a:t>Grid</a:t>
+            </a:r>
+            <a:r>
+              <a:rPr lang="en-US" sz="1800" dirty="0"/>
+              <a:t> sampler and call it </a:t>
+            </a:r>
+            <a:r>
+              <a:rPr lang="en-US" sz="1800" dirty="0" err="1">
+                <a:solidFill>
+                  <a:srgbClr val="FF0000"/>
+                </a:solidFill>
+              </a:rPr>
+              <a:t>my_grid</a:t>
+            </a:r>
+            <a:endParaRPr lang="en-US" sz="1800" dirty="0">
+              <a:solidFill>
+                <a:srgbClr val="FF0000"/>
+              </a:solidFill>
+            </a:endParaRPr>
+          </a:p>
+          <a:p>
+            <a:r>
+              <a:rPr lang="en-US" sz="1800" dirty="0"/>
+              <a:t>change Steps to use the Grid sampler you make</a:t>
+            </a:r>
+          </a:p>
+          <a:p>
+            <a:pPr lvl="1"/>
+            <a:r>
+              <a:rPr lang="en-US" sz="1800" dirty="0"/>
+              <a:t>Don’t remove the Monte Carlo sampler!</a:t>
+            </a:r>
+          </a:p>
+          <a:p>
+            <a:pPr lvl="1"/>
+            <a:r>
+              <a:rPr lang="en-US" sz="1800" dirty="0"/>
+              <a:t>See user manual section 10.1.2</a:t>
+            </a:r>
+          </a:p>
+          <a:p>
+            <a:pPr lvl="1"/>
+            <a:r>
+              <a:rPr lang="en-US" sz="1800" dirty="0"/>
+              <a:t>Don’t forget the </a:t>
+            </a:r>
+            <a:r>
+              <a:rPr lang="en-US" sz="1800" dirty="0">
+                <a:solidFill>
+                  <a:schemeClr val="accent2"/>
+                </a:solidFill>
+              </a:rPr>
+              <a:t>&lt;grid&gt; </a:t>
+            </a:r>
+            <a:r>
+              <a:rPr lang="en-US" sz="1800" dirty="0"/>
+              <a:t>nodes, also remove </a:t>
+            </a:r>
+            <a:r>
+              <a:rPr lang="en-US" sz="1800" dirty="0">
+                <a:solidFill>
+                  <a:schemeClr val="accent2"/>
+                </a:solidFill>
+              </a:rPr>
+              <a:t>&lt;</a:t>
+            </a:r>
+            <a:r>
+              <a:rPr lang="en-US" sz="1800" dirty="0" err="1">
+                <a:solidFill>
+                  <a:schemeClr val="accent2"/>
+                </a:solidFill>
+              </a:rPr>
+              <a:t>samplerInit</a:t>
+            </a:r>
+            <a:r>
+              <a:rPr lang="en-US" sz="1800" dirty="0">
+                <a:solidFill>
+                  <a:schemeClr val="accent2"/>
+                </a:solidFill>
+              </a:rPr>
+              <a:t>&gt;</a:t>
+            </a:r>
+            <a:r>
+              <a:rPr lang="en-US" sz="1800" dirty="0"/>
+              <a:t> node </a:t>
+            </a:r>
+          </a:p>
+          <a:p>
+            <a:pPr lvl="1"/>
+            <a:r>
+              <a:rPr lang="en-US" sz="1800" dirty="0"/>
+              <a:t>Choose how you want to space samples (try a couple of options!)</a:t>
+            </a:r>
+          </a:p>
+          <a:p>
+            <a:r>
+              <a:rPr lang="en-US" sz="1800" b="1" dirty="0">
+                <a:solidFill>
+                  <a:schemeClr val="accent1"/>
+                </a:solidFill>
+              </a:rPr>
+              <a:t>Run the case.</a:t>
+            </a:r>
+            <a:r>
+              <a:rPr lang="en-US" sz="1800" dirty="0"/>
+              <a:t>  How are the samples dispersed differently?</a:t>
+            </a:r>
+          </a:p>
+        </p:txBody>
+      </p:sp>
     </p:spTree>
     <p:extLst>
       <p:ext uri="{BB962C8B-B14F-4D97-AF65-F5344CB8AC3E}">
@@ -36654,7 +36761,12 @@
             <p:ph type="title"/>
           </p:nvPr>
         </p:nvSpPr>
-        <p:spPr/>
+        <p:spPr>
+          <a:xfrm>
+            <a:off x="286647" y="408540"/>
+            <a:ext cx="8231187" cy="363537"/>
+          </a:xfrm>
+        </p:spPr>
         <p:txBody>
           <a:bodyPr/>
           <a:lstStyle/>
@@ -36682,7 +36794,12 @@
             <p:ph idx="1"/>
           </p:nvPr>
         </p:nvSpPr>
-        <p:spPr/>
+        <p:spPr>
+          <a:xfrm>
+            <a:off x="286647" y="1002265"/>
+            <a:ext cx="8231187" cy="4524375"/>
+          </a:xfrm>
+        </p:spPr>
         <p:txBody>
           <a:bodyPr/>
           <a:lstStyle/>
@@ -36851,9 +36968,16 @@
                   <a:schemeClr val="accent2"/>
                 </a:solidFill>
               </a:rPr>
-              <a:t> angle</a:t>
-            </a:r>
-            <a:endParaRPr lang="en-US" dirty="0"/>
+              <a:t> angle </a:t>
+            </a:r>
+            <a:r>
+              <a:rPr lang="en-US" dirty="0">
+                <a:solidFill>
+                  <a:srgbClr val="FF0000"/>
+                </a:solidFill>
+              </a:rPr>
+              <a:t>(What happens if all are in outputs)</a:t>
+            </a:r>
           </a:p>
           <a:p>
             <a:r>
@@ -37061,14 +37185,13 @@
               </a:ext>
             </a:extLst>
           </a:blip>
-          <a:stretch>
-            <a:fillRect/>
-          </a:stretch>
+          <a:srcRect/>
+          <a:stretch/>
         </p:blipFill>
         <p:spPr>
           <a:xfrm>
-            <a:off x="2186609" y="6237301"/>
-            <a:ext cx="6957391" cy="620699"/>
+            <a:off x="1249734" y="6008701"/>
+            <a:ext cx="6644531" cy="620699"/>
           </a:xfrm>
           <a:prstGeom prst="rect">
             <a:avLst/>
@@ -38179,7 +38302,7 @@
         <p:spPr>
           <a:xfrm>
             <a:off x="455613" y="1935179"/>
-            <a:ext cx="8494423" cy="1477328"/>
+            <a:ext cx="8494423" cy="1200329"/>
           </a:xfrm>
           <a:prstGeom prst="rect">
             <a:avLst/>
@@ -38264,7 +38387,7 @@
                 </a:solidFill>
                 <a:latin typeface="Lucida Console" panose="020B0609040504020204" pitchFamily="49" charset="0"/>
               </a:rPr>
-              <a:t> cd doc/workshop/</a:t>
+              <a:t> cd ~/projects/raven/doc/workshop/</a:t>
             </a:r>
             <a:r>
               <a:rPr lang="en-US" sz="1800" dirty="0" err="1">
@@ -38273,25 +38396,7 @@
                 </a:solidFill>
                 <a:latin typeface="Lucida Console" panose="020B0609040504020204" pitchFamily="49" charset="0"/>
               </a:rPr>
-              <a:t>forwardSampling</a:t>
-            </a:r>
-            <a:r>
-              <a:rPr lang="en-US" sz="1800" dirty="0">
-                <a:solidFill>
-                  <a:schemeClr val="bg1"/>
-                </a:solidFill>
-                <a:latin typeface="Lucida Console" panose="020B0609040504020204" pitchFamily="49" charset="0"/>
-              </a:rPr>
-              <a:t>/</a:t>
-            </a:r>
-            <a:r>
-              <a:rPr lang="en-US" sz="1800" dirty="0" err="1">
-                <a:solidFill>
-                  <a:schemeClr val="bg1"/>
-                </a:solidFill>
-                <a:latin typeface="Lucida Console" panose="020B0609040504020204" pitchFamily="49" charset="0"/>
-              </a:rPr>
-              <a:t>projectile_model</a:t>
+              <a:t>ExternalModels</a:t>
             </a:r>
             <a:endParaRPr lang="en-US" sz="1800" dirty="0">
               <a:latin typeface="Lucida Console" panose="020B0609040504020204" pitchFamily="49" charset="0"/>
@@ -38370,17 +38475,6 @@
               </a:rPr>
               <a:t> –o out</a:t>
             </a:r>
-          </a:p>
-          <a:p>
-            <a:pPr marL="0" indent="0">
-              <a:buNone/>
-            </a:pPr>
-            <a:endParaRPr lang="en-US" sz="1800" dirty="0">
-              <a:solidFill>
-                <a:schemeClr val="bg1"/>
-              </a:solidFill>
-              <a:latin typeface="Lucida Console" panose="020B0609040504020204" pitchFamily="49" charset="0"/>
-            </a:endParaRPr>
           </a:p>
         </p:txBody>
       </p:sp>
@@ -39152,12 +39246,8 @@
           <a:p>
             <a:pPr lvl="1"/>
             <a:r>
-              <a:rPr lang="en-US" dirty="0" err="1"/>
-              <a:t>visualstudio</a:t>
-            </a:r>
-            <a:r>
               <a:rPr lang="en-US" dirty="0"/>
-              <a:t> code</a:t>
+              <a:t>Visual Studio Code</a:t>
             </a:r>
           </a:p>
           <a:p>

</xml_diff>